<commit_message>
bbs figure colors, cowplot created
</commit_message>
<xml_diff>
--- a/Figures/mih_paper_figures.pptx
+++ b/Figures/mih_paper_figures.pptx
@@ -5,7 +5,7 @@
     <p:sldMasterId id="2147483648" r:id="rId1"/>
   </p:sldMasterIdLst>
   <p:notesMasterIdLst>
-    <p:notesMasterId r:id="rId10"/>
+    <p:notesMasterId r:id="rId11"/>
   </p:notesMasterIdLst>
   <p:sldIdLst>
     <p:sldId id="263" r:id="rId2"/>
@@ -13,9 +13,10 @@
     <p:sldId id="262" r:id="rId4"/>
     <p:sldId id="256" r:id="rId5"/>
     <p:sldId id="257" r:id="rId6"/>
-    <p:sldId id="258" r:id="rId7"/>
-    <p:sldId id="260" r:id="rId8"/>
-    <p:sldId id="261" r:id="rId9"/>
+    <p:sldId id="265" r:id="rId7"/>
+    <p:sldId id="258" r:id="rId8"/>
+    <p:sldId id="260" r:id="rId9"/>
+    <p:sldId id="261" r:id="rId10"/>
   </p:sldIdLst>
   <p:sldSz cx="12192000" cy="6858000"/>
   <p:notesSz cx="6858000" cy="9144000"/>
@@ -204,7 +205,7 @@
           <a:p>
             <a:fld id="{11D58CBC-377E-2D41-95A0-D5F6A72FAB78}" type="datetimeFigureOut">
               <a:rPr lang="en-US" smtClean="0"/>
-              <a:t>6/7/2019</a:t>
+              <a:t>6/10/2019</a:t>
             </a:fld>
             <a:endParaRPr lang="en-US"/>
           </a:p>
@@ -921,7 +922,7 @@
           <a:p>
             <a:fld id="{73BA172E-C57C-264D-B2C4-609C1A08C911}" type="slidenum">
               <a:rPr lang="en-US" smtClean="0"/>
-              <a:t>6</a:t>
+              <a:t>7</a:t>
             </a:fld>
             <a:endParaRPr lang="en-US"/>
           </a:p>
@@ -1008,7 +1009,7 @@
           <a:p>
             <a:fld id="{73BA172E-C57C-264D-B2C4-609C1A08C911}" type="slidenum">
               <a:rPr lang="en-US" smtClean="0"/>
-              <a:t>7</a:t>
+              <a:t>8</a:t>
             </a:fld>
             <a:endParaRPr lang="en-US"/>
           </a:p>
@@ -1095,7 +1096,7 @@
           <a:p>
             <a:fld id="{73BA172E-C57C-264D-B2C4-609C1A08C911}" type="slidenum">
               <a:rPr lang="en-US" smtClean="0"/>
-              <a:t>8</a:t>
+              <a:t>9</a:t>
             </a:fld>
             <a:endParaRPr lang="en-US"/>
           </a:p>
@@ -1261,7 +1262,7 @@
           <a:p>
             <a:fld id="{2B014276-E290-3448-B189-1B145A2DBC63}" type="datetimeFigureOut">
               <a:rPr lang="en-US" smtClean="0"/>
-              <a:t>6/7/2019</a:t>
+              <a:t>6/10/2019</a:t>
             </a:fld>
             <a:endParaRPr lang="en-US"/>
           </a:p>
@@ -1459,7 +1460,7 @@
           <a:p>
             <a:fld id="{2B014276-E290-3448-B189-1B145A2DBC63}" type="datetimeFigureOut">
               <a:rPr lang="en-US" smtClean="0"/>
-              <a:t>6/7/2019</a:t>
+              <a:t>6/10/2019</a:t>
             </a:fld>
             <a:endParaRPr lang="en-US"/>
           </a:p>
@@ -1667,7 +1668,7 @@
           <a:p>
             <a:fld id="{2B014276-E290-3448-B189-1B145A2DBC63}" type="datetimeFigureOut">
               <a:rPr lang="en-US" smtClean="0"/>
-              <a:t>6/7/2019</a:t>
+              <a:t>6/10/2019</a:t>
             </a:fld>
             <a:endParaRPr lang="en-US"/>
           </a:p>
@@ -1865,7 +1866,7 @@
           <a:p>
             <a:fld id="{2B014276-E290-3448-B189-1B145A2DBC63}" type="datetimeFigureOut">
               <a:rPr lang="en-US" smtClean="0"/>
-              <a:t>6/7/2019</a:t>
+              <a:t>6/10/2019</a:t>
             </a:fld>
             <a:endParaRPr lang="en-US"/>
           </a:p>
@@ -2140,7 +2141,7 @@
           <a:p>
             <a:fld id="{2B014276-E290-3448-B189-1B145A2DBC63}" type="datetimeFigureOut">
               <a:rPr lang="en-US" smtClean="0"/>
-              <a:t>6/7/2019</a:t>
+              <a:t>6/10/2019</a:t>
             </a:fld>
             <a:endParaRPr lang="en-US"/>
           </a:p>
@@ -2405,7 +2406,7 @@
           <a:p>
             <a:fld id="{2B014276-E290-3448-B189-1B145A2DBC63}" type="datetimeFigureOut">
               <a:rPr lang="en-US" smtClean="0"/>
-              <a:t>6/7/2019</a:t>
+              <a:t>6/10/2019</a:t>
             </a:fld>
             <a:endParaRPr lang="en-US"/>
           </a:p>
@@ -2817,7 +2818,7 @@
           <a:p>
             <a:fld id="{2B014276-E290-3448-B189-1B145A2DBC63}" type="datetimeFigureOut">
               <a:rPr lang="en-US" smtClean="0"/>
-              <a:t>6/7/2019</a:t>
+              <a:t>6/10/2019</a:t>
             </a:fld>
             <a:endParaRPr lang="en-US"/>
           </a:p>
@@ -2958,7 +2959,7 @@
           <a:p>
             <a:fld id="{2B014276-E290-3448-B189-1B145A2DBC63}" type="datetimeFigureOut">
               <a:rPr lang="en-US" smtClean="0"/>
-              <a:t>6/7/2019</a:t>
+              <a:t>6/10/2019</a:t>
             </a:fld>
             <a:endParaRPr lang="en-US"/>
           </a:p>
@@ -3071,7 +3072,7 @@
           <a:p>
             <a:fld id="{2B014276-E290-3448-B189-1B145A2DBC63}" type="datetimeFigureOut">
               <a:rPr lang="en-US" smtClean="0"/>
-              <a:t>6/7/2019</a:t>
+              <a:t>6/10/2019</a:t>
             </a:fld>
             <a:endParaRPr lang="en-US"/>
           </a:p>
@@ -3382,7 +3383,7 @@
           <a:p>
             <a:fld id="{2B014276-E290-3448-B189-1B145A2DBC63}" type="datetimeFigureOut">
               <a:rPr lang="en-US" smtClean="0"/>
-              <a:t>6/7/2019</a:t>
+              <a:t>6/10/2019</a:t>
             </a:fld>
             <a:endParaRPr lang="en-US"/>
           </a:p>
@@ -3670,7 +3671,7 @@
           <a:p>
             <a:fld id="{2B014276-E290-3448-B189-1B145A2DBC63}" type="datetimeFigureOut">
               <a:rPr lang="en-US" smtClean="0"/>
-              <a:t>6/7/2019</a:t>
+              <a:t>6/10/2019</a:t>
             </a:fld>
             <a:endParaRPr lang="en-US"/>
           </a:p>
@@ -3911,7 +3912,7 @@
           <a:p>
             <a:fld id="{2B014276-E290-3448-B189-1B145A2DBC63}" type="datetimeFigureOut">
               <a:rPr lang="en-US" smtClean="0"/>
-              <a:t>6/7/2019</a:t>
+              <a:t>6/10/2019</a:t>
             </a:fld>
             <a:endParaRPr lang="en-US"/>
           </a:p>
@@ -10463,11 +10464,11 @@
   <p:clrMapOvr>
     <a:masterClrMapping/>
   </p:clrMapOvr>
-  <mc:AlternateContent xmlns:mc="http://schemas.openxmlformats.org/markup-compatibility/2006">
-    <mc:Choice xmlns:p14="http://schemas.microsoft.com/office/powerpoint/2010/main" Requires="p14">
+  <mc:AlternateContent xmlns:mc="http://schemas.openxmlformats.org/markup-compatibility/2006" xmlns:p14="http://schemas.microsoft.com/office/powerpoint/2010/main">
+    <mc:Choice Requires="p14">
       <p:transition spd="slow" p14:dur="2000"/>
     </mc:Choice>
-    <mc:Fallback>
+    <mc:Fallback xmlns="">
       <p:transition spd="slow"/>
     </mc:Fallback>
   </mc:AlternateContent>
@@ -10976,7 +10977,7 @@
             <a:avLst/>
           </a:prstGeom>
           <a:solidFill>
-            <a:schemeClr val="accent6">
+            <a:schemeClr val="accent5">
               <a:lumMod val="75000"/>
             </a:schemeClr>
           </a:solidFill>
@@ -11241,11 +11242,7 @@
             </a:r>
             <a:r>
               <a:rPr lang="en-US" sz="1400" dirty="0" smtClean="0"/>
-              <a:t> (</a:t>
-            </a:r>
-            <a:r>
-              <a:rPr lang="en-US" sz="1400" dirty="0" smtClean="0"/>
-              <a:t>Species)</a:t>
+              <a:t> (Species)</a:t>
             </a:r>
             <a:endParaRPr lang="en-US" sz="1400" dirty="0"/>
           </a:p>
@@ -13590,58 +13587,21 @@
       </p:grpSpPr>
       <p:pic>
         <p:nvPicPr>
-          <p:cNvPr id="3" name="Picture 2">
-            <a:extLst>
-              <a:ext uri="{FF2B5EF4-FFF2-40B4-BE49-F238E27FC236}">
-                <a16:creationId xmlns:a16="http://schemas.microsoft.com/office/drawing/2014/main" id="{39AED75D-FCD6-5F4D-8392-D5ACDDE8EDB8}"/>
-              </a:ext>
-            </a:extLst>
-          </p:cNvPr>
+          <p:cNvPr id="4" name="Picture 3"/>
           <p:cNvPicPr>
             <a:picLocks noChangeAspect="1"/>
           </p:cNvPicPr>
           <p:nvPr/>
         </p:nvPicPr>
-        <p:blipFill>
-          <a:blip r:embed="rId3"/>
-          <a:stretch>
-            <a:fillRect/>
-          </a:stretch>
+        <p:blipFill rotWithShape="1">
+          <a:blip r:embed="rId2"/>
+          <a:srcRect l="19388" b="15347"/>
+          <a:stretch/>
         </p:blipFill>
         <p:spPr>
           <a:xfrm>
-            <a:off x="6665386" y="1143000"/>
-            <a:ext cx="4792133" cy="3594100"/>
-          </a:xfrm>
-          <a:prstGeom prst="rect">
-            <a:avLst/>
-          </a:prstGeom>
-        </p:spPr>
-      </p:pic>
-      <p:pic>
-        <p:nvPicPr>
-          <p:cNvPr id="7" name="Picture 6">
-            <a:extLst>
-              <a:ext uri="{FF2B5EF4-FFF2-40B4-BE49-F238E27FC236}">
-                <a16:creationId xmlns:a16="http://schemas.microsoft.com/office/drawing/2014/main" id="{658548A7-989D-BA45-88BF-8E5C03BB7667}"/>
-              </a:ext>
-            </a:extLst>
-          </p:cNvPr>
-          <p:cNvPicPr>
-            <a:picLocks noChangeAspect="1"/>
-          </p:cNvPicPr>
-          <p:nvPr/>
-        </p:nvPicPr>
-        <p:blipFill>
-          <a:blip r:embed="rId4"/>
-          <a:stretch>
-            <a:fillRect/>
-          </a:stretch>
-        </p:blipFill>
-        <p:spPr>
-          <a:xfrm>
-            <a:off x="699557" y="1511300"/>
-            <a:ext cx="5722441" cy="2857500"/>
+            <a:off x="3898019" y="1293327"/>
+            <a:ext cx="4652475" cy="3958525"/>
           </a:xfrm>
           <a:prstGeom prst="rect">
             <a:avLst/>
@@ -13651,7 +13611,7 @@
     </p:spTree>
     <p:extLst>
       <p:ext uri="{BB962C8B-B14F-4D97-AF65-F5344CB8AC3E}">
-        <p14:creationId xmlns:p14="http://schemas.microsoft.com/office/powerpoint/2010/main" val="1759725491"/>
+        <p14:creationId xmlns:p14="http://schemas.microsoft.com/office/powerpoint/2010/main" val="3707055965"/>
       </p:ext>
     </p:extLst>
   </p:cSld>
@@ -13680,6 +13640,96 @@
       </p:grpSpPr>
       <p:pic>
         <p:nvPicPr>
+          <p:cNvPr id="3" name="Picture 2">
+            <a:extLst>
+              <a:ext uri="{FF2B5EF4-FFF2-40B4-BE49-F238E27FC236}">
+                <a16:creationId xmlns:a16="http://schemas.microsoft.com/office/drawing/2014/main" id="{39AED75D-FCD6-5F4D-8392-D5ACDDE8EDB8}"/>
+              </a:ext>
+            </a:extLst>
+          </p:cNvPr>
+          <p:cNvPicPr>
+            <a:picLocks noChangeAspect="1"/>
+          </p:cNvPicPr>
+          <p:nvPr/>
+        </p:nvPicPr>
+        <p:blipFill>
+          <a:blip r:embed="rId3"/>
+          <a:stretch>
+            <a:fillRect/>
+          </a:stretch>
+        </p:blipFill>
+        <p:spPr>
+          <a:xfrm>
+            <a:off x="6665386" y="1143000"/>
+            <a:ext cx="4792133" cy="3594100"/>
+          </a:xfrm>
+          <a:prstGeom prst="rect">
+            <a:avLst/>
+          </a:prstGeom>
+        </p:spPr>
+      </p:pic>
+      <p:pic>
+        <p:nvPicPr>
+          <p:cNvPr id="7" name="Picture 6">
+            <a:extLst>
+              <a:ext uri="{FF2B5EF4-FFF2-40B4-BE49-F238E27FC236}">
+                <a16:creationId xmlns:a16="http://schemas.microsoft.com/office/drawing/2014/main" id="{658548A7-989D-BA45-88BF-8E5C03BB7667}"/>
+              </a:ext>
+            </a:extLst>
+          </p:cNvPr>
+          <p:cNvPicPr>
+            <a:picLocks noChangeAspect="1"/>
+          </p:cNvPicPr>
+          <p:nvPr/>
+        </p:nvPicPr>
+        <p:blipFill>
+          <a:blip r:embed="rId4"/>
+          <a:stretch>
+            <a:fillRect/>
+          </a:stretch>
+        </p:blipFill>
+        <p:spPr>
+          <a:xfrm>
+            <a:off x="699557" y="1511300"/>
+            <a:ext cx="5722441" cy="2857500"/>
+          </a:xfrm>
+          <a:prstGeom prst="rect">
+            <a:avLst/>
+          </a:prstGeom>
+        </p:spPr>
+      </p:pic>
+    </p:spTree>
+    <p:extLst>
+      <p:ext uri="{BB962C8B-B14F-4D97-AF65-F5344CB8AC3E}">
+        <p14:creationId xmlns:p14="http://schemas.microsoft.com/office/powerpoint/2010/main" val="1759725491"/>
+      </p:ext>
+    </p:extLst>
+  </p:cSld>
+  <p:clrMapOvr>
+    <a:masterClrMapping/>
+  </p:clrMapOvr>
+</p:sld>
+</file>
+
+<file path=ppt/slides/slide8.xml><?xml version="1.0" encoding="utf-8"?>
+<p:sld xmlns:a="http://schemas.openxmlformats.org/drawingml/2006/main" xmlns:r="http://schemas.openxmlformats.org/officeDocument/2006/relationships" xmlns:p="http://schemas.openxmlformats.org/presentationml/2006/main">
+  <p:cSld>
+    <p:spTree>
+      <p:nvGrpSpPr>
+        <p:cNvPr id="1" name=""/>
+        <p:cNvGrpSpPr/>
+        <p:nvPr/>
+      </p:nvGrpSpPr>
+      <p:grpSpPr>
+        <a:xfrm>
+          <a:off x="0" y="0"/>
+          <a:ext cx="0" cy="0"/>
+          <a:chOff x="0" y="0"/>
+          <a:chExt cx="0" cy="0"/>
+        </a:xfrm>
+      </p:grpSpPr>
+      <p:pic>
+        <p:nvPicPr>
           <p:cNvPr id="5" name="Picture 4">
             <a:extLst>
               <a:ext uri="{FF2B5EF4-FFF2-40B4-BE49-F238E27FC236}">
@@ -13721,7 +13771,7 @@
 </p:sld>
 </file>
 
-<file path=ppt/slides/slide8.xml><?xml version="1.0" encoding="utf-8"?>
+<file path=ppt/slides/slide9.xml><?xml version="1.0" encoding="utf-8"?>
 <p:sld xmlns:a="http://schemas.openxmlformats.org/drawingml/2006/main" xmlns:r="http://schemas.openxmlformats.org/officeDocument/2006/relationships" xmlns:p="http://schemas.openxmlformats.org/presentationml/2006/main">
   <p:cSld>
     <p:spTree>

</xml_diff>

<commit_message>
working on bbc figs
</commit_message>
<xml_diff>
--- a/Figures/mih_paper_figures.pptx
+++ b/Figures/mih_paper_figures.pptx
@@ -5,18 +5,17 @@
     <p:sldMasterId id="2147483648" r:id="rId1"/>
   </p:sldMasterIdLst>
   <p:notesMasterIdLst>
-    <p:notesMasterId r:id="rId11"/>
+    <p:notesMasterId r:id="rId10"/>
   </p:notesMasterIdLst>
   <p:sldIdLst>
     <p:sldId id="263" r:id="rId2"/>
     <p:sldId id="264" r:id="rId3"/>
     <p:sldId id="262" r:id="rId4"/>
     <p:sldId id="256" r:id="rId5"/>
-    <p:sldId id="257" r:id="rId6"/>
-    <p:sldId id="265" r:id="rId7"/>
-    <p:sldId id="258" r:id="rId8"/>
-    <p:sldId id="260" r:id="rId9"/>
-    <p:sldId id="261" r:id="rId10"/>
+    <p:sldId id="265" r:id="rId6"/>
+    <p:sldId id="258" r:id="rId7"/>
+    <p:sldId id="260" r:id="rId8"/>
+    <p:sldId id="261" r:id="rId9"/>
   </p:sldIdLst>
   <p:sldSz cx="12192000" cy="6858000"/>
   <p:notesSz cx="6858000" cy="9144000"/>
@@ -781,93 +780,6 @@
           <a:p>
             <a:r>
               <a:rPr lang="en-US" dirty="0"/>
-              <a:t>More specialization figure, niche position and traits (NDVI niche and foraging niche)</a:t>
-            </a:r>
-          </a:p>
-        </p:txBody>
-      </p:sp>
-      <p:sp>
-        <p:nvSpPr>
-          <p:cNvPr id="4" name="Slide Number Placeholder 3"/>
-          <p:cNvSpPr>
-            <a:spLocks noGrp="1"/>
-          </p:cNvSpPr>
-          <p:nvPr>
-            <p:ph type="sldNum" sz="quarter" idx="5"/>
-          </p:nvPr>
-        </p:nvSpPr>
-        <p:spPr/>
-        <p:txBody>
-          <a:bodyPr/>
-          <a:lstStyle/>
-          <a:p>
-            <a:fld id="{73BA172E-C57C-264D-B2C4-609C1A08C911}" type="slidenum">
-              <a:rPr lang="en-US" smtClean="0"/>
-              <a:t>5</a:t>
-            </a:fld>
-            <a:endParaRPr lang="en-US"/>
-          </a:p>
-        </p:txBody>
-      </p:sp>
-    </p:spTree>
-    <p:extLst>
-      <p:ext uri="{BB962C8B-B14F-4D97-AF65-F5344CB8AC3E}">
-        <p14:creationId xmlns:p14="http://schemas.microsoft.com/office/powerpoint/2010/main" val="3187256041"/>
-      </p:ext>
-    </p:extLst>
-  </p:cSld>
-  <p:clrMapOvr>
-    <a:masterClrMapping/>
-  </p:clrMapOvr>
-</p:notes>
-</file>
-
-<file path=ppt/notesSlides/notesSlide5.xml><?xml version="1.0" encoding="utf-8"?>
-<p:notes xmlns:a="http://schemas.openxmlformats.org/drawingml/2006/main" xmlns:r="http://schemas.openxmlformats.org/officeDocument/2006/relationships" xmlns:p="http://schemas.openxmlformats.org/presentationml/2006/main">
-  <p:cSld>
-    <p:spTree>
-      <p:nvGrpSpPr>
-        <p:cNvPr id="1" name=""/>
-        <p:cNvGrpSpPr/>
-        <p:nvPr/>
-      </p:nvGrpSpPr>
-      <p:grpSpPr>
-        <a:xfrm>
-          <a:off x="0" y="0"/>
-          <a:ext cx="0" cy="0"/>
-          <a:chOff x="0" y="0"/>
-          <a:chExt cx="0" cy="0"/>
-        </a:xfrm>
-      </p:grpSpPr>
-      <p:sp>
-        <p:nvSpPr>
-          <p:cNvPr id="2" name="Slide Image Placeholder 1"/>
-          <p:cNvSpPr>
-            <a:spLocks noGrp="1" noRot="1" noChangeAspect="1"/>
-          </p:cNvSpPr>
-          <p:nvPr>
-            <p:ph type="sldImg"/>
-          </p:nvPr>
-        </p:nvSpPr>
-        <p:spPr/>
-      </p:sp>
-      <p:sp>
-        <p:nvSpPr>
-          <p:cNvPr id="3" name="Notes Placeholder 2"/>
-          <p:cNvSpPr>
-            <a:spLocks noGrp="1"/>
-          </p:cNvSpPr>
-          <p:nvPr>
-            <p:ph type="body" idx="1"/>
-          </p:nvPr>
-        </p:nvSpPr>
-        <p:spPr/>
-        <p:txBody>
-          <a:bodyPr/>
-          <a:lstStyle/>
-          <a:p>
-            <a:r>
-              <a:rPr lang="en-US" dirty="0"/>
               <a:t>Null model figure (option 1: z score plots): 1</a:t>
             </a:r>
             <a:r>
@@ -922,7 +834,7 @@
           <a:p>
             <a:fld id="{73BA172E-C57C-264D-B2C4-609C1A08C911}" type="slidenum">
               <a:rPr lang="en-US" smtClean="0"/>
-              <a:t>7</a:t>
+              <a:t>6</a:t>
             </a:fld>
             <a:endParaRPr lang="en-US"/>
           </a:p>
@@ -932,6 +844,93 @@
     <p:extLst>
       <p:ext uri="{BB962C8B-B14F-4D97-AF65-F5344CB8AC3E}">
         <p14:creationId xmlns:p14="http://schemas.microsoft.com/office/powerpoint/2010/main" val="1266774042"/>
+      </p:ext>
+    </p:extLst>
+  </p:cSld>
+  <p:clrMapOvr>
+    <a:masterClrMapping/>
+  </p:clrMapOvr>
+</p:notes>
+</file>
+
+<file path=ppt/notesSlides/notesSlide5.xml><?xml version="1.0" encoding="utf-8"?>
+<p:notes xmlns:a="http://schemas.openxmlformats.org/drawingml/2006/main" xmlns:r="http://schemas.openxmlformats.org/officeDocument/2006/relationships" xmlns:p="http://schemas.openxmlformats.org/presentationml/2006/main">
+  <p:cSld>
+    <p:spTree>
+      <p:nvGrpSpPr>
+        <p:cNvPr id="1" name=""/>
+        <p:cNvGrpSpPr/>
+        <p:nvPr/>
+      </p:nvGrpSpPr>
+      <p:grpSpPr>
+        <a:xfrm>
+          <a:off x="0" y="0"/>
+          <a:ext cx="0" cy="0"/>
+          <a:chOff x="0" y="0"/>
+          <a:chExt cx="0" cy="0"/>
+        </a:xfrm>
+      </p:grpSpPr>
+      <p:sp>
+        <p:nvSpPr>
+          <p:cNvPr id="2" name="Slide Image Placeholder 1"/>
+          <p:cNvSpPr>
+            <a:spLocks noGrp="1" noRot="1" noChangeAspect="1"/>
+          </p:cNvSpPr>
+          <p:nvPr>
+            <p:ph type="sldImg"/>
+          </p:nvPr>
+        </p:nvSpPr>
+        <p:spPr/>
+      </p:sp>
+      <p:sp>
+        <p:nvSpPr>
+          <p:cNvPr id="3" name="Notes Placeholder 2"/>
+          <p:cNvSpPr>
+            <a:spLocks noGrp="1"/>
+          </p:cNvSpPr>
+          <p:nvPr>
+            <p:ph type="body" idx="1"/>
+          </p:nvPr>
+        </p:nvSpPr>
+        <p:spPr/>
+        <p:txBody>
+          <a:bodyPr/>
+          <a:lstStyle/>
+          <a:p>
+            <a:r>
+              <a:rPr lang="en-US" dirty="0"/>
+              <a:t>Supplemental figures – BBC locations and E(S) vs. site area</a:t>
+            </a:r>
+          </a:p>
+        </p:txBody>
+      </p:sp>
+      <p:sp>
+        <p:nvSpPr>
+          <p:cNvPr id="4" name="Slide Number Placeholder 3"/>
+          <p:cNvSpPr>
+            <a:spLocks noGrp="1"/>
+          </p:cNvSpPr>
+          <p:nvPr>
+            <p:ph type="sldNum" sz="quarter" idx="5"/>
+          </p:nvPr>
+        </p:nvSpPr>
+        <p:spPr/>
+        <p:txBody>
+          <a:bodyPr/>
+          <a:lstStyle/>
+          <a:p>
+            <a:fld id="{73BA172E-C57C-264D-B2C4-609C1A08C911}" type="slidenum">
+              <a:rPr lang="en-US" smtClean="0"/>
+              <a:t>7</a:t>
+            </a:fld>
+            <a:endParaRPr lang="en-US"/>
+          </a:p>
+        </p:txBody>
+      </p:sp>
+    </p:spTree>
+    <p:extLst>
+      <p:ext uri="{BB962C8B-B14F-4D97-AF65-F5344CB8AC3E}">
+        <p14:creationId xmlns:p14="http://schemas.microsoft.com/office/powerpoint/2010/main" val="476422590"/>
       </p:ext>
     </p:extLst>
   </p:cSld>
@@ -987,7 +986,7 @@
           <a:p>
             <a:r>
               <a:rPr lang="en-US" dirty="0"/>
-              <a:t>Supplemental figures – BBC locations and E(S) vs. site area</a:t>
+              <a:t>Supplemental figure: why are we omitting BBS routes with &gt; 50% agricultural land cover</a:t>
             </a:r>
           </a:p>
         </p:txBody>
@@ -1010,93 +1009,6 @@
             <a:fld id="{73BA172E-C57C-264D-B2C4-609C1A08C911}" type="slidenum">
               <a:rPr lang="en-US" smtClean="0"/>
               <a:t>8</a:t>
-            </a:fld>
-            <a:endParaRPr lang="en-US"/>
-          </a:p>
-        </p:txBody>
-      </p:sp>
-    </p:spTree>
-    <p:extLst>
-      <p:ext uri="{BB962C8B-B14F-4D97-AF65-F5344CB8AC3E}">
-        <p14:creationId xmlns:p14="http://schemas.microsoft.com/office/powerpoint/2010/main" val="476422590"/>
-      </p:ext>
-    </p:extLst>
-  </p:cSld>
-  <p:clrMapOvr>
-    <a:masterClrMapping/>
-  </p:clrMapOvr>
-</p:notes>
-</file>
-
-<file path=ppt/notesSlides/notesSlide7.xml><?xml version="1.0" encoding="utf-8"?>
-<p:notes xmlns:a="http://schemas.openxmlformats.org/drawingml/2006/main" xmlns:r="http://schemas.openxmlformats.org/officeDocument/2006/relationships" xmlns:p="http://schemas.openxmlformats.org/presentationml/2006/main">
-  <p:cSld>
-    <p:spTree>
-      <p:nvGrpSpPr>
-        <p:cNvPr id="1" name=""/>
-        <p:cNvGrpSpPr/>
-        <p:nvPr/>
-      </p:nvGrpSpPr>
-      <p:grpSpPr>
-        <a:xfrm>
-          <a:off x="0" y="0"/>
-          <a:ext cx="0" cy="0"/>
-          <a:chOff x="0" y="0"/>
-          <a:chExt cx="0" cy="0"/>
-        </a:xfrm>
-      </p:grpSpPr>
-      <p:sp>
-        <p:nvSpPr>
-          <p:cNvPr id="2" name="Slide Image Placeholder 1"/>
-          <p:cNvSpPr>
-            <a:spLocks noGrp="1" noRot="1" noChangeAspect="1"/>
-          </p:cNvSpPr>
-          <p:nvPr>
-            <p:ph type="sldImg"/>
-          </p:nvPr>
-        </p:nvSpPr>
-        <p:spPr/>
-      </p:sp>
-      <p:sp>
-        <p:nvSpPr>
-          <p:cNvPr id="3" name="Notes Placeholder 2"/>
-          <p:cNvSpPr>
-            <a:spLocks noGrp="1"/>
-          </p:cNvSpPr>
-          <p:nvPr>
-            <p:ph type="body" idx="1"/>
-          </p:nvPr>
-        </p:nvSpPr>
-        <p:spPr/>
-        <p:txBody>
-          <a:bodyPr/>
-          <a:lstStyle/>
-          <a:p>
-            <a:r>
-              <a:rPr lang="en-US" dirty="0"/>
-              <a:t>Supplemental figure: why are we omitting BBS routes with &gt; 50% agricultural land cover</a:t>
-            </a:r>
-          </a:p>
-        </p:txBody>
-      </p:sp>
-      <p:sp>
-        <p:nvSpPr>
-          <p:cNvPr id="4" name="Slide Number Placeholder 3"/>
-          <p:cNvSpPr>
-            <a:spLocks noGrp="1"/>
-          </p:cNvSpPr>
-          <p:nvPr>
-            <p:ph type="sldNum" sz="quarter" idx="5"/>
-          </p:nvPr>
-        </p:nvSpPr>
-        <p:spPr/>
-        <p:txBody>
-          <a:bodyPr/>
-          <a:lstStyle/>
-          <a:p>
-            <a:fld id="{73BA172E-C57C-264D-B2C4-609C1A08C911}" type="slidenum">
-              <a:rPr lang="en-US" smtClean="0"/>
-              <a:t>9</a:t>
             </a:fld>
             <a:endParaRPr lang="en-US"/>
           </a:p>
@@ -13258,13 +13170,7 @@
       </p:pic>
       <p:pic>
         <p:nvPicPr>
-          <p:cNvPr id="3" name="Picture 2">
-            <a:extLst>
-              <a:ext uri="{FF2B5EF4-FFF2-40B4-BE49-F238E27FC236}">
-                <a16:creationId xmlns:a16="http://schemas.microsoft.com/office/drawing/2014/main" id="{993959B8-4A2D-F343-B79A-26CD9A5C13FE}"/>
-              </a:ext>
-            </a:extLst>
-          </p:cNvPr>
+          <p:cNvPr id="4" name="Picture 3"/>
           <p:cNvPicPr>
             <a:picLocks noChangeAspect="1"/>
           </p:cNvPicPr>
@@ -13278,8 +13184,8 @@
         </p:blipFill>
         <p:spPr>
           <a:xfrm>
-            <a:off x="5173933" y="1562100"/>
-            <a:ext cx="2918214" cy="2143145"/>
+            <a:off x="5448300" y="1562100"/>
+            <a:ext cx="2891241" cy="2342573"/>
           </a:xfrm>
           <a:prstGeom prst="rect">
             <a:avLst/>
@@ -13438,117 +13344,22 @@
       </p:grpSpPr>
       <p:pic>
         <p:nvPicPr>
-          <p:cNvPr id="5" name="Picture 4">
-            <a:extLst>
-              <a:ext uri="{FF2B5EF4-FFF2-40B4-BE49-F238E27FC236}">
-                <a16:creationId xmlns:a16="http://schemas.microsoft.com/office/drawing/2014/main" id="{5F6C56C1-4C88-D843-8C77-3648A4825D8A}"/>
-              </a:ext>
-            </a:extLst>
-          </p:cNvPr>
+          <p:cNvPr id="3" name="Picture 2"/>
           <p:cNvPicPr>
             <a:picLocks noChangeAspect="1"/>
           </p:cNvPicPr>
           <p:nvPr/>
         </p:nvPicPr>
         <p:blipFill>
-          <a:blip r:embed="rId3"/>
+          <a:blip r:embed="rId2"/>
           <a:stretch>
             <a:fillRect/>
           </a:stretch>
         </p:blipFill>
         <p:spPr>
           <a:xfrm>
-            <a:off x="5662712" y="285750"/>
-            <a:ext cx="4749800" cy="3562350"/>
-          </a:xfrm>
-          <a:prstGeom prst="rect">
-            <a:avLst/>
-          </a:prstGeom>
-        </p:spPr>
-      </p:pic>
-      <p:pic>
-        <p:nvPicPr>
-          <p:cNvPr id="7" name="Picture 6">
-            <a:extLst>
-              <a:ext uri="{FF2B5EF4-FFF2-40B4-BE49-F238E27FC236}">
-                <a16:creationId xmlns:a16="http://schemas.microsoft.com/office/drawing/2014/main" id="{D297DA3D-CA05-2E45-92C6-8138049BBA3D}"/>
-              </a:ext>
-            </a:extLst>
-          </p:cNvPr>
-          <p:cNvPicPr>
-            <a:picLocks noChangeAspect="1"/>
-          </p:cNvPicPr>
-          <p:nvPr/>
-        </p:nvPicPr>
-        <p:blipFill rotWithShape="1">
-          <a:blip r:embed="rId4"/>
-          <a:srcRect r="31436"/>
-          <a:stretch/>
-        </p:blipFill>
-        <p:spPr>
-          <a:xfrm>
-            <a:off x="912913" y="3664518"/>
-            <a:ext cx="4749799" cy="3193482"/>
-          </a:xfrm>
-          <a:prstGeom prst="rect">
-            <a:avLst/>
-          </a:prstGeom>
-        </p:spPr>
-      </p:pic>
-      <p:pic>
-        <p:nvPicPr>
-          <p:cNvPr id="9" name="Picture 8">
-            <a:extLst>
-              <a:ext uri="{FF2B5EF4-FFF2-40B4-BE49-F238E27FC236}">
-                <a16:creationId xmlns:a16="http://schemas.microsoft.com/office/drawing/2014/main" id="{B952AAAC-0974-AB46-A471-B662741D5CEC}"/>
-              </a:ext>
-            </a:extLst>
-          </p:cNvPr>
-          <p:cNvPicPr>
-            <a:picLocks noChangeAspect="1"/>
-          </p:cNvPicPr>
-          <p:nvPr/>
-        </p:nvPicPr>
-        <p:blipFill>
-          <a:blip r:embed="rId5"/>
-          <a:stretch>
-            <a:fillRect/>
-          </a:stretch>
-        </p:blipFill>
-        <p:spPr>
-          <a:xfrm>
-            <a:off x="960967" y="285750"/>
-            <a:ext cx="4580466" cy="3435350"/>
-          </a:xfrm>
-          <a:prstGeom prst="rect">
-            <a:avLst/>
-          </a:prstGeom>
-        </p:spPr>
-      </p:pic>
-      <p:pic>
-        <p:nvPicPr>
-          <p:cNvPr id="11" name="Picture 10">
-            <a:extLst>
-              <a:ext uri="{FF2B5EF4-FFF2-40B4-BE49-F238E27FC236}">
-                <a16:creationId xmlns:a16="http://schemas.microsoft.com/office/drawing/2014/main" id="{174183A7-954D-5646-B1A2-941CCA4E8CE9}"/>
-              </a:ext>
-            </a:extLst>
-          </p:cNvPr>
-          <p:cNvPicPr>
-            <a:picLocks noChangeAspect="1"/>
-          </p:cNvPicPr>
-          <p:nvPr/>
-        </p:nvPicPr>
-        <p:blipFill>
-          <a:blip r:embed="rId6"/>
-          <a:stretch>
-            <a:fillRect/>
-          </a:stretch>
-        </p:blipFill>
-        <p:spPr>
-          <a:xfrm>
-            <a:off x="5662712" y="3848100"/>
-            <a:ext cx="6529288" cy="3009900"/>
+            <a:off x="1095376" y="133350"/>
+            <a:ext cx="10380428" cy="6591301"/>
           </a:xfrm>
           <a:prstGeom prst="rect">
             <a:avLst/>
@@ -13558,7 +13369,7 @@
     </p:spTree>
     <p:extLst>
       <p:ext uri="{BB962C8B-B14F-4D97-AF65-F5344CB8AC3E}">
-        <p14:creationId xmlns:p14="http://schemas.microsoft.com/office/powerpoint/2010/main" val="2203894193"/>
+        <p14:creationId xmlns:p14="http://schemas.microsoft.com/office/powerpoint/2010/main" val="3707055965"/>
       </p:ext>
     </p:extLst>
   </p:cSld>
@@ -13587,21 +13398,58 @@
       </p:grpSpPr>
       <p:pic>
         <p:nvPicPr>
-          <p:cNvPr id="4" name="Picture 3"/>
+          <p:cNvPr id="3" name="Picture 2">
+            <a:extLst>
+              <a:ext uri="{FF2B5EF4-FFF2-40B4-BE49-F238E27FC236}">
+                <a16:creationId xmlns:a16="http://schemas.microsoft.com/office/drawing/2014/main" id="{39AED75D-FCD6-5F4D-8392-D5ACDDE8EDB8}"/>
+              </a:ext>
+            </a:extLst>
+          </p:cNvPr>
           <p:cNvPicPr>
             <a:picLocks noChangeAspect="1"/>
           </p:cNvPicPr>
           <p:nvPr/>
         </p:nvPicPr>
-        <p:blipFill rotWithShape="1">
-          <a:blip r:embed="rId2"/>
-          <a:srcRect l="19388" b="15347"/>
-          <a:stretch/>
+        <p:blipFill>
+          <a:blip r:embed="rId3"/>
+          <a:stretch>
+            <a:fillRect/>
+          </a:stretch>
         </p:blipFill>
         <p:spPr>
           <a:xfrm>
-            <a:off x="3898019" y="1293327"/>
-            <a:ext cx="4652475" cy="3958525"/>
+            <a:off x="6665386" y="1143000"/>
+            <a:ext cx="4792133" cy="3594100"/>
+          </a:xfrm>
+          <a:prstGeom prst="rect">
+            <a:avLst/>
+          </a:prstGeom>
+        </p:spPr>
+      </p:pic>
+      <p:pic>
+        <p:nvPicPr>
+          <p:cNvPr id="7" name="Picture 6">
+            <a:extLst>
+              <a:ext uri="{FF2B5EF4-FFF2-40B4-BE49-F238E27FC236}">
+                <a16:creationId xmlns:a16="http://schemas.microsoft.com/office/drawing/2014/main" id="{658548A7-989D-BA45-88BF-8E5C03BB7667}"/>
+              </a:ext>
+            </a:extLst>
+          </p:cNvPr>
+          <p:cNvPicPr>
+            <a:picLocks noChangeAspect="1"/>
+          </p:cNvPicPr>
+          <p:nvPr/>
+        </p:nvPicPr>
+        <p:blipFill>
+          <a:blip r:embed="rId4"/>
+          <a:stretch>
+            <a:fillRect/>
+          </a:stretch>
+        </p:blipFill>
+        <p:spPr>
+          <a:xfrm>
+            <a:off x="699557" y="1511300"/>
+            <a:ext cx="5722441" cy="2857500"/>
           </a:xfrm>
           <a:prstGeom prst="rect">
             <a:avLst/>
@@ -13611,7 +13459,7 @@
     </p:spTree>
     <p:extLst>
       <p:ext uri="{BB962C8B-B14F-4D97-AF65-F5344CB8AC3E}">
-        <p14:creationId xmlns:p14="http://schemas.microsoft.com/office/powerpoint/2010/main" val="3707055965"/>
+        <p14:creationId xmlns:p14="http://schemas.microsoft.com/office/powerpoint/2010/main" val="1759725491"/>
       </p:ext>
     </p:extLst>
   </p:cSld>
@@ -13640,96 +13488,6 @@
       </p:grpSpPr>
       <p:pic>
         <p:nvPicPr>
-          <p:cNvPr id="3" name="Picture 2">
-            <a:extLst>
-              <a:ext uri="{FF2B5EF4-FFF2-40B4-BE49-F238E27FC236}">
-                <a16:creationId xmlns:a16="http://schemas.microsoft.com/office/drawing/2014/main" id="{39AED75D-FCD6-5F4D-8392-D5ACDDE8EDB8}"/>
-              </a:ext>
-            </a:extLst>
-          </p:cNvPr>
-          <p:cNvPicPr>
-            <a:picLocks noChangeAspect="1"/>
-          </p:cNvPicPr>
-          <p:nvPr/>
-        </p:nvPicPr>
-        <p:blipFill>
-          <a:blip r:embed="rId3"/>
-          <a:stretch>
-            <a:fillRect/>
-          </a:stretch>
-        </p:blipFill>
-        <p:spPr>
-          <a:xfrm>
-            <a:off x="6665386" y="1143000"/>
-            <a:ext cx="4792133" cy="3594100"/>
-          </a:xfrm>
-          <a:prstGeom prst="rect">
-            <a:avLst/>
-          </a:prstGeom>
-        </p:spPr>
-      </p:pic>
-      <p:pic>
-        <p:nvPicPr>
-          <p:cNvPr id="7" name="Picture 6">
-            <a:extLst>
-              <a:ext uri="{FF2B5EF4-FFF2-40B4-BE49-F238E27FC236}">
-                <a16:creationId xmlns:a16="http://schemas.microsoft.com/office/drawing/2014/main" id="{658548A7-989D-BA45-88BF-8E5C03BB7667}"/>
-              </a:ext>
-            </a:extLst>
-          </p:cNvPr>
-          <p:cNvPicPr>
-            <a:picLocks noChangeAspect="1"/>
-          </p:cNvPicPr>
-          <p:nvPr/>
-        </p:nvPicPr>
-        <p:blipFill>
-          <a:blip r:embed="rId4"/>
-          <a:stretch>
-            <a:fillRect/>
-          </a:stretch>
-        </p:blipFill>
-        <p:spPr>
-          <a:xfrm>
-            <a:off x="699557" y="1511300"/>
-            <a:ext cx="5722441" cy="2857500"/>
-          </a:xfrm>
-          <a:prstGeom prst="rect">
-            <a:avLst/>
-          </a:prstGeom>
-        </p:spPr>
-      </p:pic>
-    </p:spTree>
-    <p:extLst>
-      <p:ext uri="{BB962C8B-B14F-4D97-AF65-F5344CB8AC3E}">
-        <p14:creationId xmlns:p14="http://schemas.microsoft.com/office/powerpoint/2010/main" val="1759725491"/>
-      </p:ext>
-    </p:extLst>
-  </p:cSld>
-  <p:clrMapOvr>
-    <a:masterClrMapping/>
-  </p:clrMapOvr>
-</p:sld>
-</file>
-
-<file path=ppt/slides/slide8.xml><?xml version="1.0" encoding="utf-8"?>
-<p:sld xmlns:a="http://schemas.openxmlformats.org/drawingml/2006/main" xmlns:r="http://schemas.openxmlformats.org/officeDocument/2006/relationships" xmlns:p="http://schemas.openxmlformats.org/presentationml/2006/main">
-  <p:cSld>
-    <p:spTree>
-      <p:nvGrpSpPr>
-        <p:cNvPr id="1" name=""/>
-        <p:cNvGrpSpPr/>
-        <p:nvPr/>
-      </p:nvGrpSpPr>
-      <p:grpSpPr>
-        <a:xfrm>
-          <a:off x="0" y="0"/>
-          <a:ext cx="0" cy="0"/>
-          <a:chOff x="0" y="0"/>
-          <a:chExt cx="0" cy="0"/>
-        </a:xfrm>
-      </p:grpSpPr>
-      <p:pic>
-        <p:nvPicPr>
           <p:cNvPr id="5" name="Picture 4">
             <a:extLst>
               <a:ext uri="{FF2B5EF4-FFF2-40B4-BE49-F238E27FC236}">
@@ -13771,7 +13529,7 @@
 </p:sld>
 </file>
 
-<file path=ppt/slides/slide9.xml><?xml version="1.0" encoding="utf-8"?>
+<file path=ppt/slides/slide8.xml><?xml version="1.0" encoding="utf-8"?>
 <p:sld xmlns:a="http://schemas.openxmlformats.org/drawingml/2006/main" xmlns:r="http://schemas.openxmlformats.org/officeDocument/2006/relationships" xmlns:p="http://schemas.openxmlformats.org/presentationml/2006/main">
   <p:cSld>
     <p:spTree>

</xml_diff>

<commit_message>
formatted all plots to publication format, have all relevant code in the right scripts for cowplot
</commit_message>
<xml_diff>
--- a/Figures/mih_paper_figures.pptx
+++ b/Figures/mih_paper_figures.pptx
@@ -13139,59 +13139,68 @@
           <a:chExt cx="0" cy="0"/>
         </a:xfrm>
       </p:grpSpPr>
-      <p:pic>
-        <p:nvPicPr>
-          <p:cNvPr id="2" name="Picture 1">
-            <a:extLst>
-              <a:ext uri="{FF2B5EF4-FFF2-40B4-BE49-F238E27FC236}">
-                <a16:creationId xmlns:a16="http://schemas.microsoft.com/office/drawing/2014/main" id="{73489745-B707-A94F-9F05-E7D85B51D92C}"/>
-              </a:ext>
-            </a:extLst>
-          </p:cNvPr>
-          <p:cNvPicPr>
-            <a:picLocks noChangeAspect="1"/>
-          </p:cNvPicPr>
-          <p:nvPr/>
-        </p:nvPicPr>
-        <p:blipFill rotWithShape="1">
-          <a:blip r:embed="rId2"/>
-          <a:srcRect t="50000" r="48218"/>
-          <a:stretch/>
-        </p:blipFill>
-        <p:spPr>
+      <p:grpSp>
+        <p:nvGrpSpPr>
+          <p:cNvPr id="11" name="Group 10"/>
+          <p:cNvGrpSpPr/>
+          <p:nvPr/>
+        </p:nvGrpSpPr>
+        <p:grpSpPr>
           <a:xfrm>
-            <a:off x="615949" y="1562100"/>
-            <a:ext cx="4943013" cy="3505200"/>
-          </a:xfrm>
-          <a:prstGeom prst="rect">
-            <a:avLst/>
-          </a:prstGeom>
-        </p:spPr>
-      </p:pic>
-      <p:pic>
-        <p:nvPicPr>
-          <p:cNvPr id="4" name="Picture 3"/>
-          <p:cNvPicPr>
-            <a:picLocks noChangeAspect="1"/>
-          </p:cNvPicPr>
-          <p:nvPr/>
-        </p:nvPicPr>
-        <p:blipFill>
-          <a:blip r:embed="rId3"/>
-          <a:stretch>
-            <a:fillRect/>
-          </a:stretch>
-        </p:blipFill>
-        <p:spPr>
-          <a:xfrm>
-            <a:off x="5448300" y="1562100"/>
-            <a:ext cx="2891241" cy="2342573"/>
-          </a:xfrm>
-          <a:prstGeom prst="rect">
-            <a:avLst/>
-          </a:prstGeom>
-        </p:spPr>
-      </p:pic>
+            <a:off x="76200" y="1255910"/>
+            <a:ext cx="12049125" cy="4565253"/>
+            <a:chOff x="76200" y="1255910"/>
+            <a:chExt cx="12049125" cy="4565253"/>
+          </a:xfrm>
+        </p:grpSpPr>
+        <p:pic>
+          <p:nvPicPr>
+            <p:cNvPr id="7" name="Picture 6"/>
+            <p:cNvPicPr>
+              <a:picLocks noChangeAspect="1"/>
+            </p:cNvPicPr>
+            <p:nvPr/>
+          </p:nvPicPr>
+          <p:blipFill rotWithShape="1">
+            <a:blip r:embed="rId2"/>
+            <a:srcRect l="892" t="1244" r="865" b="691"/>
+            <a:stretch/>
+          </p:blipFill>
+          <p:spPr>
+            <a:xfrm>
+              <a:off x="76200" y="1285875"/>
+              <a:ext cx="8391525" cy="4505325"/>
+            </a:xfrm>
+            <a:prstGeom prst="rect">
+              <a:avLst/>
+            </a:prstGeom>
+          </p:spPr>
+        </p:pic>
+        <p:pic>
+          <p:nvPicPr>
+            <p:cNvPr id="10" name="Picture 9"/>
+            <p:cNvPicPr>
+              <a:picLocks noChangeAspect="1"/>
+            </p:cNvPicPr>
+            <p:nvPr/>
+          </p:nvPicPr>
+          <p:blipFill>
+            <a:blip r:embed="rId3"/>
+            <a:stretch>
+              <a:fillRect/>
+            </a:stretch>
+          </p:blipFill>
+          <p:spPr>
+            <a:xfrm>
+              <a:off x="8467725" y="1255910"/>
+              <a:ext cx="3657600" cy="4565253"/>
+            </a:xfrm>
+            <a:prstGeom prst="rect">
+              <a:avLst/>
+            </a:prstGeom>
+          </p:spPr>
+        </p:pic>
+      </p:grpSp>
     </p:spTree>
     <p:extLst>
       <p:ext uri="{BB962C8B-B14F-4D97-AF65-F5344CB8AC3E}">
@@ -13398,13 +13407,7 @@
       </p:grpSpPr>
       <p:pic>
         <p:nvPicPr>
-          <p:cNvPr id="3" name="Picture 2">
-            <a:extLst>
-              <a:ext uri="{FF2B5EF4-FFF2-40B4-BE49-F238E27FC236}">
-                <a16:creationId xmlns:a16="http://schemas.microsoft.com/office/drawing/2014/main" id="{39AED75D-FCD6-5F4D-8392-D5ACDDE8EDB8}"/>
-              </a:ext>
-            </a:extLst>
-          </p:cNvPr>
+          <p:cNvPr id="2" name="Picture 1"/>
           <p:cNvPicPr>
             <a:picLocks noChangeAspect="1"/>
           </p:cNvPicPr>
@@ -13418,38 +13421,8 @@
         </p:blipFill>
         <p:spPr>
           <a:xfrm>
-            <a:off x="6665386" y="1143000"/>
-            <a:ext cx="4792133" cy="3594100"/>
-          </a:xfrm>
-          <a:prstGeom prst="rect">
-            <a:avLst/>
-          </a:prstGeom>
-        </p:spPr>
-      </p:pic>
-      <p:pic>
-        <p:nvPicPr>
-          <p:cNvPr id="7" name="Picture 6">
-            <a:extLst>
-              <a:ext uri="{FF2B5EF4-FFF2-40B4-BE49-F238E27FC236}">
-                <a16:creationId xmlns:a16="http://schemas.microsoft.com/office/drawing/2014/main" id="{658548A7-989D-BA45-88BF-8E5C03BB7667}"/>
-              </a:ext>
-            </a:extLst>
-          </p:cNvPr>
-          <p:cNvPicPr>
-            <a:picLocks noChangeAspect="1"/>
-          </p:cNvPicPr>
-          <p:nvPr/>
-        </p:nvPicPr>
-        <p:blipFill>
-          <a:blip r:embed="rId4"/>
-          <a:stretch>
-            <a:fillRect/>
-          </a:stretch>
-        </p:blipFill>
-        <p:spPr>
-          <a:xfrm>
-            <a:off x="699557" y="1511300"/>
-            <a:ext cx="5722441" cy="2857500"/>
+            <a:off x="1038224" y="1181100"/>
+            <a:ext cx="9342401" cy="4294491"/>
           </a:xfrm>
           <a:prstGeom prst="rect">
             <a:avLst/>

</xml_diff>

<commit_message>
Add BBC figure in to powerpoint
</commit_message>
<xml_diff>
--- a/Figures/mih_paper_figures.pptx
+++ b/Figures/mih_paper_figures.pptx
@@ -204,7 +204,7 @@
           <a:p>
             <a:fld id="{11D58CBC-377E-2D41-95A0-D5F6A72FAB78}" type="datetimeFigureOut">
               <a:rPr lang="en-US" smtClean="0"/>
-              <a:t>6/10/2019</a:t>
+              <a:t>6/14/2019</a:t>
             </a:fld>
             <a:endParaRPr lang="en-US"/>
           </a:p>
@@ -779,41 +779,14 @@
           <a:lstStyle/>
           <a:p>
             <a:r>
-              <a:rPr lang="en-US" dirty="0"/>
-              <a:t>Null model figure (option 1: z score plots): 1</a:t>
+              <a:rPr lang="en-US" dirty="0" smtClean="0"/>
+              <a:t>Notes</a:t>
             </a:r>
             <a:r>
-              <a:rPr lang="en-US" baseline="30000" dirty="0"/>
-              <a:t>st</a:t>
+              <a:rPr lang="en-US" baseline="0" dirty="0" smtClean="0"/>
+              <a:t> – fix legend, make both lines same color, label BBC and BBS in top corner of graph like figure 2</a:t>
             </a:r>
-            <a:r>
-              <a:rPr lang="en-US" dirty="0"/>
-              <a:t> col – no bins, 2</a:t>
-            </a:r>
-            <a:r>
-              <a:rPr lang="en-US" baseline="30000" dirty="0"/>
-              <a:t>nd</a:t>
-            </a:r>
-            <a:r>
-              <a:rPr lang="en-US" dirty="0"/>
-              <a:t> col – NDVI bins, 1</a:t>
-            </a:r>
-            <a:r>
-              <a:rPr lang="en-US" baseline="30000" dirty="0"/>
-              <a:t>st</a:t>
-            </a:r>
-            <a:r>
-              <a:rPr lang="en-US" dirty="0"/>
-              <a:t> row – BBS, 2</a:t>
-            </a:r>
-            <a:r>
-              <a:rPr lang="en-US" baseline="30000" dirty="0"/>
-              <a:t>nd</a:t>
-            </a:r>
-            <a:r>
-              <a:rPr lang="en-US" dirty="0"/>
-              <a:t> row - BBC</a:t>
-            </a:r>
+            <a:endParaRPr lang="en-US" dirty="0"/>
           </a:p>
         </p:txBody>
       </p:sp>
@@ -1174,7 +1147,7 @@
           <a:p>
             <a:fld id="{2B014276-E290-3448-B189-1B145A2DBC63}" type="datetimeFigureOut">
               <a:rPr lang="en-US" smtClean="0"/>
-              <a:t>6/10/2019</a:t>
+              <a:t>6/14/2019</a:t>
             </a:fld>
             <a:endParaRPr lang="en-US"/>
           </a:p>
@@ -1372,7 +1345,7 @@
           <a:p>
             <a:fld id="{2B014276-E290-3448-B189-1B145A2DBC63}" type="datetimeFigureOut">
               <a:rPr lang="en-US" smtClean="0"/>
-              <a:t>6/10/2019</a:t>
+              <a:t>6/14/2019</a:t>
             </a:fld>
             <a:endParaRPr lang="en-US"/>
           </a:p>
@@ -1580,7 +1553,7 @@
           <a:p>
             <a:fld id="{2B014276-E290-3448-B189-1B145A2DBC63}" type="datetimeFigureOut">
               <a:rPr lang="en-US" smtClean="0"/>
-              <a:t>6/10/2019</a:t>
+              <a:t>6/14/2019</a:t>
             </a:fld>
             <a:endParaRPr lang="en-US"/>
           </a:p>
@@ -1778,7 +1751,7 @@
           <a:p>
             <a:fld id="{2B014276-E290-3448-B189-1B145A2DBC63}" type="datetimeFigureOut">
               <a:rPr lang="en-US" smtClean="0"/>
-              <a:t>6/10/2019</a:t>
+              <a:t>6/14/2019</a:t>
             </a:fld>
             <a:endParaRPr lang="en-US"/>
           </a:p>
@@ -2053,7 +2026,7 @@
           <a:p>
             <a:fld id="{2B014276-E290-3448-B189-1B145A2DBC63}" type="datetimeFigureOut">
               <a:rPr lang="en-US" smtClean="0"/>
-              <a:t>6/10/2019</a:t>
+              <a:t>6/14/2019</a:t>
             </a:fld>
             <a:endParaRPr lang="en-US"/>
           </a:p>
@@ -2318,7 +2291,7 @@
           <a:p>
             <a:fld id="{2B014276-E290-3448-B189-1B145A2DBC63}" type="datetimeFigureOut">
               <a:rPr lang="en-US" smtClean="0"/>
-              <a:t>6/10/2019</a:t>
+              <a:t>6/14/2019</a:t>
             </a:fld>
             <a:endParaRPr lang="en-US"/>
           </a:p>
@@ -2730,7 +2703,7 @@
           <a:p>
             <a:fld id="{2B014276-E290-3448-B189-1B145A2DBC63}" type="datetimeFigureOut">
               <a:rPr lang="en-US" smtClean="0"/>
-              <a:t>6/10/2019</a:t>
+              <a:t>6/14/2019</a:t>
             </a:fld>
             <a:endParaRPr lang="en-US"/>
           </a:p>
@@ -2871,7 +2844,7 @@
           <a:p>
             <a:fld id="{2B014276-E290-3448-B189-1B145A2DBC63}" type="datetimeFigureOut">
               <a:rPr lang="en-US" smtClean="0"/>
-              <a:t>6/10/2019</a:t>
+              <a:t>6/14/2019</a:t>
             </a:fld>
             <a:endParaRPr lang="en-US"/>
           </a:p>
@@ -2984,7 +2957,7 @@
           <a:p>
             <a:fld id="{2B014276-E290-3448-B189-1B145A2DBC63}" type="datetimeFigureOut">
               <a:rPr lang="en-US" smtClean="0"/>
-              <a:t>6/10/2019</a:t>
+              <a:t>6/14/2019</a:t>
             </a:fld>
             <a:endParaRPr lang="en-US"/>
           </a:p>
@@ -3295,7 +3268,7 @@
           <a:p>
             <a:fld id="{2B014276-E290-3448-B189-1B145A2DBC63}" type="datetimeFigureOut">
               <a:rPr lang="en-US" smtClean="0"/>
-              <a:t>6/10/2019</a:t>
+              <a:t>6/14/2019</a:t>
             </a:fld>
             <a:endParaRPr lang="en-US"/>
           </a:p>
@@ -3583,7 +3556,7 @@
           <a:p>
             <a:fld id="{2B014276-E290-3448-B189-1B145A2DBC63}" type="datetimeFigureOut">
               <a:rPr lang="en-US" smtClean="0"/>
-              <a:t>6/10/2019</a:t>
+              <a:t>6/14/2019</a:t>
             </a:fld>
             <a:endParaRPr lang="en-US"/>
           </a:p>
@@ -3824,7 +3797,7 @@
           <a:p>
             <a:fld id="{2B014276-E290-3448-B189-1B145A2DBC63}" type="datetimeFigureOut">
               <a:rPr lang="en-US" smtClean="0"/>
-              <a:t>6/10/2019</a:t>
+              <a:t>6/14/2019</a:t>
             </a:fld>
             <a:endParaRPr lang="en-US"/>
           </a:p>
@@ -11001,7 +10974,7 @@
           <a:lstStyle/>
           <a:p>
             <a:r>
-              <a:rPr lang="en-US" dirty="0"/>
+              <a:rPr lang="en-US" b="1" dirty="0"/>
               <a:t>B</a:t>
             </a:r>
           </a:p>
@@ -11030,10 +11003,10 @@
           <a:lstStyle/>
           <a:p>
             <a:r>
-              <a:rPr lang="en-US" dirty="0" smtClean="0"/>
+              <a:rPr lang="en-US" b="1" dirty="0" smtClean="0"/>
               <a:t>A</a:t>
             </a:r>
-            <a:endParaRPr lang="en-US" dirty="0"/>
+            <a:endParaRPr lang="en-US" b="1" dirty="0"/>
           </a:p>
         </p:txBody>
       </p:sp>
@@ -11060,7 +11033,7 @@
           <a:lstStyle/>
           <a:p>
             <a:r>
-              <a:rPr lang="en-US" dirty="0"/>
+              <a:rPr lang="en-US" b="1" dirty="0"/>
               <a:t>C</a:t>
             </a:r>
           </a:p>
@@ -11089,10 +11062,10 @@
           <a:lstStyle/>
           <a:p>
             <a:r>
-              <a:rPr lang="en-US" dirty="0" smtClean="0"/>
+              <a:rPr lang="en-US" b="1" dirty="0" smtClean="0"/>
               <a:t>D</a:t>
             </a:r>
-            <a:endParaRPr lang="en-US" dirty="0"/>
+            <a:endParaRPr lang="en-US" b="1" dirty="0"/>
           </a:p>
         </p:txBody>
       </p:sp>
@@ -13233,13 +13206,7 @@
       </p:grpSpPr>
       <p:pic>
         <p:nvPicPr>
-          <p:cNvPr id="5" name="Picture 4">
-            <a:extLst>
-              <a:ext uri="{FF2B5EF4-FFF2-40B4-BE49-F238E27FC236}">
-                <a16:creationId xmlns:a16="http://schemas.microsoft.com/office/drawing/2014/main" id="{8B6FFC59-D4F3-BC4F-86C8-F1510E31631C}"/>
-              </a:ext>
-            </a:extLst>
-          </p:cNvPr>
+          <p:cNvPr id="6" name="Picture 5"/>
           <p:cNvPicPr>
             <a:picLocks noChangeAspect="1"/>
           </p:cNvPicPr>
@@ -13253,68 +13220,8 @@
         </p:blipFill>
         <p:spPr>
           <a:xfrm>
-            <a:off x="5476877" y="232402"/>
-            <a:ext cx="4654550" cy="3418315"/>
-          </a:xfrm>
-          <a:prstGeom prst="rect">
-            <a:avLst/>
-          </a:prstGeom>
-        </p:spPr>
-      </p:pic>
-      <p:pic>
-        <p:nvPicPr>
-          <p:cNvPr id="7" name="Picture 6">
-            <a:extLst>
-              <a:ext uri="{FF2B5EF4-FFF2-40B4-BE49-F238E27FC236}">
-                <a16:creationId xmlns:a16="http://schemas.microsoft.com/office/drawing/2014/main" id="{97855D04-174E-7443-BE85-76B894FA29F0}"/>
-              </a:ext>
-            </a:extLst>
-          </p:cNvPr>
-          <p:cNvPicPr>
-            <a:picLocks noChangeAspect="1"/>
-          </p:cNvPicPr>
-          <p:nvPr/>
-        </p:nvPicPr>
-        <p:blipFill>
-          <a:blip r:embed="rId4"/>
-          <a:stretch>
-            <a:fillRect/>
-          </a:stretch>
-        </p:blipFill>
-        <p:spPr>
-          <a:xfrm>
-            <a:off x="704851" y="3439685"/>
-            <a:ext cx="4654550" cy="3418315"/>
-          </a:xfrm>
-          <a:prstGeom prst="rect">
-            <a:avLst/>
-          </a:prstGeom>
-        </p:spPr>
-      </p:pic>
-      <p:pic>
-        <p:nvPicPr>
-          <p:cNvPr id="9" name="Picture 8">
-            <a:extLst>
-              <a:ext uri="{FF2B5EF4-FFF2-40B4-BE49-F238E27FC236}">
-                <a16:creationId xmlns:a16="http://schemas.microsoft.com/office/drawing/2014/main" id="{6BAAC0B9-09E9-5543-B3AE-AE7DAC68FE77}"/>
-              </a:ext>
-            </a:extLst>
-          </p:cNvPr>
-          <p:cNvPicPr>
-            <a:picLocks noChangeAspect="1"/>
-          </p:cNvPicPr>
-          <p:nvPr/>
-        </p:nvPicPr>
-        <p:blipFill>
-          <a:blip r:embed="rId5"/>
-          <a:stretch>
-            <a:fillRect/>
-          </a:stretch>
-        </p:blipFill>
-        <p:spPr>
-          <a:xfrm>
-            <a:off x="868363" y="232403"/>
-            <a:ext cx="4654550" cy="3418315"/>
+            <a:off x="62630" y="1561231"/>
+            <a:ext cx="12038034" cy="3210142"/>
           </a:xfrm>
           <a:prstGeom prst="rect">
             <a:avLst/>

</xml_diff>

<commit_message>
add notes on figures ppt
</commit_message>
<xml_diff>
--- a/Figures/mih_paper_figures.pptx
+++ b/Figures/mih_paper_figures.pptx
@@ -204,7 +204,7 @@
           <a:p>
             <a:fld id="{11D58CBC-377E-2D41-95A0-D5F6A72FAB78}" type="datetimeFigureOut">
               <a:rPr lang="en-US" smtClean="0"/>
-              <a:t>6/14/2019</a:t>
+              <a:t>6/14/19</a:t>
             </a:fld>
             <a:endParaRPr lang="en-US"/>
           </a:p>
@@ -516,10 +516,9 @@
           <a:lstStyle/>
           <a:p>
             <a:r>
-              <a:rPr lang="en-US" dirty="0" smtClean="0"/>
+              <a:rPr lang="en-US" dirty="0"/>
               <a:t>Figure 1</a:t>
             </a:r>
-            <a:endParaRPr lang="en-US" dirty="0"/>
           </a:p>
         </p:txBody>
       </p:sp>
@@ -604,10 +603,9 @@
           <a:lstStyle/>
           <a:p>
             <a:r>
-              <a:rPr lang="en-US" dirty="0" smtClean="0"/>
+              <a:rPr lang="en-US" dirty="0"/>
               <a:t>Figure 1</a:t>
             </a:r>
-            <a:endParaRPr lang="en-US" dirty="0"/>
           </a:p>
         </p:txBody>
       </p:sp>
@@ -693,7 +691,7 @@
           <a:p>
             <a:r>
               <a:rPr lang="en-US" dirty="0"/>
-              <a:t>BBC figure – MIH predictions</a:t>
+              <a:t>Notes - Add letters, consider changing color of BBC dots?, add Ontario to map, x label – mean NDVI? The rest say that, don’t sentence case Species Richness? Just should be uniform between figures</a:t>
             </a:r>
           </a:p>
         </p:txBody>
@@ -715,7 +713,7 @@
           <a:p>
             <a:fld id="{73BA172E-C57C-264D-B2C4-609C1A08C911}" type="slidenum">
               <a:rPr lang="en-US" smtClean="0"/>
-              <a:t>4</a:t>
+              <a:t>3</a:t>
             </a:fld>
             <a:endParaRPr lang="en-US"/>
           </a:p>
@@ -724,7 +722,7 @@
     </p:spTree>
     <p:extLst>
       <p:ext uri="{BB962C8B-B14F-4D97-AF65-F5344CB8AC3E}">
-        <p14:creationId xmlns:p14="http://schemas.microsoft.com/office/powerpoint/2010/main" val="572268250"/>
+        <p14:creationId xmlns:p14="http://schemas.microsoft.com/office/powerpoint/2010/main" val="1939280580"/>
       </p:ext>
     </p:extLst>
   </p:cSld>
@@ -779,14 +777,9 @@
           <a:lstStyle/>
           <a:p>
             <a:r>
-              <a:rPr lang="en-US" dirty="0" smtClean="0"/>
-              <a:t>Notes</a:t>
+              <a:rPr lang="en-US" dirty="0"/>
+              <a:t>Notes - Put legend on A? No line on C? Add units to C (territories/ha), make E(Species) like figure 1</a:t>
             </a:r>
-            <a:r>
-              <a:rPr lang="en-US" baseline="0" dirty="0" smtClean="0"/>
-              <a:t> – fix legend, make both lines same color, label BBC and BBS in top corner of graph like figure 2</a:t>
-            </a:r>
-            <a:endParaRPr lang="en-US" dirty="0"/>
           </a:p>
         </p:txBody>
       </p:sp>
@@ -807,7 +800,7 @@
           <a:p>
             <a:fld id="{73BA172E-C57C-264D-B2C4-609C1A08C911}" type="slidenum">
               <a:rPr lang="en-US" smtClean="0"/>
-              <a:t>6</a:t>
+              <a:t>4</a:t>
             </a:fld>
             <a:endParaRPr lang="en-US"/>
           </a:p>
@@ -816,7 +809,7 @@
     </p:spTree>
     <p:extLst>
       <p:ext uri="{BB962C8B-B14F-4D97-AF65-F5344CB8AC3E}">
-        <p14:creationId xmlns:p14="http://schemas.microsoft.com/office/powerpoint/2010/main" val="1266774042"/>
+        <p14:creationId xmlns:p14="http://schemas.microsoft.com/office/powerpoint/2010/main" val="572268250"/>
       </p:ext>
     </p:extLst>
   </p:cSld>
@@ -870,6 +863,182 @@
           <a:bodyPr/>
           <a:lstStyle/>
           <a:p>
+            <a:endParaRPr lang="en-US" dirty="0"/>
+          </a:p>
+        </p:txBody>
+      </p:sp>
+      <p:sp>
+        <p:nvSpPr>
+          <p:cNvPr id="4" name="Slide Number Placeholder 3"/>
+          <p:cNvSpPr>
+            <a:spLocks noGrp="1"/>
+          </p:cNvSpPr>
+          <p:nvPr>
+            <p:ph type="sldNum" sz="quarter" idx="5"/>
+          </p:nvPr>
+        </p:nvSpPr>
+        <p:spPr/>
+        <p:txBody>
+          <a:bodyPr/>
+          <a:lstStyle/>
+          <a:p>
+            <a:fld id="{73BA172E-C57C-264D-B2C4-609C1A08C911}" type="slidenum">
+              <a:rPr lang="en-US" smtClean="0"/>
+              <a:t>5</a:t>
+            </a:fld>
+            <a:endParaRPr lang="en-US"/>
+          </a:p>
+        </p:txBody>
+      </p:sp>
+    </p:spTree>
+    <p:extLst>
+      <p:ext uri="{BB962C8B-B14F-4D97-AF65-F5344CB8AC3E}">
+        <p14:creationId xmlns:p14="http://schemas.microsoft.com/office/powerpoint/2010/main" val="3177579517"/>
+      </p:ext>
+    </p:extLst>
+  </p:cSld>
+  <p:clrMapOvr>
+    <a:masterClrMapping/>
+  </p:clrMapOvr>
+</p:notes>
+</file>
+
+<file path=ppt/notesSlides/notesSlide6.xml><?xml version="1.0" encoding="utf-8"?>
+<p:notes xmlns:a="http://schemas.openxmlformats.org/drawingml/2006/main" xmlns:r="http://schemas.openxmlformats.org/officeDocument/2006/relationships" xmlns:p="http://schemas.openxmlformats.org/presentationml/2006/main">
+  <p:cSld>
+    <p:spTree>
+      <p:nvGrpSpPr>
+        <p:cNvPr id="1" name=""/>
+        <p:cNvGrpSpPr/>
+        <p:nvPr/>
+      </p:nvGrpSpPr>
+      <p:grpSpPr>
+        <a:xfrm>
+          <a:off x="0" y="0"/>
+          <a:ext cx="0" cy="0"/>
+          <a:chOff x="0" y="0"/>
+          <a:chExt cx="0" cy="0"/>
+        </a:xfrm>
+      </p:grpSpPr>
+      <p:sp>
+        <p:nvSpPr>
+          <p:cNvPr id="2" name="Slide Image Placeholder 1"/>
+          <p:cNvSpPr>
+            <a:spLocks noGrp="1" noRot="1" noChangeAspect="1"/>
+          </p:cNvSpPr>
+          <p:nvPr>
+            <p:ph type="sldImg"/>
+          </p:nvPr>
+        </p:nvSpPr>
+        <p:spPr/>
+      </p:sp>
+      <p:sp>
+        <p:nvSpPr>
+          <p:cNvPr id="3" name="Notes Placeholder 2"/>
+          <p:cNvSpPr>
+            <a:spLocks noGrp="1"/>
+          </p:cNvSpPr>
+          <p:nvPr>
+            <p:ph type="body" idx="1"/>
+          </p:nvPr>
+        </p:nvSpPr>
+        <p:spPr/>
+        <p:txBody>
+          <a:bodyPr/>
+          <a:lstStyle/>
+          <a:p>
+            <a:r>
+              <a:rPr lang="en-US" dirty="0"/>
+              <a:t>Notes</a:t>
+            </a:r>
+            <a:r>
+              <a:rPr lang="en-US" baseline="0" dirty="0"/>
+              <a:t> – fix legend, make both lines same color, label BBC and BBS in top corner of graph like figure 2, make dotted line the same CEX, match X and Y labels</a:t>
+            </a:r>
+            <a:endParaRPr lang="en-US" dirty="0"/>
+          </a:p>
+        </p:txBody>
+      </p:sp>
+      <p:sp>
+        <p:nvSpPr>
+          <p:cNvPr id="4" name="Slide Number Placeholder 3"/>
+          <p:cNvSpPr>
+            <a:spLocks noGrp="1"/>
+          </p:cNvSpPr>
+          <p:nvPr>
+            <p:ph type="sldNum" sz="quarter" idx="5"/>
+          </p:nvPr>
+        </p:nvSpPr>
+        <p:spPr/>
+        <p:txBody>
+          <a:bodyPr/>
+          <a:lstStyle/>
+          <a:p>
+            <a:fld id="{73BA172E-C57C-264D-B2C4-609C1A08C911}" type="slidenum">
+              <a:rPr lang="en-US" smtClean="0"/>
+              <a:t>6</a:t>
+            </a:fld>
+            <a:endParaRPr lang="en-US"/>
+          </a:p>
+        </p:txBody>
+      </p:sp>
+    </p:spTree>
+    <p:extLst>
+      <p:ext uri="{BB962C8B-B14F-4D97-AF65-F5344CB8AC3E}">
+        <p14:creationId xmlns:p14="http://schemas.microsoft.com/office/powerpoint/2010/main" val="1266774042"/>
+      </p:ext>
+    </p:extLst>
+  </p:cSld>
+  <p:clrMapOvr>
+    <a:masterClrMapping/>
+  </p:clrMapOvr>
+</p:notes>
+</file>
+
+<file path=ppt/notesSlides/notesSlide7.xml><?xml version="1.0" encoding="utf-8"?>
+<p:notes xmlns:a="http://schemas.openxmlformats.org/drawingml/2006/main" xmlns:r="http://schemas.openxmlformats.org/officeDocument/2006/relationships" xmlns:p="http://schemas.openxmlformats.org/presentationml/2006/main">
+  <p:cSld>
+    <p:spTree>
+      <p:nvGrpSpPr>
+        <p:cNvPr id="1" name=""/>
+        <p:cNvGrpSpPr/>
+        <p:nvPr/>
+      </p:nvGrpSpPr>
+      <p:grpSpPr>
+        <a:xfrm>
+          <a:off x="0" y="0"/>
+          <a:ext cx="0" cy="0"/>
+          <a:chOff x="0" y="0"/>
+          <a:chExt cx="0" cy="0"/>
+        </a:xfrm>
+      </p:grpSpPr>
+      <p:sp>
+        <p:nvSpPr>
+          <p:cNvPr id="2" name="Slide Image Placeholder 1"/>
+          <p:cNvSpPr>
+            <a:spLocks noGrp="1" noRot="1" noChangeAspect="1"/>
+          </p:cNvSpPr>
+          <p:nvPr>
+            <p:ph type="sldImg"/>
+          </p:nvPr>
+        </p:nvSpPr>
+        <p:spPr/>
+      </p:sp>
+      <p:sp>
+        <p:nvSpPr>
+          <p:cNvPr id="3" name="Notes Placeholder 2"/>
+          <p:cNvSpPr>
+            <a:spLocks noGrp="1"/>
+          </p:cNvSpPr>
+          <p:nvPr>
+            <p:ph type="body" idx="1"/>
+          </p:nvPr>
+        </p:nvSpPr>
+        <p:spPr/>
+        <p:txBody>
+          <a:bodyPr/>
+          <a:lstStyle/>
+          <a:p>
             <a:r>
               <a:rPr lang="en-US" dirty="0"/>
               <a:t>Supplemental figures – BBC locations and E(S) vs. site area</a:t>
@@ -913,7 +1082,7 @@
 </p:notes>
 </file>
 
-<file path=ppt/notesSlides/notesSlide6.xml><?xml version="1.0" encoding="utf-8"?>
+<file path=ppt/notesSlides/notesSlide8.xml><?xml version="1.0" encoding="utf-8"?>
 <p:notes xmlns:a="http://schemas.openxmlformats.org/drawingml/2006/main" xmlns:r="http://schemas.openxmlformats.org/officeDocument/2006/relationships" xmlns:p="http://schemas.openxmlformats.org/presentationml/2006/main">
   <p:cSld>
     <p:spTree>
@@ -1147,7 +1316,7 @@
           <a:p>
             <a:fld id="{2B014276-E290-3448-B189-1B145A2DBC63}" type="datetimeFigureOut">
               <a:rPr lang="en-US" smtClean="0"/>
-              <a:t>6/14/2019</a:t>
+              <a:t>6/14/19</a:t>
             </a:fld>
             <a:endParaRPr lang="en-US"/>
           </a:p>
@@ -1345,7 +1514,7 @@
           <a:p>
             <a:fld id="{2B014276-E290-3448-B189-1B145A2DBC63}" type="datetimeFigureOut">
               <a:rPr lang="en-US" smtClean="0"/>
-              <a:t>6/14/2019</a:t>
+              <a:t>6/14/19</a:t>
             </a:fld>
             <a:endParaRPr lang="en-US"/>
           </a:p>
@@ -1553,7 +1722,7 @@
           <a:p>
             <a:fld id="{2B014276-E290-3448-B189-1B145A2DBC63}" type="datetimeFigureOut">
               <a:rPr lang="en-US" smtClean="0"/>
-              <a:t>6/14/2019</a:t>
+              <a:t>6/14/19</a:t>
             </a:fld>
             <a:endParaRPr lang="en-US"/>
           </a:p>
@@ -1751,7 +1920,7 @@
           <a:p>
             <a:fld id="{2B014276-E290-3448-B189-1B145A2DBC63}" type="datetimeFigureOut">
               <a:rPr lang="en-US" smtClean="0"/>
-              <a:t>6/14/2019</a:t>
+              <a:t>6/14/19</a:t>
             </a:fld>
             <a:endParaRPr lang="en-US"/>
           </a:p>
@@ -2026,7 +2195,7 @@
           <a:p>
             <a:fld id="{2B014276-E290-3448-B189-1B145A2DBC63}" type="datetimeFigureOut">
               <a:rPr lang="en-US" smtClean="0"/>
-              <a:t>6/14/2019</a:t>
+              <a:t>6/14/19</a:t>
             </a:fld>
             <a:endParaRPr lang="en-US"/>
           </a:p>
@@ -2291,7 +2460,7 @@
           <a:p>
             <a:fld id="{2B014276-E290-3448-B189-1B145A2DBC63}" type="datetimeFigureOut">
               <a:rPr lang="en-US" smtClean="0"/>
-              <a:t>6/14/2019</a:t>
+              <a:t>6/14/19</a:t>
             </a:fld>
             <a:endParaRPr lang="en-US"/>
           </a:p>
@@ -2703,7 +2872,7 @@
           <a:p>
             <a:fld id="{2B014276-E290-3448-B189-1B145A2DBC63}" type="datetimeFigureOut">
               <a:rPr lang="en-US" smtClean="0"/>
-              <a:t>6/14/2019</a:t>
+              <a:t>6/14/19</a:t>
             </a:fld>
             <a:endParaRPr lang="en-US"/>
           </a:p>
@@ -2844,7 +3013,7 @@
           <a:p>
             <a:fld id="{2B014276-E290-3448-B189-1B145A2DBC63}" type="datetimeFigureOut">
               <a:rPr lang="en-US" smtClean="0"/>
-              <a:t>6/14/2019</a:t>
+              <a:t>6/14/19</a:t>
             </a:fld>
             <a:endParaRPr lang="en-US"/>
           </a:p>
@@ -2957,7 +3126,7 @@
           <a:p>
             <a:fld id="{2B014276-E290-3448-B189-1B145A2DBC63}" type="datetimeFigureOut">
               <a:rPr lang="en-US" smtClean="0"/>
-              <a:t>6/14/2019</a:t>
+              <a:t>6/14/19</a:t>
             </a:fld>
             <a:endParaRPr lang="en-US"/>
           </a:p>
@@ -3268,7 +3437,7 @@
           <a:p>
             <a:fld id="{2B014276-E290-3448-B189-1B145A2DBC63}" type="datetimeFigureOut">
               <a:rPr lang="en-US" smtClean="0"/>
-              <a:t>6/14/2019</a:t>
+              <a:t>6/14/19</a:t>
             </a:fld>
             <a:endParaRPr lang="en-US"/>
           </a:p>
@@ -3556,7 +3725,7 @@
           <a:p>
             <a:fld id="{2B014276-E290-3448-B189-1B145A2DBC63}" type="datetimeFigureOut">
               <a:rPr lang="en-US" smtClean="0"/>
-              <a:t>6/14/2019</a:t>
+              <a:t>6/14/19</a:t>
             </a:fld>
             <a:endParaRPr lang="en-US"/>
           </a:p>
@@ -3797,7 +3966,7 @@
           <a:p>
             <a:fld id="{2B014276-E290-3448-B189-1B145A2DBC63}" type="datetimeFigureOut">
               <a:rPr lang="en-US" smtClean="0"/>
-              <a:t>6/14/2019</a:t>
+              <a:t>6/14/19</a:t>
             </a:fld>
             <a:endParaRPr lang="en-US"/>
           </a:p>
@@ -4328,9 +4497,7 @@
           <p:cNvGraphicFramePr>
             <a:graphicFrameLocks noGrp="1"/>
           </p:cNvGraphicFramePr>
-          <p:nvPr>
-            <p:extLst/>
-          </p:nvPr>
+          <p:nvPr/>
         </p:nvGraphicFramePr>
         <p:xfrm>
           <a:off x="3669166" y="2644550"/>
@@ -4768,13 +4935,8 @@
           <a:p>
             <a:r>
               <a:rPr lang="en-US" sz="1400" dirty="0"/>
-              <a:t>l</a:t>
+              <a:t>log(area)</a:t>
             </a:r>
-            <a:r>
-              <a:rPr lang="en-US" sz="1400" dirty="0" smtClean="0"/>
-              <a:t>og(area)</a:t>
-            </a:r>
-            <a:endParaRPr lang="en-US" sz="1400" dirty="0"/>
           </a:p>
         </p:txBody>
       </p:sp>
@@ -4802,13 +4964,8 @@
           <a:p>
             <a:r>
               <a:rPr lang="en-US" sz="1400" dirty="0"/>
-              <a:t>l</a:t>
+              <a:t>log(Species)</a:t>
             </a:r>
-            <a:r>
-              <a:rPr lang="en-US" sz="1400" dirty="0" smtClean="0"/>
-              <a:t>og(Species)</a:t>
-            </a:r>
-            <a:endParaRPr lang="en-US" sz="1400" dirty="0"/>
           </a:p>
         </p:txBody>
       </p:sp>
@@ -4983,10 +5140,9 @@
           <a:lstStyle/>
           <a:p>
             <a:r>
-              <a:rPr lang="en-US" sz="1100" dirty="0" smtClean="0"/>
+              <a:rPr lang="en-US" sz="1100" dirty="0"/>
               <a:t>All species</a:t>
             </a:r>
-            <a:endParaRPr lang="en-US" sz="1100" dirty="0"/>
           </a:p>
         </p:txBody>
       </p:sp>
@@ -5013,10 +5169,9 @@
           <a:lstStyle/>
           <a:p>
             <a:r>
-              <a:rPr lang="en-US" sz="1100" dirty="0" smtClean="0"/>
+              <a:rPr lang="en-US" sz="1100" dirty="0"/>
               <a:t>Excluding transients</a:t>
             </a:r>
-            <a:endParaRPr lang="en-US" sz="1100" dirty="0"/>
           </a:p>
         </p:txBody>
       </p:sp>
@@ -5922,10 +6077,9 @@
           <a:lstStyle/>
           <a:p>
             <a:r>
-              <a:rPr lang="en-US" dirty="0" smtClean="0"/>
+              <a:rPr lang="en-US" dirty="0"/>
               <a:t>A</a:t>
             </a:r>
-            <a:endParaRPr lang="en-US" dirty="0"/>
           </a:p>
         </p:txBody>
       </p:sp>
@@ -5981,10 +6135,9 @@
           <a:lstStyle/>
           <a:p>
             <a:r>
-              <a:rPr lang="en-US" dirty="0" smtClean="0"/>
+              <a:rPr lang="en-US" dirty="0"/>
               <a:t>D</a:t>
             </a:r>
-            <a:endParaRPr lang="en-US" dirty="0"/>
           </a:p>
         </p:txBody>
       </p:sp>
@@ -7315,10 +7468,9 @@
           <a:lstStyle/>
           <a:p>
             <a:r>
-              <a:rPr lang="en-US" sz="1100" dirty="0" smtClean="0"/>
+              <a:rPr lang="en-US" sz="1100" dirty="0"/>
               <a:t>Transient</a:t>
             </a:r>
-            <a:endParaRPr lang="en-US" sz="1100" dirty="0"/>
           </a:p>
         </p:txBody>
       </p:sp>
@@ -7346,10 +7498,9 @@
           <a:p>
             <a:pPr algn="ctr"/>
             <a:r>
-              <a:rPr lang="en-US" sz="1100" dirty="0" smtClean="0"/>
+              <a:rPr lang="en-US" sz="1100" dirty="0"/>
               <a:t>Core</a:t>
             </a:r>
-            <a:endParaRPr lang="en-US" sz="1100" dirty="0"/>
           </a:p>
         </p:txBody>
       </p:sp>
@@ -7402,7 +7553,7 @@
               <a:lstStyle/>
               <a:p>
                 <a:r>
-                  <a:rPr lang="en-US" sz="1400" dirty="0" smtClean="0"/>
+                  <a:rPr lang="en-US" sz="1400" dirty="0"/>
                   <a:t>time </a:t>
                 </a:r>
                 <a14:m>
@@ -7549,7 +7700,7 @@
           <a:lstStyle/>
           <a:p>
             <a:r>
-              <a:rPr lang="en-US" sz="1200" dirty="0" smtClean="0"/>
+              <a:rPr lang="en-US" sz="1200" dirty="0"/>
               <a:t>All species:   	         </a:t>
             </a:r>
           </a:p>
@@ -7578,7 +7729,7 @@
           <a:lstStyle/>
           <a:p>
             <a:r>
-              <a:rPr lang="en-US" dirty="0" smtClean="0"/>
+              <a:rPr lang="en-US" dirty="0"/>
               <a:t>E</a:t>
             </a:r>
             <a:endParaRPr lang="en-US" sz="1400" dirty="0"/>
@@ -8566,7 +8717,7 @@
               <a:lstStyle/>
               <a:p>
                 <a:r>
-                  <a:rPr lang="en-US" sz="1400" dirty="0" smtClean="0"/>
+                  <a:rPr lang="en-US" sz="1400" dirty="0"/>
                   <a:t>time </a:t>
                 </a:r>
                 <a14:m>
@@ -9863,13 +10014,13 @@
           <a:lstStyle/>
           <a:p>
             <a:r>
-              <a:rPr lang="en-US" sz="1200" dirty="0" smtClean="0"/>
+              <a:rPr lang="en-US" sz="1200" dirty="0"/>
               <a:t>Excluding</a:t>
             </a:r>
           </a:p>
           <a:p>
             <a:r>
-              <a:rPr lang="en-US" sz="1200" dirty="0" smtClean="0"/>
+              <a:rPr lang="en-US" sz="1200" dirty="0"/>
               <a:t>transients:</a:t>
             </a:r>
           </a:p>
@@ -9898,7 +10049,7 @@
           <a:lstStyle/>
           <a:p>
             <a:r>
-              <a:rPr lang="en-US" sz="1200" dirty="0" smtClean="0"/>
+              <a:rPr lang="en-US" sz="1200" dirty="0"/>
               <a:t>0</a:t>
             </a:r>
           </a:p>
@@ -9927,7 +10078,7 @@
           <a:lstStyle/>
           <a:p>
             <a:r>
-              <a:rPr lang="en-US" sz="1200" dirty="0" smtClean="0"/>
+              <a:rPr lang="en-US" sz="1200" dirty="0"/>
               <a:t>= 0%</a:t>
             </a:r>
           </a:p>
@@ -9956,7 +10107,7 @@
           <a:lstStyle/>
           <a:p>
             <a:r>
-              <a:rPr lang="en-US" sz="1200" dirty="0" smtClean="0"/>
+              <a:rPr lang="en-US" sz="1200" dirty="0"/>
               <a:t>= 50%</a:t>
             </a:r>
           </a:p>
@@ -9985,7 +10136,7 @@
           <a:lstStyle/>
           <a:p>
             <a:r>
-              <a:rPr lang="en-US" sz="1400" dirty="0" smtClean="0"/>
+              <a:rPr lang="en-US" sz="1400" dirty="0"/>
               <a:t>Turnover</a:t>
             </a:r>
           </a:p>
@@ -10349,21 +10500,6 @@
   <p:clrMapOvr>
     <a:masterClrMapping/>
   </p:clrMapOvr>
-  <mc:AlternateContent xmlns:mc="http://schemas.openxmlformats.org/markup-compatibility/2006" xmlns:p14="http://schemas.microsoft.com/office/powerpoint/2010/main">
-    <mc:Choice Requires="p14">
-      <p:transition spd="slow" p14:dur="2000"/>
-    </mc:Choice>
-    <mc:Fallback xmlns="">
-      <p:transition spd="slow"/>
-    </mc:Fallback>
-  </mc:AlternateContent>
-  <p:timing>
-    <p:tnLst>
-      <p:par>
-        <p:cTn id="1" dur="indefinite" restart="never" nodeType="tmRoot"/>
-      </p:par>
-    </p:tnLst>
-  </p:timing>
 </p:sld>
 </file>
 
@@ -10551,10 +10687,9 @@
           <a:lstStyle/>
           <a:p>
             <a:r>
-              <a:rPr lang="en-US" sz="1400" dirty="0" smtClean="0"/>
+              <a:rPr lang="en-US" sz="1400" dirty="0"/>
               <a:t>NDVI</a:t>
             </a:r>
-            <a:endParaRPr lang="en-US" sz="1400" dirty="0"/>
           </a:p>
         </p:txBody>
       </p:sp>
@@ -10581,10 +10716,9 @@
           <a:lstStyle/>
           <a:p>
             <a:r>
-              <a:rPr lang="en-US" sz="1400" dirty="0" smtClean="0"/>
+              <a:rPr lang="en-US" sz="1400" dirty="0"/>
               <a:t>Number Individuals</a:t>
             </a:r>
-            <a:endParaRPr lang="en-US" sz="1400" dirty="0"/>
           </a:p>
         </p:txBody>
       </p:sp>
@@ -10758,10 +10892,9 @@
           <a:lstStyle/>
           <a:p>
             <a:r>
-              <a:rPr lang="en-US" sz="1100" dirty="0" smtClean="0"/>
+              <a:rPr lang="en-US" sz="1100" dirty="0"/>
               <a:t>MIH</a:t>
             </a:r>
-            <a:endParaRPr lang="en-US" sz="1100" dirty="0"/>
           </a:p>
         </p:txBody>
       </p:sp>
@@ -10788,10 +10921,9 @@
           <a:lstStyle/>
           <a:p>
             <a:r>
-              <a:rPr lang="en-US" sz="1100" dirty="0" smtClean="0"/>
+              <a:rPr lang="en-US" sz="1100" dirty="0"/>
               <a:t>NS</a:t>
             </a:r>
-            <a:endParaRPr lang="en-US" sz="1100" dirty="0"/>
           </a:p>
         </p:txBody>
       </p:sp>
@@ -11003,10 +11135,9 @@
           <a:lstStyle/>
           <a:p>
             <a:r>
-              <a:rPr lang="en-US" b="1" dirty="0" smtClean="0"/>
+              <a:rPr lang="en-US" b="1" dirty="0"/>
               <a:t>A</a:t>
             </a:r>
-            <a:endParaRPr lang="en-US" b="1" dirty="0"/>
           </a:p>
         </p:txBody>
       </p:sp>
@@ -11062,10 +11193,9 @@
           <a:lstStyle/>
           <a:p>
             <a:r>
-              <a:rPr lang="en-US" b="1" dirty="0" smtClean="0"/>
+              <a:rPr lang="en-US" b="1" dirty="0"/>
               <a:t>D</a:t>
             </a:r>
-            <a:endParaRPr lang="en-US" b="1" dirty="0"/>
           </a:p>
         </p:txBody>
       </p:sp>
@@ -11092,10 +11222,9 @@
           <a:lstStyle/>
           <a:p>
             <a:r>
-              <a:rPr lang="en-US" sz="1400" dirty="0" smtClean="0"/>
+              <a:rPr lang="en-US" sz="1400" dirty="0"/>
               <a:t>NDVI</a:t>
             </a:r>
-            <a:endParaRPr lang="en-US" sz="1400" dirty="0"/>
           </a:p>
         </p:txBody>
       </p:sp>
@@ -11123,13 +11252,8 @@
           <a:p>
             <a:r>
               <a:rPr lang="en-US" sz="1400" dirty="0"/>
-              <a:t>E</a:t>
+              <a:t>E (Species)</a:t>
             </a:r>
-            <a:r>
-              <a:rPr lang="en-US" sz="1400" dirty="0" smtClean="0"/>
-              <a:t> (Species)</a:t>
-            </a:r>
-            <a:endParaRPr lang="en-US" sz="1400" dirty="0"/>
           </a:p>
         </p:txBody>
       </p:sp>
@@ -11262,10 +11386,9 @@
           <a:lstStyle/>
           <a:p>
             <a:r>
-              <a:rPr lang="en-US" sz="1100" dirty="0" smtClean="0"/>
+              <a:rPr lang="en-US" sz="1100" dirty="0"/>
               <a:t>MIH</a:t>
             </a:r>
-            <a:endParaRPr lang="en-US" sz="1100" dirty="0"/>
           </a:p>
         </p:txBody>
       </p:sp>
@@ -11328,10 +11451,9 @@
           <a:lstStyle/>
           <a:p>
             <a:r>
-              <a:rPr lang="en-US" sz="1100" dirty="0" smtClean="0"/>
+              <a:rPr lang="en-US" sz="1100" dirty="0"/>
               <a:t>NS</a:t>
             </a:r>
-            <a:endParaRPr lang="en-US" sz="1100" dirty="0"/>
           </a:p>
         </p:txBody>
       </p:sp>
@@ -11910,10 +12032,9 @@
           <a:lstStyle/>
           <a:p>
             <a:r>
-              <a:rPr lang="en-US" sz="1400" dirty="0" smtClean="0"/>
+              <a:rPr lang="en-US" sz="1400" dirty="0"/>
               <a:t>Species</a:t>
             </a:r>
-            <a:endParaRPr lang="en-US" sz="1400" dirty="0"/>
           </a:p>
         </p:txBody>
       </p:sp>
@@ -11940,10 +12061,9 @@
           <a:lstStyle/>
           <a:p>
             <a:r>
-              <a:rPr lang="en-US" sz="1400" dirty="0" smtClean="0"/>
+              <a:rPr lang="en-US" sz="1400" dirty="0"/>
               <a:t> NDVI</a:t>
             </a:r>
-            <a:endParaRPr lang="en-US" sz="1400" dirty="0"/>
           </a:p>
         </p:txBody>
       </p:sp>
@@ -12724,10 +12844,9 @@
           <a:lstStyle/>
           <a:p>
             <a:r>
-              <a:rPr lang="en-US" sz="1400" dirty="0" smtClean="0"/>
+              <a:rPr lang="en-US" sz="1400" dirty="0"/>
               <a:t>NDVI</a:t>
             </a:r>
-            <a:endParaRPr lang="en-US" sz="1400" dirty="0"/>
           </a:p>
         </p:txBody>
       </p:sp>
@@ -12754,10 +12873,9 @@
           <a:lstStyle/>
           <a:p>
             <a:r>
-              <a:rPr lang="en-US" sz="1400" dirty="0" smtClean="0"/>
+              <a:rPr lang="en-US" sz="1400" dirty="0"/>
               <a:t>Mean Species Range</a:t>
             </a:r>
-            <a:endParaRPr lang="en-US" sz="1400" dirty="0"/>
           </a:p>
         </p:txBody>
       </p:sp>
@@ -13085,13 +13203,6 @@
   <p:clrMapOvr>
     <a:masterClrMapping/>
   </p:clrMapOvr>
-  <p:timing>
-    <p:tnLst>
-      <p:par>
-        <p:cTn id="1" dur="indefinite" restart="never" nodeType="tmRoot"/>
-      </p:par>
-    </p:tnLst>
-  </p:timing>
 </p:sld>
 </file>
 
@@ -13135,7 +13246,7 @@
             <p:nvPr/>
           </p:nvPicPr>
           <p:blipFill rotWithShape="1">
-            <a:blip r:embed="rId2"/>
+            <a:blip r:embed="rId3"/>
             <a:srcRect l="892" t="1244" r="865" b="691"/>
             <a:stretch/>
           </p:blipFill>
@@ -13158,7 +13269,7 @@
             <p:nvPr/>
           </p:nvPicPr>
           <p:blipFill>
-            <a:blip r:embed="rId3"/>
+            <a:blip r:embed="rId4"/>
             <a:stretch>
               <a:fillRect/>
             </a:stretch>
@@ -13267,7 +13378,7 @@
           <p:nvPr/>
         </p:nvPicPr>
         <p:blipFill>
-          <a:blip r:embed="rId2"/>
+          <a:blip r:embed="rId3"/>
           <a:stretch>
             <a:fillRect/>
           </a:stretch>

</xml_diff>

<commit_message>
add notes on figure revisions
</commit_message>
<xml_diff>
--- a/Figures/mih_paper_figures.pptx
+++ b/Figures/mih_paper_figures.pptx
@@ -778,7 +778,7 @@
           <a:p>
             <a:r>
               <a:rPr lang="en-US" dirty="0"/>
-              <a:t>Notes - Put legend on A? No line on C? Add units to C (territories/ha), make E(Species) like figure 1</a:t>
+              <a:t>Notes – Increase thickness of dotted line in A, increase dot size and line width of B and C. Put legend on A? No line on C? Add units to C (territories/ha), make E(Species) like figure 1</a:t>
             </a:r>
           </a:p>
         </p:txBody>
@@ -863,7 +863,10 @@
           <a:bodyPr/>
           <a:lstStyle/>
           <a:p>
-            <a:endParaRPr lang="en-US" dirty="0"/>
+            <a:r>
+              <a:rPr lang="en-US" dirty="0"/>
+              <a:t>Consistent capitalization of axis titles, labels/colors in C don’t match legend</a:t>
+            </a:r>
           </a:p>
         </p:txBody>
       </p:sp>

</xml_diff>

<commit_message>
fixed label issue, manually
</commit_message>
<xml_diff>
--- a/Figures/mih_paper_figures.pptx
+++ b/Figures/mih_paper_figures.pptx
@@ -204,7 +204,7 @@
           <a:p>
             <a:fld id="{11D58CBC-377E-2D41-95A0-D5F6A72FAB78}" type="datetimeFigureOut">
               <a:rPr lang="en-US" smtClean="0"/>
-              <a:t>6/14/19</a:t>
+              <a:t>6/25/2019</a:t>
             </a:fld>
             <a:endParaRPr lang="en-US"/>
           </a:p>
@@ -776,10 +776,7 @@
           <a:bodyPr/>
           <a:lstStyle/>
           <a:p>
-            <a:r>
-              <a:rPr lang="en-US" dirty="0"/>
-              <a:t>Notes – Increase thickness of dotted line in A, increase dot size and line width of B and C. Put legend on A? No line on C? Add units to C (territories/ha), make E(Species) like figure 1</a:t>
-            </a:r>
+            <a:endParaRPr lang="en-US" dirty="0"/>
           </a:p>
         </p:txBody>
       </p:sp>
@@ -863,10 +860,7 @@
           <a:bodyPr/>
           <a:lstStyle/>
           <a:p>
-            <a:r>
-              <a:rPr lang="en-US" dirty="0"/>
-              <a:t>Consistent capitalization of axis titles, labels/colors in C don’t match legend</a:t>
-            </a:r>
+            <a:endParaRPr lang="en-US" dirty="0"/>
           </a:p>
         </p:txBody>
       </p:sp>
@@ -1319,7 +1313,7 @@
           <a:p>
             <a:fld id="{2B014276-E290-3448-B189-1B145A2DBC63}" type="datetimeFigureOut">
               <a:rPr lang="en-US" smtClean="0"/>
-              <a:t>6/14/19</a:t>
+              <a:t>6/25/2019</a:t>
             </a:fld>
             <a:endParaRPr lang="en-US"/>
           </a:p>
@@ -1517,7 +1511,7 @@
           <a:p>
             <a:fld id="{2B014276-E290-3448-B189-1B145A2DBC63}" type="datetimeFigureOut">
               <a:rPr lang="en-US" smtClean="0"/>
-              <a:t>6/14/19</a:t>
+              <a:t>6/25/2019</a:t>
             </a:fld>
             <a:endParaRPr lang="en-US"/>
           </a:p>
@@ -1725,7 +1719,7 @@
           <a:p>
             <a:fld id="{2B014276-E290-3448-B189-1B145A2DBC63}" type="datetimeFigureOut">
               <a:rPr lang="en-US" smtClean="0"/>
-              <a:t>6/14/19</a:t>
+              <a:t>6/25/2019</a:t>
             </a:fld>
             <a:endParaRPr lang="en-US"/>
           </a:p>
@@ -1923,7 +1917,7 @@
           <a:p>
             <a:fld id="{2B014276-E290-3448-B189-1B145A2DBC63}" type="datetimeFigureOut">
               <a:rPr lang="en-US" smtClean="0"/>
-              <a:t>6/14/19</a:t>
+              <a:t>6/25/2019</a:t>
             </a:fld>
             <a:endParaRPr lang="en-US"/>
           </a:p>
@@ -2198,7 +2192,7 @@
           <a:p>
             <a:fld id="{2B014276-E290-3448-B189-1B145A2DBC63}" type="datetimeFigureOut">
               <a:rPr lang="en-US" smtClean="0"/>
-              <a:t>6/14/19</a:t>
+              <a:t>6/25/2019</a:t>
             </a:fld>
             <a:endParaRPr lang="en-US"/>
           </a:p>
@@ -2463,7 +2457,7 @@
           <a:p>
             <a:fld id="{2B014276-E290-3448-B189-1B145A2DBC63}" type="datetimeFigureOut">
               <a:rPr lang="en-US" smtClean="0"/>
-              <a:t>6/14/19</a:t>
+              <a:t>6/25/2019</a:t>
             </a:fld>
             <a:endParaRPr lang="en-US"/>
           </a:p>
@@ -2875,7 +2869,7 @@
           <a:p>
             <a:fld id="{2B014276-E290-3448-B189-1B145A2DBC63}" type="datetimeFigureOut">
               <a:rPr lang="en-US" smtClean="0"/>
-              <a:t>6/14/19</a:t>
+              <a:t>6/25/2019</a:t>
             </a:fld>
             <a:endParaRPr lang="en-US"/>
           </a:p>
@@ -3016,7 +3010,7 @@
           <a:p>
             <a:fld id="{2B014276-E290-3448-B189-1B145A2DBC63}" type="datetimeFigureOut">
               <a:rPr lang="en-US" smtClean="0"/>
-              <a:t>6/14/19</a:t>
+              <a:t>6/25/2019</a:t>
             </a:fld>
             <a:endParaRPr lang="en-US"/>
           </a:p>
@@ -3129,7 +3123,7 @@
           <a:p>
             <a:fld id="{2B014276-E290-3448-B189-1B145A2DBC63}" type="datetimeFigureOut">
               <a:rPr lang="en-US" smtClean="0"/>
-              <a:t>6/14/19</a:t>
+              <a:t>6/25/2019</a:t>
             </a:fld>
             <a:endParaRPr lang="en-US"/>
           </a:p>
@@ -3440,7 +3434,7 @@
           <a:p>
             <a:fld id="{2B014276-E290-3448-B189-1B145A2DBC63}" type="datetimeFigureOut">
               <a:rPr lang="en-US" smtClean="0"/>
-              <a:t>6/14/19</a:t>
+              <a:t>6/25/2019</a:t>
             </a:fld>
             <a:endParaRPr lang="en-US"/>
           </a:p>
@@ -3728,7 +3722,7 @@
           <a:p>
             <a:fld id="{2B014276-E290-3448-B189-1B145A2DBC63}" type="datetimeFigureOut">
               <a:rPr lang="en-US" smtClean="0"/>
-              <a:t>6/14/19</a:t>
+              <a:t>6/25/2019</a:t>
             </a:fld>
             <a:endParaRPr lang="en-US"/>
           </a:p>
@@ -3969,7 +3963,7 @@
           <a:p>
             <a:fld id="{2B014276-E290-3448-B189-1B145A2DBC63}" type="datetimeFigureOut">
               <a:rPr lang="en-US" smtClean="0"/>
-              <a:t>6/14/19</a:t>
+              <a:t>6/25/2019</a:t>
             </a:fld>
             <a:endParaRPr lang="en-US"/>
           </a:p>
@@ -10503,6 +10497,14 @@
   <p:clrMapOvr>
     <a:masterClrMapping/>
   </p:clrMapOvr>
+  <mc:AlternateContent xmlns:mc="http://schemas.openxmlformats.org/markup-compatibility/2006">
+    <mc:Choice xmlns:p14="http://schemas.microsoft.com/office/powerpoint/2010/main" Requires="p14">
+      <p:transition spd="slow" p14:dur="2000"/>
+    </mc:Choice>
+    <mc:Fallback>
+      <p:transition spd="slow"/>
+    </mc:Fallback>
+  </mc:AlternateContent>
 </p:sld>
 </file>
 
@@ -13320,7 +13322,7 @@
       </p:grpSpPr>
       <p:pic>
         <p:nvPicPr>
-          <p:cNvPr id="6" name="Picture 5"/>
+          <p:cNvPr id="2" name="Picture 1"/>
           <p:cNvPicPr>
             <a:picLocks noChangeAspect="1"/>
           </p:cNvPicPr>
@@ -13334,8 +13336,8 @@
         </p:blipFill>
         <p:spPr>
           <a:xfrm>
-            <a:off x="62630" y="1561231"/>
-            <a:ext cx="12038034" cy="3210142"/>
+            <a:off x="182273" y="1885361"/>
+            <a:ext cx="11693537" cy="3121240"/>
           </a:xfrm>
           <a:prstGeom prst="rect">
             <a:avLst/>
@@ -13374,7 +13376,7 @@
       </p:grpSpPr>
       <p:pic>
         <p:nvPicPr>
-          <p:cNvPr id="3" name="Picture 2"/>
+          <p:cNvPr id="2" name="Picture 1"/>
           <p:cNvPicPr>
             <a:picLocks noChangeAspect="1"/>
           </p:cNvPicPr>
@@ -13388,8 +13390,8 @@
         </p:blipFill>
         <p:spPr>
           <a:xfrm>
-            <a:off x="1095376" y="133350"/>
-            <a:ext cx="10380428" cy="6591301"/>
+            <a:off x="2092751" y="416665"/>
+            <a:ext cx="9076599" cy="6051066"/>
           </a:xfrm>
           <a:prstGeom prst="rect">
             <a:avLst/>

</xml_diff>

<commit_message>
working on figures for MS
</commit_message>
<xml_diff>
--- a/Figures/mih_paper_figures.pptx
+++ b/Figures/mih_paper_figures.pptx
@@ -13390,8 +13390,8 @@
         </p:blipFill>
         <p:spPr>
           <a:xfrm>
-            <a:off x="2092751" y="416665"/>
-            <a:ext cx="9076599" cy="6051066"/>
+            <a:off x="1555424" y="378957"/>
+            <a:ext cx="9529086" cy="6352724"/>
           </a:xfrm>
           <a:prstGeom prst="rect">
             <a:avLst/>

</xml_diff>

<commit_message>
fixed figure legends and labels
</commit_message>
<xml_diff>
--- a/Figures/mih_paper_figures.pptx
+++ b/Figures/mih_paper_figures.pptx
@@ -204,7 +204,7 @@
           <a:p>
             <a:fld id="{11D58CBC-377E-2D41-95A0-D5F6A72FAB78}" type="datetimeFigureOut">
               <a:rPr lang="en-US" smtClean="0"/>
-              <a:t>6/25/2019</a:t>
+              <a:t>6/26/2019</a:t>
             </a:fld>
             <a:endParaRPr lang="en-US"/>
           </a:p>
@@ -691,8 +691,13 @@
           <a:p>
             <a:r>
               <a:rPr lang="en-US" dirty="0"/>
-              <a:t>Notes - Add letters, consider changing color of BBC dots?, add Ontario to map, x label – mean NDVI? The rest say that, don’t sentence case Species Richness? Just should be uniform between figures</a:t>
+              <a:t>Notes - Add letters, consider changing color of BBC dots?, add Ontario to </a:t>
             </a:r>
+            <a:r>
+              <a:rPr lang="en-US" dirty="0" smtClean="0"/>
+              <a:t>map? </a:t>
+            </a:r>
+            <a:endParaRPr lang="en-US" dirty="0"/>
           </a:p>
         </p:txBody>
       </p:sp>
@@ -944,14 +949,6 @@
           <a:bodyPr/>
           <a:lstStyle/>
           <a:p>
-            <a:r>
-              <a:rPr lang="en-US" dirty="0"/>
-              <a:t>Notes</a:t>
-            </a:r>
-            <a:r>
-              <a:rPr lang="en-US" baseline="0" dirty="0"/>
-              <a:t> – fix legend, make both lines same color, label BBC and BBS in top corner of graph like figure 2, make dotted line the same CEX, match X and Y labels</a:t>
-            </a:r>
             <a:endParaRPr lang="en-US" dirty="0"/>
           </a:p>
         </p:txBody>
@@ -1313,7 +1310,7 @@
           <a:p>
             <a:fld id="{2B014276-E290-3448-B189-1B145A2DBC63}" type="datetimeFigureOut">
               <a:rPr lang="en-US" smtClean="0"/>
-              <a:t>6/25/2019</a:t>
+              <a:t>6/26/2019</a:t>
             </a:fld>
             <a:endParaRPr lang="en-US"/>
           </a:p>
@@ -1511,7 +1508,7 @@
           <a:p>
             <a:fld id="{2B014276-E290-3448-B189-1B145A2DBC63}" type="datetimeFigureOut">
               <a:rPr lang="en-US" smtClean="0"/>
-              <a:t>6/25/2019</a:t>
+              <a:t>6/26/2019</a:t>
             </a:fld>
             <a:endParaRPr lang="en-US"/>
           </a:p>
@@ -1719,7 +1716,7 @@
           <a:p>
             <a:fld id="{2B014276-E290-3448-B189-1B145A2DBC63}" type="datetimeFigureOut">
               <a:rPr lang="en-US" smtClean="0"/>
-              <a:t>6/25/2019</a:t>
+              <a:t>6/26/2019</a:t>
             </a:fld>
             <a:endParaRPr lang="en-US"/>
           </a:p>
@@ -1917,7 +1914,7 @@
           <a:p>
             <a:fld id="{2B014276-E290-3448-B189-1B145A2DBC63}" type="datetimeFigureOut">
               <a:rPr lang="en-US" smtClean="0"/>
-              <a:t>6/25/2019</a:t>
+              <a:t>6/26/2019</a:t>
             </a:fld>
             <a:endParaRPr lang="en-US"/>
           </a:p>
@@ -2192,7 +2189,7 @@
           <a:p>
             <a:fld id="{2B014276-E290-3448-B189-1B145A2DBC63}" type="datetimeFigureOut">
               <a:rPr lang="en-US" smtClean="0"/>
-              <a:t>6/25/2019</a:t>
+              <a:t>6/26/2019</a:t>
             </a:fld>
             <a:endParaRPr lang="en-US"/>
           </a:p>
@@ -2457,7 +2454,7 @@
           <a:p>
             <a:fld id="{2B014276-E290-3448-B189-1B145A2DBC63}" type="datetimeFigureOut">
               <a:rPr lang="en-US" smtClean="0"/>
-              <a:t>6/25/2019</a:t>
+              <a:t>6/26/2019</a:t>
             </a:fld>
             <a:endParaRPr lang="en-US"/>
           </a:p>
@@ -2869,7 +2866,7 @@
           <a:p>
             <a:fld id="{2B014276-E290-3448-B189-1B145A2DBC63}" type="datetimeFigureOut">
               <a:rPr lang="en-US" smtClean="0"/>
-              <a:t>6/25/2019</a:t>
+              <a:t>6/26/2019</a:t>
             </a:fld>
             <a:endParaRPr lang="en-US"/>
           </a:p>
@@ -3010,7 +3007,7 @@
           <a:p>
             <a:fld id="{2B014276-E290-3448-B189-1B145A2DBC63}" type="datetimeFigureOut">
               <a:rPr lang="en-US" smtClean="0"/>
-              <a:t>6/25/2019</a:t>
+              <a:t>6/26/2019</a:t>
             </a:fld>
             <a:endParaRPr lang="en-US"/>
           </a:p>
@@ -3123,7 +3120,7 @@
           <a:p>
             <a:fld id="{2B014276-E290-3448-B189-1B145A2DBC63}" type="datetimeFigureOut">
               <a:rPr lang="en-US" smtClean="0"/>
-              <a:t>6/25/2019</a:t>
+              <a:t>6/26/2019</a:t>
             </a:fld>
             <a:endParaRPr lang="en-US"/>
           </a:p>
@@ -3434,7 +3431,7 @@
           <a:p>
             <a:fld id="{2B014276-E290-3448-B189-1B145A2DBC63}" type="datetimeFigureOut">
               <a:rPr lang="en-US" smtClean="0"/>
-              <a:t>6/25/2019</a:t>
+              <a:t>6/26/2019</a:t>
             </a:fld>
             <a:endParaRPr lang="en-US"/>
           </a:p>
@@ -3722,7 +3719,7 @@
           <a:p>
             <a:fld id="{2B014276-E290-3448-B189-1B145A2DBC63}" type="datetimeFigureOut">
               <a:rPr lang="en-US" smtClean="0"/>
-              <a:t>6/25/2019</a:t>
+              <a:t>6/26/2019</a:t>
             </a:fld>
             <a:endParaRPr lang="en-US"/>
           </a:p>
@@ -3963,7 +3960,7 @@
           <a:p>
             <a:fld id="{2B014276-E290-3448-B189-1B145A2DBC63}" type="datetimeFigureOut">
               <a:rPr lang="en-US" smtClean="0"/>
-              <a:t>6/25/2019</a:t>
+              <a:t>6/26/2019</a:t>
             </a:fld>
             <a:endParaRPr lang="en-US"/>
           </a:p>
@@ -10497,11 +10494,11 @@
   <p:clrMapOvr>
     <a:masterClrMapping/>
   </p:clrMapOvr>
-  <mc:AlternateContent xmlns:mc="http://schemas.openxmlformats.org/markup-compatibility/2006">
-    <mc:Choice xmlns:p14="http://schemas.microsoft.com/office/powerpoint/2010/main" Requires="p14">
+  <mc:AlternateContent xmlns:mc="http://schemas.openxmlformats.org/markup-compatibility/2006" xmlns:p14="http://schemas.microsoft.com/office/powerpoint/2010/main">
+    <mc:Choice Requires="p14">
       <p:transition spd="slow" p14:dur="2000"/>
     </mc:Choice>
-    <mc:Fallback>
+    <mc:Fallback xmlns="">
       <p:transition spd="slow"/>
     </mc:Fallback>
   </mc:AlternateContent>
@@ -13228,68 +13225,53 @@
           <a:chExt cx="0" cy="0"/>
         </a:xfrm>
       </p:grpSpPr>
-      <p:grpSp>
-        <p:nvGrpSpPr>
-          <p:cNvPr id="11" name="Group 10"/>
-          <p:cNvGrpSpPr/>
-          <p:nvPr/>
-        </p:nvGrpSpPr>
-        <p:grpSpPr>
+      <p:pic>
+        <p:nvPicPr>
+          <p:cNvPr id="7" name="Picture 6"/>
+          <p:cNvPicPr>
+            <a:picLocks noChangeAspect="1"/>
+          </p:cNvPicPr>
+          <p:nvPr/>
+        </p:nvPicPr>
+        <p:blipFill rotWithShape="1">
+          <a:blip r:embed="rId3"/>
+          <a:srcRect l="892" t="1244" r="865" b="691"/>
+          <a:stretch/>
+        </p:blipFill>
+        <p:spPr>
           <a:xfrm>
-            <a:off x="76200" y="1255910"/>
-            <a:ext cx="12049125" cy="4565253"/>
-            <a:chOff x="76200" y="1255910"/>
-            <a:chExt cx="12049125" cy="4565253"/>
-          </a:xfrm>
-        </p:grpSpPr>
-        <p:pic>
-          <p:nvPicPr>
-            <p:cNvPr id="7" name="Picture 6"/>
-            <p:cNvPicPr>
-              <a:picLocks noChangeAspect="1"/>
-            </p:cNvPicPr>
-            <p:nvPr/>
-          </p:nvPicPr>
-          <p:blipFill rotWithShape="1">
-            <a:blip r:embed="rId3"/>
-            <a:srcRect l="892" t="1244" r="865" b="691"/>
-            <a:stretch/>
-          </p:blipFill>
-          <p:spPr>
-            <a:xfrm>
-              <a:off x="76200" y="1285875"/>
-              <a:ext cx="8391525" cy="4505325"/>
-            </a:xfrm>
-            <a:prstGeom prst="rect">
-              <a:avLst/>
-            </a:prstGeom>
-          </p:spPr>
-        </p:pic>
-        <p:pic>
-          <p:nvPicPr>
-            <p:cNvPr id="10" name="Picture 9"/>
-            <p:cNvPicPr>
-              <a:picLocks noChangeAspect="1"/>
-            </p:cNvPicPr>
-            <p:nvPr/>
-          </p:nvPicPr>
-          <p:blipFill>
-            <a:blip r:embed="rId4"/>
-            <a:stretch>
-              <a:fillRect/>
-            </a:stretch>
-          </p:blipFill>
-          <p:spPr>
-            <a:xfrm>
-              <a:off x="8467725" y="1255910"/>
-              <a:ext cx="3657600" cy="4565253"/>
-            </a:xfrm>
-            <a:prstGeom prst="rect">
-              <a:avLst/>
-            </a:prstGeom>
-          </p:spPr>
-        </p:pic>
-      </p:grpSp>
+            <a:off x="76200" y="1285875"/>
+            <a:ext cx="8391525" cy="4505325"/>
+          </a:xfrm>
+          <a:prstGeom prst="rect">
+            <a:avLst/>
+          </a:prstGeom>
+        </p:spPr>
+      </p:pic>
+      <p:pic>
+        <p:nvPicPr>
+          <p:cNvPr id="2" name="Picture 1"/>
+          <p:cNvPicPr>
+            <a:picLocks noChangeAspect="1"/>
+          </p:cNvPicPr>
+          <p:nvPr/>
+        </p:nvPicPr>
+        <p:blipFill>
+          <a:blip r:embed="rId4"/>
+          <a:stretch>
+            <a:fillRect/>
+          </a:stretch>
+        </p:blipFill>
+        <p:spPr>
+          <a:xfrm>
+            <a:off x="8360230" y="1285874"/>
+            <a:ext cx="3701546" cy="4620105"/>
+          </a:xfrm>
+          <a:prstGeom prst="rect">
+            <a:avLst/>
+          </a:prstGeom>
+        </p:spPr>
+      </p:pic>
     </p:spTree>
     <p:extLst>
       <p:ext uri="{BB962C8B-B14F-4D97-AF65-F5344CB8AC3E}">
@@ -13376,7 +13358,7 @@
       </p:grpSpPr>
       <p:pic>
         <p:nvPicPr>
-          <p:cNvPr id="2" name="Picture 1"/>
+          <p:cNvPr id="3" name="Picture 2"/>
           <p:cNvPicPr>
             <a:picLocks noChangeAspect="1"/>
           </p:cNvPicPr>
@@ -13390,8 +13372,8 @@
         </p:blipFill>
         <p:spPr>
           <a:xfrm>
-            <a:off x="1555424" y="378957"/>
-            <a:ext cx="9529086" cy="6352724"/>
+            <a:off x="1426866" y="25118"/>
+            <a:ext cx="10249320" cy="6832881"/>
           </a:xfrm>
           <a:prstGeom prst="rect">
             <a:avLst/>
@@ -13430,7 +13412,7 @@
       </p:grpSpPr>
       <p:pic>
         <p:nvPicPr>
-          <p:cNvPr id="2" name="Picture 1"/>
+          <p:cNvPr id="5" name="Picture 4"/>
           <p:cNvPicPr>
             <a:picLocks noChangeAspect="1"/>
           </p:cNvPicPr>
@@ -13444,8 +13426,8 @@
         </p:blipFill>
         <p:spPr>
           <a:xfrm>
-            <a:off x="1038224" y="1181100"/>
-            <a:ext cx="9342401" cy="4294491"/>
+            <a:off x="524107" y="342994"/>
+            <a:ext cx="11011033" cy="6292020"/>
           </a:xfrm>
           <a:prstGeom prst="rect">
             <a:avLst/>

</xml_diff>

<commit_message>
figs finalized for now
</commit_message>
<xml_diff>
--- a/Figures/mih_paper_figures.pptx
+++ b/Figures/mih_paper_figures.pptx
@@ -689,14 +689,6 @@
           <a:bodyPr/>
           <a:lstStyle/>
           <a:p>
-            <a:r>
-              <a:rPr lang="en-US" dirty="0"/>
-              <a:t>Notes - Add letters, consider changing color of BBC dots?, add Ontario to </a:t>
-            </a:r>
-            <a:r>
-              <a:rPr lang="en-US" dirty="0" smtClean="0"/>
-              <a:t>map? </a:t>
-            </a:r>
             <a:endParaRPr lang="en-US" dirty="0"/>
           </a:p>
         </p:txBody>
@@ -10719,8 +10711,17 @@
           <a:p>
             <a:r>
               <a:rPr lang="en-US" sz="1400" dirty="0"/>
-              <a:t>Number Individuals</a:t>
+              <a:t>Number </a:t>
             </a:r>
+            <a:r>
+              <a:rPr lang="en-US" sz="1400" dirty="0" smtClean="0"/>
+              <a:t>in</a:t>
+            </a:r>
+            <a:r>
+              <a:rPr lang="en-US" sz="1400" dirty="0" smtClean="0"/>
+              <a:t>dividuals</a:t>
+            </a:r>
+            <a:endParaRPr lang="en-US" sz="1400" dirty="0"/>
           </a:p>
         </p:txBody>
       </p:sp>
@@ -12048,8 +12049,8 @@
         </p:nvSpPr>
         <p:spPr>
           <a:xfrm rot="16200000">
-            <a:off x="2886748" y="4099351"/>
-            <a:ext cx="633906" cy="307777"/>
+            <a:off x="2573247" y="4121032"/>
+            <a:ext cx="1260910" cy="307777"/>
           </a:xfrm>
           <a:prstGeom prst="rect">
             <a:avLst/>
@@ -12064,8 +12065,13 @@
           <a:p>
             <a:r>
               <a:rPr lang="en-US" sz="1400" dirty="0"/>
-              <a:t> NDVI</a:t>
+              <a:t> </a:t>
             </a:r>
+            <a:r>
+              <a:rPr lang="en-US" sz="1400" dirty="0" smtClean="0"/>
+              <a:t>Mean NDVI</a:t>
+            </a:r>
+            <a:endParaRPr lang="en-US" sz="1400" dirty="0"/>
           </a:p>
         </p:txBody>
       </p:sp>
@@ -12876,8 +12882,21 @@
           <a:p>
             <a:r>
               <a:rPr lang="en-US" sz="1400" dirty="0"/>
-              <a:t>Mean Species Range</a:t>
+              <a:t>Mean </a:t>
             </a:r>
+            <a:r>
+              <a:rPr lang="en-US" sz="1400" dirty="0" smtClean="0"/>
+              <a:t>species </a:t>
+            </a:r>
+            <a:r>
+              <a:rPr lang="en-US" sz="1400" dirty="0"/>
+              <a:t>r</a:t>
+            </a:r>
+            <a:r>
+              <a:rPr lang="en-US" sz="1400" dirty="0" smtClean="0"/>
+              <a:t>ange</a:t>
+            </a:r>
+            <a:endParaRPr lang="en-US" sz="1400" dirty="0"/>
           </a:p>
         </p:txBody>
       </p:sp>
@@ -13225,53 +13244,194 @@
           <a:chExt cx="0" cy="0"/>
         </a:xfrm>
       </p:grpSpPr>
-      <p:pic>
-        <p:nvPicPr>
-          <p:cNvPr id="7" name="Picture 6"/>
-          <p:cNvPicPr>
-            <a:picLocks noChangeAspect="1"/>
-          </p:cNvPicPr>
-          <p:nvPr/>
-        </p:nvPicPr>
-        <p:blipFill rotWithShape="1">
-          <a:blip r:embed="rId3"/>
-          <a:srcRect l="892" t="1244" r="865" b="691"/>
-          <a:stretch/>
-        </p:blipFill>
-        <p:spPr>
+      <p:grpSp>
+        <p:nvGrpSpPr>
+          <p:cNvPr id="19" name="Group 18"/>
+          <p:cNvGrpSpPr/>
+          <p:nvPr/>
+        </p:nvGrpSpPr>
+        <p:grpSpPr>
           <a:xfrm>
-            <a:off x="76200" y="1285875"/>
-            <a:ext cx="8391525" cy="4505325"/>
-          </a:xfrm>
-          <a:prstGeom prst="rect">
-            <a:avLst/>
-          </a:prstGeom>
-        </p:spPr>
-      </p:pic>
-      <p:pic>
-        <p:nvPicPr>
-          <p:cNvPr id="2" name="Picture 1"/>
-          <p:cNvPicPr>
-            <a:picLocks noChangeAspect="1"/>
-          </p:cNvPicPr>
-          <p:nvPr/>
-        </p:nvPicPr>
-        <p:blipFill>
-          <a:blip r:embed="rId4"/>
-          <a:stretch>
-            <a:fillRect/>
-          </a:stretch>
-        </p:blipFill>
-        <p:spPr>
-          <a:xfrm>
-            <a:off x="8360230" y="1285874"/>
-            <a:ext cx="3701546" cy="4620105"/>
-          </a:xfrm>
-          <a:prstGeom prst="rect">
-            <a:avLst/>
-          </a:prstGeom>
-        </p:spPr>
-      </p:pic>
+            <a:off x="274634" y="1170381"/>
+            <a:ext cx="11559598" cy="4248640"/>
+            <a:chOff x="119784" y="1270542"/>
+            <a:chExt cx="11559598" cy="4248640"/>
+          </a:xfrm>
+        </p:grpSpPr>
+        <p:grpSp>
+          <p:nvGrpSpPr>
+            <p:cNvPr id="11" name="Group 10"/>
+            <p:cNvGrpSpPr/>
+            <p:nvPr/>
+          </p:nvGrpSpPr>
+          <p:grpSpPr>
+            <a:xfrm>
+              <a:off x="144379" y="1293708"/>
+              <a:ext cx="11535003" cy="4225474"/>
+              <a:chOff x="42999" y="1262705"/>
+              <a:chExt cx="11535003" cy="4225474"/>
+            </a:xfrm>
+          </p:grpSpPr>
+          <p:pic>
+            <p:nvPicPr>
+              <p:cNvPr id="4" name="Picture 3"/>
+              <p:cNvPicPr>
+                <a:picLocks noChangeAspect="1"/>
+              </p:cNvPicPr>
+              <p:nvPr/>
+            </p:nvPicPr>
+            <p:blipFill rotWithShape="1">
+              <a:blip r:embed="rId3"/>
+              <a:srcRect l="722" t="1102" r="2244" b="729"/>
+              <a:stretch/>
+            </p:blipFill>
+            <p:spPr>
+              <a:xfrm>
+                <a:off x="173254" y="1262705"/>
+                <a:ext cx="8070469" cy="4125313"/>
+              </a:xfrm>
+              <a:prstGeom prst="rect">
+                <a:avLst/>
+              </a:prstGeom>
+            </p:spPr>
+          </p:pic>
+          <p:sp>
+            <p:nvSpPr>
+              <p:cNvPr id="5" name="Rectangle 4"/>
+              <p:cNvSpPr/>
+              <p:nvPr/>
+            </p:nvSpPr>
+            <p:spPr>
+              <a:xfrm>
+                <a:off x="42999" y="1285871"/>
+                <a:ext cx="11535003" cy="4202308"/>
+              </a:xfrm>
+              <a:prstGeom prst="rect">
+                <a:avLst/>
+              </a:prstGeom>
+              <a:noFill/>
+              <a:ln>
+                <a:solidFill>
+                  <a:schemeClr val="tx1"/>
+                </a:solidFill>
+              </a:ln>
+            </p:spPr>
+            <p:style>
+              <a:lnRef idx="2">
+                <a:schemeClr val="accent1">
+                  <a:shade val="50000"/>
+                </a:schemeClr>
+              </a:lnRef>
+              <a:fillRef idx="1">
+                <a:schemeClr val="accent1"/>
+              </a:fillRef>
+              <a:effectRef idx="0">
+                <a:schemeClr val="accent1"/>
+              </a:effectRef>
+              <a:fontRef idx="minor">
+                <a:schemeClr val="lt1"/>
+              </a:fontRef>
+            </p:style>
+            <p:txBody>
+              <a:bodyPr rtlCol="0" anchor="ctr"/>
+              <a:lstStyle/>
+              <a:p>
+                <a:pPr algn="ctr"/>
+                <a:endParaRPr lang="en-US"/>
+              </a:p>
+            </p:txBody>
+          </p:sp>
+          <p:cxnSp>
+            <p:nvCxnSpPr>
+              <p:cNvPr id="9" name="Straight Connector 8"/>
+              <p:cNvCxnSpPr/>
+              <p:nvPr/>
+            </p:nvCxnSpPr>
+            <p:spPr>
+              <a:xfrm>
+                <a:off x="8237854" y="1285871"/>
+                <a:ext cx="0" cy="4186978"/>
+              </a:xfrm>
+              <a:prstGeom prst="line">
+                <a:avLst/>
+              </a:prstGeom>
+              <a:ln w="9525">
+                <a:solidFill>
+                  <a:schemeClr val="tx1"/>
+                </a:solidFill>
+              </a:ln>
+            </p:spPr>
+            <p:style>
+              <a:lnRef idx="1">
+                <a:schemeClr val="accent1"/>
+              </a:lnRef>
+              <a:fillRef idx="0">
+                <a:schemeClr val="accent1"/>
+              </a:fillRef>
+              <a:effectRef idx="0">
+                <a:schemeClr val="accent1"/>
+              </a:effectRef>
+              <a:fontRef idx="minor">
+                <a:schemeClr val="tx1"/>
+              </a:fontRef>
+            </p:style>
+          </p:cxnSp>
+        </p:grpSp>
+        <p:sp>
+          <p:nvSpPr>
+            <p:cNvPr id="17" name="TextBox 16"/>
+            <p:cNvSpPr txBox="1"/>
+            <p:nvPr/>
+          </p:nvSpPr>
+          <p:spPr>
+            <a:xfrm>
+              <a:off x="119784" y="1270542"/>
+              <a:ext cx="309700" cy="338554"/>
+            </a:xfrm>
+            <a:prstGeom prst="rect">
+              <a:avLst/>
+            </a:prstGeom>
+            <a:noFill/>
+          </p:spPr>
+          <p:txBody>
+            <a:bodyPr wrap="none" rtlCol="0">
+              <a:spAutoFit/>
+            </a:bodyPr>
+            <a:lstStyle/>
+            <a:p>
+              <a:r>
+                <a:rPr lang="en-US" sz="1600" b="1" dirty="0" smtClean="0"/>
+                <a:t>A</a:t>
+              </a:r>
+              <a:endParaRPr lang="en-US" sz="1600" b="1" dirty="0"/>
+            </a:p>
+          </p:txBody>
+        </p:sp>
+        <p:pic>
+          <p:nvPicPr>
+            <p:cNvPr id="18" name="Picture 17"/>
+            <p:cNvPicPr>
+              <a:picLocks noChangeAspect="1"/>
+            </p:cNvPicPr>
+            <p:nvPr/>
+          </p:nvPicPr>
+          <p:blipFill>
+            <a:blip r:embed="rId4"/>
+            <a:stretch>
+              <a:fillRect/>
+            </a:stretch>
+          </p:blipFill>
+          <p:spPr>
+            <a:xfrm>
+              <a:off x="8363830" y="1348866"/>
+              <a:ext cx="3315552" cy="4138324"/>
+            </a:xfrm>
+            <a:prstGeom prst="rect">
+              <a:avLst/>
+            </a:prstGeom>
+          </p:spPr>
+        </p:pic>
+      </p:grpSp>
     </p:spTree>
     <p:extLst>
       <p:ext uri="{BB962C8B-B14F-4D97-AF65-F5344CB8AC3E}">

</xml_diff>

<commit_message>
created experimental figure for 4
</commit_message>
<xml_diff>
--- a/Figures/mih_paper_figures.pptx
+++ b/Figures/mih_paper_figures.pptx
@@ -5,7 +5,7 @@
     <p:sldMasterId id="2147483648" r:id="rId1"/>
   </p:sldMasterIdLst>
   <p:notesMasterIdLst>
-    <p:notesMasterId r:id="rId10"/>
+    <p:notesMasterId r:id="rId11"/>
   </p:notesMasterIdLst>
   <p:sldIdLst>
     <p:sldId id="263" r:id="rId2"/>
@@ -14,8 +14,9 @@
     <p:sldId id="256" r:id="rId5"/>
     <p:sldId id="265" r:id="rId6"/>
     <p:sldId id="258" r:id="rId7"/>
-    <p:sldId id="260" r:id="rId8"/>
-    <p:sldId id="261" r:id="rId9"/>
+    <p:sldId id="266" r:id="rId8"/>
+    <p:sldId id="260" r:id="rId9"/>
+    <p:sldId id="261" r:id="rId10"/>
   </p:sldIdLst>
   <p:sldSz cx="12192000" cy="6858000"/>
   <p:notesSz cx="6858000" cy="9144000"/>
@@ -1049,7 +1050,7 @@
           <a:p>
             <a:fld id="{73BA172E-C57C-264D-B2C4-609C1A08C911}" type="slidenum">
               <a:rPr lang="en-US" smtClean="0"/>
-              <a:t>7</a:t>
+              <a:t>8</a:t>
             </a:fld>
             <a:endParaRPr lang="en-US"/>
           </a:p>
@@ -1136,7 +1137,7 @@
           <a:p>
             <a:fld id="{73BA172E-C57C-264D-B2C4-609C1A08C911}" type="slidenum">
               <a:rPr lang="en-US" smtClean="0"/>
-              <a:t>8</a:t>
+              <a:t>9</a:t>
             </a:fld>
             <a:endParaRPr lang="en-US"/>
           </a:p>
@@ -10715,11 +10716,7 @@
             </a:r>
             <a:r>
               <a:rPr lang="en-US" sz="1400" dirty="0" smtClean="0"/>
-              <a:t>in</a:t>
-            </a:r>
-            <a:r>
-              <a:rPr lang="en-US" sz="1400" dirty="0" smtClean="0"/>
-              <a:t>dividuals</a:t>
+              <a:t>individuals</a:t>
             </a:r>
             <a:endParaRPr lang="en-US" sz="1400" dirty="0"/>
           </a:p>
@@ -13626,6 +13623,204 @@
       </p:grpSpPr>
       <p:pic>
         <p:nvPicPr>
+          <p:cNvPr id="2" name="Picture 1"/>
+          <p:cNvPicPr>
+            <a:picLocks noChangeAspect="1"/>
+          </p:cNvPicPr>
+          <p:nvPr/>
+        </p:nvPicPr>
+        <p:blipFill>
+          <a:blip r:embed="rId2"/>
+          <a:stretch>
+            <a:fillRect/>
+          </a:stretch>
+        </p:blipFill>
+        <p:spPr>
+          <a:xfrm>
+            <a:off x="3426489" y="336871"/>
+            <a:ext cx="7271085" cy="6271311"/>
+          </a:xfrm>
+          <a:prstGeom prst="rect">
+            <a:avLst/>
+          </a:prstGeom>
+        </p:spPr>
+      </p:pic>
+      <p:sp>
+        <p:nvSpPr>
+          <p:cNvPr id="5" name="Rectangle 4"/>
+          <p:cNvSpPr/>
+          <p:nvPr/>
+        </p:nvSpPr>
+        <p:spPr>
+          <a:xfrm>
+            <a:off x="4101860" y="414194"/>
+            <a:ext cx="1087086" cy="5506497"/>
+          </a:xfrm>
+          <a:prstGeom prst="rect">
+            <a:avLst/>
+          </a:prstGeom>
+          <a:solidFill>
+            <a:schemeClr val="bg2">
+              <a:alpha val="54000"/>
+            </a:schemeClr>
+          </a:solidFill>
+          <a:ln>
+            <a:noFill/>
+          </a:ln>
+        </p:spPr>
+        <p:style>
+          <a:lnRef idx="2">
+            <a:schemeClr val="accent1">
+              <a:shade val="50000"/>
+            </a:schemeClr>
+          </a:lnRef>
+          <a:fillRef idx="1">
+            <a:schemeClr val="accent1"/>
+          </a:fillRef>
+          <a:effectRef idx="0">
+            <a:schemeClr val="accent1"/>
+          </a:effectRef>
+          <a:fontRef idx="minor">
+            <a:schemeClr val="lt1"/>
+          </a:fontRef>
+        </p:style>
+        <p:txBody>
+          <a:bodyPr rtlCol="0" anchor="ctr"/>
+          <a:lstStyle/>
+          <a:p>
+            <a:pPr algn="ctr"/>
+            <a:endParaRPr lang="en-US"/>
+          </a:p>
+        </p:txBody>
+      </p:sp>
+      <p:sp>
+        <p:nvSpPr>
+          <p:cNvPr id="8" name="Rectangle 7"/>
+          <p:cNvSpPr/>
+          <p:nvPr/>
+        </p:nvSpPr>
+        <p:spPr>
+          <a:xfrm>
+            <a:off x="6440536" y="414193"/>
+            <a:ext cx="1087086" cy="5506497"/>
+          </a:xfrm>
+          <a:prstGeom prst="rect">
+            <a:avLst/>
+          </a:prstGeom>
+          <a:solidFill>
+            <a:schemeClr val="bg2">
+              <a:alpha val="54000"/>
+            </a:schemeClr>
+          </a:solidFill>
+          <a:ln>
+            <a:noFill/>
+          </a:ln>
+        </p:spPr>
+        <p:style>
+          <a:lnRef idx="2">
+            <a:schemeClr val="accent1">
+              <a:shade val="50000"/>
+            </a:schemeClr>
+          </a:lnRef>
+          <a:fillRef idx="1">
+            <a:schemeClr val="accent1"/>
+          </a:fillRef>
+          <a:effectRef idx="0">
+            <a:schemeClr val="accent1"/>
+          </a:effectRef>
+          <a:fontRef idx="minor">
+            <a:schemeClr val="lt1"/>
+          </a:fontRef>
+        </p:style>
+        <p:txBody>
+          <a:bodyPr rtlCol="0" anchor="ctr"/>
+          <a:lstStyle/>
+          <a:p>
+            <a:pPr algn="ctr"/>
+            <a:endParaRPr lang="en-US"/>
+          </a:p>
+        </p:txBody>
+      </p:sp>
+      <p:sp>
+        <p:nvSpPr>
+          <p:cNvPr id="10" name="Rectangle 9"/>
+          <p:cNvSpPr/>
+          <p:nvPr/>
+        </p:nvSpPr>
+        <p:spPr>
+          <a:xfrm>
+            <a:off x="8779212" y="414194"/>
+            <a:ext cx="1087086" cy="5506497"/>
+          </a:xfrm>
+          <a:prstGeom prst="rect">
+            <a:avLst/>
+          </a:prstGeom>
+          <a:solidFill>
+            <a:schemeClr val="bg2">
+              <a:alpha val="54000"/>
+            </a:schemeClr>
+          </a:solidFill>
+          <a:ln>
+            <a:noFill/>
+          </a:ln>
+        </p:spPr>
+        <p:style>
+          <a:lnRef idx="2">
+            <a:schemeClr val="accent1">
+              <a:shade val="50000"/>
+            </a:schemeClr>
+          </a:lnRef>
+          <a:fillRef idx="1">
+            <a:schemeClr val="accent1"/>
+          </a:fillRef>
+          <a:effectRef idx="0">
+            <a:schemeClr val="accent1"/>
+          </a:effectRef>
+          <a:fontRef idx="minor">
+            <a:schemeClr val="lt1"/>
+          </a:fontRef>
+        </p:style>
+        <p:txBody>
+          <a:bodyPr rtlCol="0" anchor="ctr"/>
+          <a:lstStyle/>
+          <a:p>
+            <a:pPr algn="ctr"/>
+            <a:endParaRPr lang="en-US"/>
+          </a:p>
+        </p:txBody>
+      </p:sp>
+    </p:spTree>
+    <p:extLst>
+      <p:ext uri="{BB962C8B-B14F-4D97-AF65-F5344CB8AC3E}">
+        <p14:creationId xmlns:p14="http://schemas.microsoft.com/office/powerpoint/2010/main" val="2315181857"/>
+      </p:ext>
+    </p:extLst>
+  </p:cSld>
+  <p:clrMapOvr>
+    <a:masterClrMapping/>
+  </p:clrMapOvr>
+</p:sld>
+</file>
+
+<file path=ppt/slides/slide8.xml><?xml version="1.0" encoding="utf-8"?>
+<p:sld xmlns:a="http://schemas.openxmlformats.org/drawingml/2006/main" xmlns:r="http://schemas.openxmlformats.org/officeDocument/2006/relationships" xmlns:p="http://schemas.openxmlformats.org/presentationml/2006/main">
+  <p:cSld>
+    <p:spTree>
+      <p:nvGrpSpPr>
+        <p:cNvPr id="1" name=""/>
+        <p:cNvGrpSpPr/>
+        <p:nvPr/>
+      </p:nvGrpSpPr>
+      <p:grpSpPr>
+        <a:xfrm>
+          <a:off x="0" y="0"/>
+          <a:ext cx="0" cy="0"/>
+          <a:chOff x="0" y="0"/>
+          <a:chExt cx="0" cy="0"/>
+        </a:xfrm>
+      </p:grpSpPr>
+      <p:pic>
+        <p:nvPicPr>
           <p:cNvPr id="5" name="Picture 4">
             <a:extLst>
               <a:ext uri="{FF2B5EF4-FFF2-40B4-BE49-F238E27FC236}">
@@ -13667,7 +13862,7 @@
 </p:sld>
 </file>
 
-<file path=ppt/slides/slide8.xml><?xml version="1.0" encoding="utf-8"?>
+<file path=ppt/slides/slide9.xml><?xml version="1.0" encoding="utf-8"?>
 <p:sld xmlns:a="http://schemas.openxmlformats.org/drawingml/2006/main" xmlns:r="http://schemas.openxmlformats.org/officeDocument/2006/relationships" xmlns:p="http://schemas.openxmlformats.org/presentationml/2006/main">
   <p:cSld>
     <p:spTree>

</xml_diff>

<commit_message>
Add BBC landscape diversity analysis/figures
</commit_message>
<xml_diff>
--- a/Figures/mih_paper_figures.pptx
+++ b/Figures/mih_paper_figures.pptx
@@ -205,7 +205,7 @@
           <a:p>
             <a:fld id="{11D58CBC-377E-2D41-95A0-D5F6A72FAB78}" type="datetimeFigureOut">
               <a:rPr lang="en-US" smtClean="0"/>
-              <a:t>7/2/2019</a:t>
+              <a:t>1/28/2020</a:t>
             </a:fld>
             <a:endParaRPr lang="en-US"/>
           </a:p>
@@ -1303,7 +1303,7 @@
           <a:p>
             <a:fld id="{2B014276-E290-3448-B189-1B145A2DBC63}" type="datetimeFigureOut">
               <a:rPr lang="en-US" smtClean="0"/>
-              <a:t>7/2/2019</a:t>
+              <a:t>1/28/2020</a:t>
             </a:fld>
             <a:endParaRPr lang="en-US"/>
           </a:p>
@@ -1501,7 +1501,7 @@
           <a:p>
             <a:fld id="{2B014276-E290-3448-B189-1B145A2DBC63}" type="datetimeFigureOut">
               <a:rPr lang="en-US" smtClean="0"/>
-              <a:t>7/2/2019</a:t>
+              <a:t>1/28/2020</a:t>
             </a:fld>
             <a:endParaRPr lang="en-US"/>
           </a:p>
@@ -1709,7 +1709,7 @@
           <a:p>
             <a:fld id="{2B014276-E290-3448-B189-1B145A2DBC63}" type="datetimeFigureOut">
               <a:rPr lang="en-US" smtClean="0"/>
-              <a:t>7/2/2019</a:t>
+              <a:t>1/28/2020</a:t>
             </a:fld>
             <a:endParaRPr lang="en-US"/>
           </a:p>
@@ -1907,7 +1907,7 @@
           <a:p>
             <a:fld id="{2B014276-E290-3448-B189-1B145A2DBC63}" type="datetimeFigureOut">
               <a:rPr lang="en-US" smtClean="0"/>
-              <a:t>7/2/2019</a:t>
+              <a:t>1/28/2020</a:t>
             </a:fld>
             <a:endParaRPr lang="en-US"/>
           </a:p>
@@ -2182,7 +2182,7 @@
           <a:p>
             <a:fld id="{2B014276-E290-3448-B189-1B145A2DBC63}" type="datetimeFigureOut">
               <a:rPr lang="en-US" smtClean="0"/>
-              <a:t>7/2/2019</a:t>
+              <a:t>1/28/2020</a:t>
             </a:fld>
             <a:endParaRPr lang="en-US"/>
           </a:p>
@@ -2447,7 +2447,7 @@
           <a:p>
             <a:fld id="{2B014276-E290-3448-B189-1B145A2DBC63}" type="datetimeFigureOut">
               <a:rPr lang="en-US" smtClean="0"/>
-              <a:t>7/2/2019</a:t>
+              <a:t>1/28/2020</a:t>
             </a:fld>
             <a:endParaRPr lang="en-US"/>
           </a:p>
@@ -2859,7 +2859,7 @@
           <a:p>
             <a:fld id="{2B014276-E290-3448-B189-1B145A2DBC63}" type="datetimeFigureOut">
               <a:rPr lang="en-US" smtClean="0"/>
-              <a:t>7/2/2019</a:t>
+              <a:t>1/28/2020</a:t>
             </a:fld>
             <a:endParaRPr lang="en-US"/>
           </a:p>
@@ -3000,7 +3000,7 @@
           <a:p>
             <a:fld id="{2B014276-E290-3448-B189-1B145A2DBC63}" type="datetimeFigureOut">
               <a:rPr lang="en-US" smtClean="0"/>
-              <a:t>7/2/2019</a:t>
+              <a:t>1/28/2020</a:t>
             </a:fld>
             <a:endParaRPr lang="en-US"/>
           </a:p>
@@ -3113,7 +3113,7 @@
           <a:p>
             <a:fld id="{2B014276-E290-3448-B189-1B145A2DBC63}" type="datetimeFigureOut">
               <a:rPr lang="en-US" smtClean="0"/>
-              <a:t>7/2/2019</a:t>
+              <a:t>1/28/2020</a:t>
             </a:fld>
             <a:endParaRPr lang="en-US"/>
           </a:p>
@@ -3424,7 +3424,7 @@
           <a:p>
             <a:fld id="{2B014276-E290-3448-B189-1B145A2DBC63}" type="datetimeFigureOut">
               <a:rPr lang="en-US" smtClean="0"/>
-              <a:t>7/2/2019</a:t>
+              <a:t>1/28/2020</a:t>
             </a:fld>
             <a:endParaRPr lang="en-US"/>
           </a:p>
@@ -3712,7 +3712,7 @@
           <a:p>
             <a:fld id="{2B014276-E290-3448-B189-1B145A2DBC63}" type="datetimeFigureOut">
               <a:rPr lang="en-US" smtClean="0"/>
-              <a:t>7/2/2019</a:t>
+              <a:t>1/28/2020</a:t>
             </a:fld>
             <a:endParaRPr lang="en-US"/>
           </a:p>
@@ -3953,7 +3953,7 @@
           <a:p>
             <a:fld id="{2B014276-E290-3448-B189-1B145A2DBC63}" type="datetimeFigureOut">
               <a:rPr lang="en-US" smtClean="0"/>
-              <a:t>7/2/2019</a:t>
+              <a:t>1/28/2020</a:t>
             </a:fld>
             <a:endParaRPr lang="en-US"/>
           </a:p>
@@ -10523,7 +10523,7 @@
         </p:nvSpPr>
         <p:spPr>
           <a:xfrm>
-            <a:off x="5231521" y="2660998"/>
+            <a:off x="5255847" y="1845535"/>
             <a:ext cx="45719" cy="45719"/>
           </a:xfrm>
           <a:prstGeom prst="flowChartConnector">
@@ -10571,7 +10571,7 @@
         </p:nvSpPr>
         <p:spPr>
           <a:xfrm>
-            <a:off x="3515228" y="2669341"/>
+            <a:off x="3539554" y="1853878"/>
             <a:ext cx="45719" cy="45719"/>
           </a:xfrm>
           <a:prstGeom prst="flowChartConnector">
@@ -10619,7 +10619,7 @@
         </p:nvSpPr>
         <p:spPr>
           <a:xfrm>
-            <a:off x="5153733" y="1491765"/>
+            <a:off x="5178059" y="676302"/>
             <a:ext cx="45719" cy="45719"/>
           </a:xfrm>
           <a:prstGeom prst="flowChartConnector">
@@ -10667,7 +10667,7 @@
         </p:nvSpPr>
         <p:spPr>
           <a:xfrm>
-            <a:off x="4177396" y="2924520"/>
+            <a:off x="4201722" y="2109057"/>
             <a:ext cx="768346" cy="307777"/>
           </a:xfrm>
           <a:prstGeom prst="rect">
@@ -10696,7 +10696,7 @@
         </p:nvSpPr>
         <p:spPr>
           <a:xfrm rot="16200000">
-            <a:off x="2381312" y="1945352"/>
+            <a:off x="2405638" y="1129889"/>
             <a:ext cx="1646158" cy="307777"/>
           </a:xfrm>
           <a:prstGeom prst="rect">
@@ -10732,7 +10732,7 @@
         </p:nvCxnSpPr>
         <p:spPr>
           <a:xfrm flipV="1">
-            <a:off x="3560947" y="2683567"/>
+            <a:off x="3585273" y="1868104"/>
             <a:ext cx="1728800" cy="8634"/>
           </a:xfrm>
           <a:prstGeom prst="line">
@@ -10771,7 +10771,7 @@
         </p:nvCxnSpPr>
         <p:spPr>
           <a:xfrm flipV="1">
-            <a:off x="3554252" y="1514625"/>
+            <a:off x="3578578" y="699162"/>
             <a:ext cx="1599481" cy="1161411"/>
           </a:xfrm>
           <a:prstGeom prst="line">
@@ -10807,7 +10807,7 @@
         </p:nvCxnSpPr>
         <p:spPr>
           <a:xfrm>
-            <a:off x="3333448" y="1311367"/>
+            <a:off x="3357774" y="495904"/>
             <a:ext cx="0" cy="1636621"/>
           </a:xfrm>
           <a:prstGeom prst="line">
@@ -10842,7 +10842,7 @@
         </p:nvCxnSpPr>
         <p:spPr>
           <a:xfrm flipH="1">
-            <a:off x="3335838" y="2951655"/>
+            <a:off x="3360164" y="2136192"/>
             <a:ext cx="2039582" cy="2983"/>
           </a:xfrm>
           <a:prstGeom prst="line">
@@ -10877,7 +10877,7 @@
         </p:nvSpPr>
         <p:spPr>
           <a:xfrm rot="19458989">
-            <a:off x="4135789" y="1858674"/>
+            <a:off x="4160115" y="1043211"/>
             <a:ext cx="467918" cy="261610"/>
           </a:xfrm>
           <a:prstGeom prst="rect">
@@ -10906,7 +10906,7 @@
         </p:nvSpPr>
         <p:spPr>
           <a:xfrm>
-            <a:off x="4440489" y="2480585"/>
+            <a:off x="4464815" y="1665122"/>
             <a:ext cx="480256" cy="261610"/>
           </a:xfrm>
           <a:prstGeom prst="rect">
@@ -10936,7 +10936,7 @@
         </p:nvSpPr>
         <p:spPr>
           <a:xfrm>
-            <a:off x="3461848" y="2819367"/>
+            <a:off x="3486174" y="2003904"/>
             <a:ext cx="45719" cy="45719"/>
           </a:xfrm>
           <a:prstGeom prst="ellipse">
@@ -10988,7 +10988,7 @@
         </p:nvSpPr>
         <p:spPr>
           <a:xfrm>
-            <a:off x="3416903" y="2595593"/>
+            <a:off x="3441229" y="1780130"/>
             <a:ext cx="45719" cy="45719"/>
           </a:xfrm>
           <a:prstGeom prst="triangle">
@@ -11040,7 +11040,7 @@
         </p:nvSpPr>
         <p:spPr>
           <a:xfrm>
-            <a:off x="5222879" y="1431863"/>
+            <a:off x="5247205" y="616400"/>
             <a:ext cx="45719" cy="45719"/>
           </a:xfrm>
           <a:prstGeom prst="diamond">
@@ -11092,7 +11092,7 @@
         </p:nvSpPr>
         <p:spPr>
           <a:xfrm>
-            <a:off x="5773334" y="960118"/>
+            <a:off x="5797660" y="144655"/>
             <a:ext cx="329184" cy="369332"/>
           </a:xfrm>
           <a:prstGeom prst="rect">
@@ -11121,7 +11121,7 @@
         </p:nvSpPr>
         <p:spPr>
           <a:xfrm>
-            <a:off x="3125599" y="960118"/>
+            <a:off x="3149925" y="144655"/>
             <a:ext cx="329184" cy="369332"/>
           </a:xfrm>
           <a:prstGeom prst="rect">
@@ -11150,7 +11150,7 @@
         </p:nvSpPr>
         <p:spPr>
           <a:xfrm flipH="1">
-            <a:off x="3111180" y="3141699"/>
+            <a:off x="3135506" y="2326236"/>
             <a:ext cx="240792" cy="369332"/>
           </a:xfrm>
           <a:prstGeom prst="rect">
@@ -11179,7 +11179,7 @@
         </p:nvSpPr>
         <p:spPr>
           <a:xfrm>
-            <a:off x="5772421" y="3162983"/>
+            <a:off x="5796747" y="2347520"/>
             <a:ext cx="329184" cy="369332"/>
           </a:xfrm>
           <a:prstGeom prst="rect">
@@ -11208,7 +11208,7 @@
         </p:nvSpPr>
         <p:spPr>
           <a:xfrm>
-            <a:off x="6822534" y="2940754"/>
+            <a:off x="6846860" y="2125291"/>
             <a:ext cx="765957" cy="307777"/>
           </a:xfrm>
           <a:prstGeom prst="rect">
@@ -11237,8 +11237,8 @@
         </p:nvSpPr>
         <p:spPr>
           <a:xfrm rot="16200000">
-            <a:off x="5240082" y="1945353"/>
-            <a:ext cx="1169233" cy="307777"/>
+            <a:off x="5077089" y="1113951"/>
+            <a:ext cx="1543871" cy="307777"/>
           </a:xfrm>
           <a:prstGeom prst="rect">
             <a:avLst/>
@@ -11252,8 +11252,12 @@
           <a:lstStyle/>
           <a:p>
             <a:r>
+              <a:rPr lang="en-US" sz="1400" dirty="0" smtClean="0"/>
+              <a:t>Expected(Species</a:t>
+            </a:r>
+            <a:r>
               <a:rPr lang="en-US" sz="1400" dirty="0"/>
-              <a:t>E (Species)</a:t>
+              <a:t>)</a:t>
             </a:r>
           </a:p>
         </p:txBody>
@@ -11266,7 +11270,7 @@
         </p:nvCxnSpPr>
         <p:spPr>
           <a:xfrm>
-            <a:off x="5976197" y="1327601"/>
+            <a:off x="6000523" y="512138"/>
             <a:ext cx="0" cy="1636621"/>
           </a:xfrm>
           <a:prstGeom prst="line">
@@ -11301,7 +11305,7 @@
         </p:nvCxnSpPr>
         <p:spPr>
           <a:xfrm flipH="1">
-            <a:off x="5978587" y="2967889"/>
+            <a:off x="6002913" y="2152426"/>
             <a:ext cx="2039582" cy="2983"/>
           </a:xfrm>
           <a:prstGeom prst="line">
@@ -11336,7 +11340,7 @@
         </p:nvCxnSpPr>
         <p:spPr>
           <a:xfrm>
-            <a:off x="6017815" y="2031365"/>
+            <a:off x="6042141" y="1215902"/>
             <a:ext cx="2000354" cy="0"/>
           </a:xfrm>
           <a:prstGeom prst="line">
@@ -11372,7 +11376,7 @@
         </p:nvSpPr>
         <p:spPr>
           <a:xfrm>
-            <a:off x="7675147" y="1824055"/>
+            <a:off x="7699473" y="1008592"/>
             <a:ext cx="467918" cy="261610"/>
           </a:xfrm>
           <a:prstGeom prst="rect">
@@ -11401,7 +11405,7 @@
         </p:nvCxnSpPr>
         <p:spPr>
           <a:xfrm flipV="1">
-            <a:off x="6040317" y="1626582"/>
+            <a:off x="6064643" y="811119"/>
             <a:ext cx="1916121" cy="801724"/>
           </a:xfrm>
           <a:prstGeom prst="line">
@@ -11437,7 +11441,7 @@
         </p:nvSpPr>
         <p:spPr>
           <a:xfrm rot="20173288">
-            <a:off x="7590997" y="1461335"/>
+            <a:off x="7615323" y="645872"/>
             <a:ext cx="467918" cy="261610"/>
           </a:xfrm>
           <a:prstGeom prst="rect">
@@ -11467,7 +11471,7 @@
         </p:nvSpPr>
         <p:spPr>
           <a:xfrm>
-            <a:off x="3396667" y="2707718"/>
+            <a:off x="3420993" y="1892255"/>
             <a:ext cx="84103" cy="72423"/>
           </a:xfrm>
           <a:prstGeom prst="rect">
@@ -11515,7 +11519,7 @@
         </p:nvSpPr>
         <p:spPr>
           <a:xfrm>
-            <a:off x="3532997" y="2739507"/>
+            <a:off x="3557323" y="1924044"/>
             <a:ext cx="84103" cy="72423"/>
           </a:xfrm>
           <a:prstGeom prst="rect">
@@ -11563,7 +11567,7 @@
         </p:nvSpPr>
         <p:spPr>
           <a:xfrm>
-            <a:off x="5150409" y="1346437"/>
+            <a:off x="5174735" y="530974"/>
             <a:ext cx="45719" cy="45719"/>
           </a:xfrm>
           <a:prstGeom prst="triangle">
@@ -11615,7 +11619,7 @@
         </p:nvSpPr>
         <p:spPr>
           <a:xfrm>
-            <a:off x="5050936" y="1429810"/>
+            <a:off x="5075262" y="614347"/>
             <a:ext cx="45719" cy="45719"/>
           </a:xfrm>
           <a:prstGeom prst="triangle">
@@ -11667,7 +11671,7 @@
         </p:nvSpPr>
         <p:spPr>
           <a:xfrm>
-            <a:off x="5289747" y="1343894"/>
+            <a:off x="5314073" y="528431"/>
             <a:ext cx="45719" cy="45719"/>
           </a:xfrm>
           <a:prstGeom prst="ellipse">
@@ -11719,7 +11723,7 @@
         </p:nvSpPr>
         <p:spPr>
           <a:xfrm>
-            <a:off x="5231521" y="1535394"/>
+            <a:off x="5255847" y="719931"/>
             <a:ext cx="84103" cy="72423"/>
           </a:xfrm>
           <a:prstGeom prst="rect">
@@ -11767,7 +11771,7 @@
         </p:nvSpPr>
         <p:spPr>
           <a:xfrm>
-            <a:off x="5122937" y="1586138"/>
+            <a:off x="5147263" y="770675"/>
             <a:ext cx="84103" cy="72423"/>
           </a:xfrm>
           <a:prstGeom prst="rect">
@@ -11815,7 +11819,7 @@
         </p:nvSpPr>
         <p:spPr>
           <a:xfrm>
-            <a:off x="5335864" y="2646482"/>
+            <a:off x="5360190" y="1831019"/>
             <a:ext cx="45719" cy="45719"/>
           </a:xfrm>
           <a:prstGeom prst="diamond">
@@ -11867,7 +11871,7 @@
         </p:nvSpPr>
         <p:spPr>
           <a:xfrm>
-            <a:off x="5277239" y="2534788"/>
+            <a:off x="5301565" y="1719325"/>
             <a:ext cx="45719" cy="45719"/>
           </a:xfrm>
           <a:prstGeom prst="triangle">
@@ -11919,7 +11923,7 @@
         </p:nvSpPr>
         <p:spPr>
           <a:xfrm>
-            <a:off x="5392391" y="2548201"/>
+            <a:off x="5416717" y="1732738"/>
             <a:ext cx="45719" cy="45719"/>
           </a:xfrm>
           <a:prstGeom prst="ellipse">
@@ -11971,7 +11975,7 @@
         </p:nvSpPr>
         <p:spPr>
           <a:xfrm>
-            <a:off x="5268597" y="2735937"/>
+            <a:off x="5292923" y="1920474"/>
             <a:ext cx="84103" cy="72423"/>
           </a:xfrm>
           <a:prstGeom prst="rect">
@@ -12019,7 +12023,7 @@
         </p:nvSpPr>
         <p:spPr>
           <a:xfrm>
-            <a:off x="3988698" y="5104401"/>
+            <a:off x="4013024" y="4288938"/>
             <a:ext cx="765957" cy="307777"/>
           </a:xfrm>
           <a:prstGeom prst="rect">
@@ -12048,7 +12052,7 @@
         </p:nvSpPr>
         <p:spPr>
           <a:xfrm rot="16200000">
-            <a:off x="2573247" y="4121032"/>
+            <a:off x="2597573" y="3305569"/>
             <a:ext cx="1260910" cy="307777"/>
           </a:xfrm>
           <a:prstGeom prst="rect">
@@ -12082,7 +12086,7 @@
         </p:nvCxnSpPr>
         <p:spPr>
           <a:xfrm>
-            <a:off x="3349582" y="3468910"/>
+            <a:off x="3373908" y="2653447"/>
             <a:ext cx="0" cy="1636621"/>
           </a:xfrm>
           <a:prstGeom prst="line">
@@ -12117,7 +12121,7 @@
         </p:nvCxnSpPr>
         <p:spPr>
           <a:xfrm flipH="1">
-            <a:off x="3351972" y="5109198"/>
+            <a:off x="3376298" y="4293735"/>
             <a:ext cx="2039582" cy="2983"/>
           </a:xfrm>
           <a:prstGeom prst="line">
@@ -12152,7 +12156,7 @@
         </p:nvCxnSpPr>
         <p:spPr>
           <a:xfrm flipV="1">
-            <a:off x="3716860" y="3468910"/>
+            <a:off x="3741186" y="2653447"/>
             <a:ext cx="0" cy="722353"/>
           </a:xfrm>
           <a:prstGeom prst="line">
@@ -12188,7 +12192,7 @@
         </p:nvCxnSpPr>
         <p:spPr>
           <a:xfrm flipV="1">
-            <a:off x="3809264" y="3468910"/>
+            <a:off x="3833590" y="2653447"/>
             <a:ext cx="0" cy="722353"/>
           </a:xfrm>
           <a:prstGeom prst="line">
@@ -12224,7 +12228,7 @@
         </p:nvCxnSpPr>
         <p:spPr>
           <a:xfrm flipV="1">
-            <a:off x="3904432" y="3468908"/>
+            <a:off x="3928758" y="2653445"/>
             <a:ext cx="0" cy="722353"/>
           </a:xfrm>
           <a:prstGeom prst="line">
@@ -12260,7 +12264,7 @@
         </p:nvCxnSpPr>
         <p:spPr>
           <a:xfrm flipV="1">
-            <a:off x="4000409" y="3468908"/>
+            <a:off x="4024735" y="2653445"/>
             <a:ext cx="0" cy="1061157"/>
           </a:xfrm>
           <a:prstGeom prst="line">
@@ -12296,7 +12300,7 @@
         </p:nvCxnSpPr>
         <p:spPr>
           <a:xfrm flipV="1">
-            <a:off x="4101807" y="3468910"/>
+            <a:off x="4126133" y="2653447"/>
             <a:ext cx="0" cy="1061157"/>
           </a:xfrm>
           <a:prstGeom prst="line">
@@ -12332,7 +12336,7 @@
         </p:nvCxnSpPr>
         <p:spPr>
           <a:xfrm flipV="1">
-            <a:off x="4203811" y="3468910"/>
+            <a:off x="4228137" y="2653447"/>
             <a:ext cx="0" cy="1061157"/>
           </a:xfrm>
           <a:prstGeom prst="line">
@@ -12368,7 +12372,7 @@
         </p:nvCxnSpPr>
         <p:spPr>
           <a:xfrm flipV="1">
-            <a:off x="4309459" y="3468908"/>
+            <a:off x="4333785" y="2653445"/>
             <a:ext cx="0" cy="1407244"/>
           </a:xfrm>
           <a:prstGeom prst="line">
@@ -12404,7 +12408,7 @@
         </p:nvCxnSpPr>
         <p:spPr>
           <a:xfrm flipV="1">
-            <a:off x="4429102" y="3468908"/>
+            <a:off x="4453428" y="2653445"/>
             <a:ext cx="0" cy="1407244"/>
           </a:xfrm>
           <a:prstGeom prst="line">
@@ -12440,7 +12444,7 @@
         </p:nvCxnSpPr>
         <p:spPr>
           <a:xfrm flipV="1">
-            <a:off x="4542006" y="3468908"/>
+            <a:off x="4566332" y="2653445"/>
             <a:ext cx="0" cy="1407244"/>
           </a:xfrm>
           <a:prstGeom prst="line">
@@ -12476,7 +12480,7 @@
         </p:nvCxnSpPr>
         <p:spPr>
           <a:xfrm flipV="1">
-            <a:off x="4651297" y="3467781"/>
+            <a:off x="4675623" y="2652318"/>
             <a:ext cx="0" cy="1614282"/>
           </a:xfrm>
           <a:prstGeom prst="line">
@@ -12512,7 +12516,7 @@
         </p:nvCxnSpPr>
         <p:spPr>
           <a:xfrm flipV="1">
-            <a:off x="4752425" y="3467781"/>
+            <a:off x="4776751" y="2652318"/>
             <a:ext cx="0" cy="1614282"/>
           </a:xfrm>
           <a:prstGeom prst="line">
@@ -12548,7 +12552,7 @@
         </p:nvCxnSpPr>
         <p:spPr>
           <a:xfrm flipV="1">
-            <a:off x="4847229" y="3470906"/>
+            <a:off x="4871555" y="2655443"/>
             <a:ext cx="0" cy="1614282"/>
           </a:xfrm>
           <a:prstGeom prst="line">
@@ -12584,7 +12588,7 @@
         </p:nvCxnSpPr>
         <p:spPr>
           <a:xfrm flipV="1">
-            <a:off x="3625178" y="3467782"/>
+            <a:off x="3649504" y="2652319"/>
             <a:ext cx="0" cy="424753"/>
           </a:xfrm>
           <a:prstGeom prst="line">
@@ -12620,7 +12624,7 @@
         </p:nvCxnSpPr>
         <p:spPr>
           <a:xfrm flipV="1">
-            <a:off x="3532957" y="3467781"/>
+            <a:off x="3557283" y="2652318"/>
             <a:ext cx="0" cy="424753"/>
           </a:xfrm>
           <a:prstGeom prst="line">
@@ -12656,7 +12660,7 @@
         </p:nvCxnSpPr>
         <p:spPr>
           <a:xfrm flipV="1">
-            <a:off x="3438349" y="3467780"/>
+            <a:off x="3462675" y="2652317"/>
             <a:ext cx="0" cy="424753"/>
           </a:xfrm>
           <a:prstGeom prst="line">
@@ -12692,7 +12696,7 @@
         </p:nvCxnSpPr>
         <p:spPr>
           <a:xfrm flipV="1">
-            <a:off x="4953096" y="3467781"/>
+            <a:off x="4977422" y="2652318"/>
             <a:ext cx="0" cy="1614282"/>
           </a:xfrm>
           <a:prstGeom prst="line">
@@ -12728,7 +12732,7 @@
         </p:nvCxnSpPr>
         <p:spPr>
           <a:xfrm flipV="1">
-            <a:off x="5054224" y="3467781"/>
+            <a:off x="5078550" y="2652318"/>
             <a:ext cx="0" cy="1614282"/>
           </a:xfrm>
           <a:prstGeom prst="line">
@@ -12764,7 +12768,7 @@
         </p:nvCxnSpPr>
         <p:spPr>
           <a:xfrm flipV="1">
-            <a:off x="5149028" y="3470906"/>
+            <a:off x="5173354" y="2655443"/>
             <a:ext cx="0" cy="1614282"/>
           </a:xfrm>
           <a:prstGeom prst="line">
@@ -12800,7 +12804,7 @@
         </p:nvCxnSpPr>
         <p:spPr>
           <a:xfrm flipV="1">
-            <a:off x="5254380" y="3467780"/>
+            <a:off x="5278706" y="2652317"/>
             <a:ext cx="0" cy="1614282"/>
           </a:xfrm>
           <a:prstGeom prst="line">
@@ -12836,7 +12840,7 @@
         </p:nvSpPr>
         <p:spPr>
           <a:xfrm>
-            <a:off x="6824924" y="5094352"/>
+            <a:off x="6849250" y="4278889"/>
             <a:ext cx="765957" cy="307777"/>
           </a:xfrm>
           <a:prstGeom prst="rect">
@@ -12865,7 +12869,7 @@
         </p:nvSpPr>
         <p:spPr>
           <a:xfrm rot="16200000">
-            <a:off x="4969790" y="4100080"/>
+            <a:off x="4972828" y="3216792"/>
             <a:ext cx="1758470" cy="307777"/>
           </a:xfrm>
           <a:prstGeom prst="rect">
@@ -12885,7 +12889,7 @@
             </a:r>
             <a:r>
               <a:rPr lang="en-US" sz="1400" dirty="0" smtClean="0"/>
-              <a:t>species </a:t>
+              <a:t>NDVI </a:t>
             </a:r>
             <a:r>
               <a:rPr lang="en-US" sz="1400" dirty="0"/>
@@ -12907,7 +12911,7 @@
         </p:nvCxnSpPr>
         <p:spPr>
           <a:xfrm>
-            <a:off x="5978587" y="3481199"/>
+            <a:off x="6002913" y="2665736"/>
             <a:ext cx="0" cy="1636621"/>
           </a:xfrm>
           <a:prstGeom prst="line">
@@ -12942,7 +12946,7 @@
         </p:nvCxnSpPr>
         <p:spPr>
           <a:xfrm flipH="1">
-            <a:off x="5980977" y="5121487"/>
+            <a:off x="6005303" y="4306024"/>
             <a:ext cx="2039582" cy="2983"/>
           </a:xfrm>
           <a:prstGeom prst="line">
@@ -12977,7 +12981,7 @@
         </p:nvCxnSpPr>
         <p:spPr>
           <a:xfrm>
-            <a:off x="6080083" y="3523874"/>
+            <a:off x="6104409" y="2708411"/>
             <a:ext cx="1863628" cy="1551628"/>
           </a:xfrm>
           <a:prstGeom prst="line">
@@ -13013,7 +13017,7 @@
         </p:nvSpPr>
         <p:spPr>
           <a:xfrm>
-            <a:off x="5031364" y="1292708"/>
+            <a:off x="5055690" y="477245"/>
             <a:ext cx="45719" cy="45719"/>
           </a:xfrm>
           <a:prstGeom prst="triangle">
@@ -13065,7 +13069,7 @@
         </p:nvSpPr>
         <p:spPr>
           <a:xfrm>
-            <a:off x="4953096" y="1387103"/>
+            <a:off x="4977422" y="571640"/>
             <a:ext cx="45719" cy="45719"/>
           </a:xfrm>
           <a:prstGeom prst="triangle">
@@ -13117,7 +13121,7 @@
         </p:nvSpPr>
         <p:spPr>
           <a:xfrm>
-            <a:off x="5222878" y="1250660"/>
+            <a:off x="5247204" y="435197"/>
             <a:ext cx="45719" cy="45719"/>
           </a:xfrm>
           <a:prstGeom prst="ellipse">
@@ -13169,7 +13173,7 @@
         </p:nvSpPr>
         <p:spPr>
           <a:xfrm>
-            <a:off x="5310877" y="1463945"/>
+            <a:off x="5335203" y="648482"/>
             <a:ext cx="45719" cy="45719"/>
           </a:xfrm>
           <a:prstGeom prst="diamond">
@@ -13210,6 +13214,199 @@
           <a:p>
             <a:pPr algn="ctr"/>
             <a:endParaRPr lang="en-US"/>
+          </a:p>
+        </p:txBody>
+      </p:sp>
+      <p:sp>
+        <p:nvSpPr>
+          <p:cNvPr id="71" name="TextBox 70"/>
+          <p:cNvSpPr txBox="1"/>
+          <p:nvPr/>
+        </p:nvSpPr>
+        <p:spPr>
+          <a:xfrm>
+            <a:off x="4216777" y="6404569"/>
+            <a:ext cx="765957" cy="307777"/>
+          </a:xfrm>
+          <a:prstGeom prst="rect">
+            <a:avLst/>
+          </a:prstGeom>
+          <a:noFill/>
+        </p:spPr>
+        <p:txBody>
+          <a:bodyPr wrap="square" rtlCol="0">
+            <a:spAutoFit/>
+          </a:bodyPr>
+          <a:lstStyle/>
+          <a:p>
+            <a:r>
+              <a:rPr lang="en-US" sz="1400" dirty="0"/>
+              <a:t>NDVI</a:t>
+            </a:r>
+          </a:p>
+        </p:txBody>
+      </p:sp>
+      <p:sp>
+        <p:nvSpPr>
+          <p:cNvPr id="72" name="TextBox 71"/>
+          <p:cNvSpPr txBox="1"/>
+          <p:nvPr/>
+        </p:nvSpPr>
+        <p:spPr>
+          <a:xfrm rot="16200000">
+            <a:off x="2237090" y="5363018"/>
+            <a:ext cx="2007576" cy="307777"/>
+          </a:xfrm>
+          <a:prstGeom prst="rect">
+            <a:avLst/>
+          </a:prstGeom>
+          <a:noFill/>
+        </p:spPr>
+        <p:txBody>
+          <a:bodyPr wrap="square" rtlCol="0">
+            <a:spAutoFit/>
+          </a:bodyPr>
+          <a:lstStyle/>
+          <a:p>
+            <a:r>
+              <a:rPr lang="en-US" sz="1400" dirty="0"/>
+              <a:t>Foraging guild richness</a:t>
+            </a:r>
+          </a:p>
+        </p:txBody>
+      </p:sp>
+      <p:cxnSp>
+        <p:nvCxnSpPr>
+          <p:cNvPr id="73" name="Straight Connector 72"/>
+          <p:cNvCxnSpPr/>
+          <p:nvPr/>
+        </p:nvCxnSpPr>
+        <p:spPr>
+          <a:xfrm>
+            <a:off x="3372830" y="4795083"/>
+            <a:ext cx="0" cy="1636621"/>
+          </a:xfrm>
+          <a:prstGeom prst="line">
+            <a:avLst/>
+          </a:prstGeom>
+          <a:ln>
+            <a:solidFill>
+              <a:schemeClr val="tx1"/>
+            </a:solidFill>
+          </a:ln>
+        </p:spPr>
+        <p:style>
+          <a:lnRef idx="1">
+            <a:schemeClr val="accent1"/>
+          </a:lnRef>
+          <a:fillRef idx="0">
+            <a:schemeClr val="accent1"/>
+          </a:fillRef>
+          <a:effectRef idx="0">
+            <a:schemeClr val="accent1"/>
+          </a:effectRef>
+          <a:fontRef idx="minor">
+            <a:schemeClr val="tx1"/>
+          </a:fontRef>
+        </p:style>
+      </p:cxnSp>
+      <p:cxnSp>
+        <p:nvCxnSpPr>
+          <p:cNvPr id="74" name="Straight Connector 73"/>
+          <p:cNvCxnSpPr/>
+          <p:nvPr/>
+        </p:nvCxnSpPr>
+        <p:spPr>
+          <a:xfrm flipH="1">
+            <a:off x="3372830" y="6431704"/>
+            <a:ext cx="2039582" cy="2983"/>
+          </a:xfrm>
+          <a:prstGeom prst="line">
+            <a:avLst/>
+          </a:prstGeom>
+          <a:ln>
+            <a:solidFill>
+              <a:schemeClr val="tx1"/>
+            </a:solidFill>
+          </a:ln>
+        </p:spPr>
+        <p:style>
+          <a:lnRef idx="1">
+            <a:schemeClr val="accent1"/>
+          </a:lnRef>
+          <a:fillRef idx="0">
+            <a:schemeClr val="accent1"/>
+          </a:fillRef>
+          <a:effectRef idx="0">
+            <a:schemeClr val="accent1"/>
+          </a:effectRef>
+          <a:fontRef idx="minor">
+            <a:schemeClr val="tx1"/>
+          </a:fontRef>
+        </p:style>
+      </p:cxnSp>
+      <p:cxnSp>
+        <p:nvCxnSpPr>
+          <p:cNvPr id="75" name="Straight Connector 74"/>
+          <p:cNvCxnSpPr/>
+          <p:nvPr/>
+        </p:nvCxnSpPr>
+        <p:spPr>
+          <a:xfrm flipV="1">
+            <a:off x="3394767" y="4833831"/>
+            <a:ext cx="1926105" cy="1511865"/>
+          </a:xfrm>
+          <a:prstGeom prst="line">
+            <a:avLst/>
+          </a:prstGeom>
+          <a:ln w="19050">
+            <a:solidFill>
+              <a:schemeClr val="tx1"/>
+            </a:solidFill>
+            <a:prstDash val="solid"/>
+          </a:ln>
+        </p:spPr>
+        <p:style>
+          <a:lnRef idx="1">
+            <a:schemeClr val="accent1"/>
+          </a:lnRef>
+          <a:fillRef idx="0">
+            <a:schemeClr val="accent1"/>
+          </a:fillRef>
+          <a:effectRef idx="0">
+            <a:schemeClr val="accent1"/>
+          </a:effectRef>
+          <a:fontRef idx="minor">
+            <a:schemeClr val="tx1"/>
+          </a:fontRef>
+        </p:style>
+      </p:cxnSp>
+      <p:sp>
+        <p:nvSpPr>
+          <p:cNvPr id="78" name="TextBox 77"/>
+          <p:cNvSpPr txBox="1"/>
+          <p:nvPr/>
+        </p:nvSpPr>
+        <p:spPr>
+          <a:xfrm>
+            <a:off x="3111433" y="4450932"/>
+            <a:ext cx="566670" cy="369332"/>
+          </a:xfrm>
+          <a:prstGeom prst="rect">
+            <a:avLst/>
+          </a:prstGeom>
+          <a:noFill/>
+        </p:spPr>
+        <p:txBody>
+          <a:bodyPr wrap="square" rtlCol="0">
+            <a:spAutoFit/>
+          </a:bodyPr>
+          <a:lstStyle/>
+          <a:p>
+            <a:r>
+              <a:rPr lang="en-US" b="1" dirty="0"/>
+              <a:t>E</a:t>
+            </a:r>
           </a:p>
         </p:txBody>
       </p:sp>
@@ -13245,7 +13442,7 @@
       </p:grpSpPr>
       <p:pic>
         <p:nvPicPr>
-          <p:cNvPr id="3" name="Picture 2"/>
+          <p:cNvPr id="8" name="Picture 7"/>
           <p:cNvPicPr>
             <a:picLocks noChangeAspect="1"/>
           </p:cNvPicPr>
@@ -13253,13 +13450,13 @@
         </p:nvPicPr>
         <p:blipFill rotWithShape="1">
           <a:blip r:embed="rId3"/>
-          <a:srcRect l="774" t="1959" r="4263" b="1037"/>
+          <a:srcRect l="1755" t="2409" r="1791" b="12028"/>
           <a:stretch/>
         </p:blipFill>
         <p:spPr>
           <a:xfrm>
-            <a:off x="286076" y="1216713"/>
-            <a:ext cx="8208008" cy="4235116"/>
+            <a:off x="429484" y="1216713"/>
+            <a:ext cx="8173605" cy="4101736"/>
           </a:xfrm>
           <a:prstGeom prst="rect">
             <a:avLst/>

</xml_diff>

<commit_message>
updates to MS figures, include landscape heterogeneity in fig 2
</commit_message>
<xml_diff>
--- a/Figures/mih_paper_figures.pptx
+++ b/Figures/mih_paper_figures.pptx
@@ -205,7 +205,7 @@
           <a:p>
             <a:fld id="{11D58CBC-377E-2D41-95A0-D5F6A72FAB78}" type="datetimeFigureOut">
               <a:rPr lang="en-US" smtClean="0"/>
-              <a:t>1/28/2020</a:t>
+              <a:t>3/18/20</a:t>
             </a:fld>
             <a:endParaRPr lang="en-US"/>
           </a:p>
@@ -1303,7 +1303,7 @@
           <a:p>
             <a:fld id="{2B014276-E290-3448-B189-1B145A2DBC63}" type="datetimeFigureOut">
               <a:rPr lang="en-US" smtClean="0"/>
-              <a:t>1/28/2020</a:t>
+              <a:t>3/18/20</a:t>
             </a:fld>
             <a:endParaRPr lang="en-US"/>
           </a:p>
@@ -1501,7 +1501,7 @@
           <a:p>
             <a:fld id="{2B014276-E290-3448-B189-1B145A2DBC63}" type="datetimeFigureOut">
               <a:rPr lang="en-US" smtClean="0"/>
-              <a:t>1/28/2020</a:t>
+              <a:t>3/18/20</a:t>
             </a:fld>
             <a:endParaRPr lang="en-US"/>
           </a:p>
@@ -1709,7 +1709,7 @@
           <a:p>
             <a:fld id="{2B014276-E290-3448-B189-1B145A2DBC63}" type="datetimeFigureOut">
               <a:rPr lang="en-US" smtClean="0"/>
-              <a:t>1/28/2020</a:t>
+              <a:t>3/18/20</a:t>
             </a:fld>
             <a:endParaRPr lang="en-US"/>
           </a:p>
@@ -1907,7 +1907,7 @@
           <a:p>
             <a:fld id="{2B014276-E290-3448-B189-1B145A2DBC63}" type="datetimeFigureOut">
               <a:rPr lang="en-US" smtClean="0"/>
-              <a:t>1/28/2020</a:t>
+              <a:t>3/18/20</a:t>
             </a:fld>
             <a:endParaRPr lang="en-US"/>
           </a:p>
@@ -2182,7 +2182,7 @@
           <a:p>
             <a:fld id="{2B014276-E290-3448-B189-1B145A2DBC63}" type="datetimeFigureOut">
               <a:rPr lang="en-US" smtClean="0"/>
-              <a:t>1/28/2020</a:t>
+              <a:t>3/18/20</a:t>
             </a:fld>
             <a:endParaRPr lang="en-US"/>
           </a:p>
@@ -2447,7 +2447,7 @@
           <a:p>
             <a:fld id="{2B014276-E290-3448-B189-1B145A2DBC63}" type="datetimeFigureOut">
               <a:rPr lang="en-US" smtClean="0"/>
-              <a:t>1/28/2020</a:t>
+              <a:t>3/18/20</a:t>
             </a:fld>
             <a:endParaRPr lang="en-US"/>
           </a:p>
@@ -2859,7 +2859,7 @@
           <a:p>
             <a:fld id="{2B014276-E290-3448-B189-1B145A2DBC63}" type="datetimeFigureOut">
               <a:rPr lang="en-US" smtClean="0"/>
-              <a:t>1/28/2020</a:t>
+              <a:t>3/18/20</a:t>
             </a:fld>
             <a:endParaRPr lang="en-US"/>
           </a:p>
@@ -3000,7 +3000,7 @@
           <a:p>
             <a:fld id="{2B014276-E290-3448-B189-1B145A2DBC63}" type="datetimeFigureOut">
               <a:rPr lang="en-US" smtClean="0"/>
-              <a:t>1/28/2020</a:t>
+              <a:t>3/18/20</a:t>
             </a:fld>
             <a:endParaRPr lang="en-US"/>
           </a:p>
@@ -3113,7 +3113,7 @@
           <a:p>
             <a:fld id="{2B014276-E290-3448-B189-1B145A2DBC63}" type="datetimeFigureOut">
               <a:rPr lang="en-US" smtClean="0"/>
-              <a:t>1/28/2020</a:t>
+              <a:t>3/18/20</a:t>
             </a:fld>
             <a:endParaRPr lang="en-US"/>
           </a:p>
@@ -3424,7 +3424,7 @@
           <a:p>
             <a:fld id="{2B014276-E290-3448-B189-1B145A2DBC63}" type="datetimeFigureOut">
               <a:rPr lang="en-US" smtClean="0"/>
-              <a:t>1/28/2020</a:t>
+              <a:t>3/18/20</a:t>
             </a:fld>
             <a:endParaRPr lang="en-US"/>
           </a:p>
@@ -3712,7 +3712,7 @@
           <a:p>
             <a:fld id="{2B014276-E290-3448-B189-1B145A2DBC63}" type="datetimeFigureOut">
               <a:rPr lang="en-US" smtClean="0"/>
-              <a:t>1/28/2020</a:t>
+              <a:t>3/18/20</a:t>
             </a:fld>
             <a:endParaRPr lang="en-US"/>
           </a:p>
@@ -3953,7 +3953,7 @@
           <a:p>
             <a:fld id="{2B014276-E290-3448-B189-1B145A2DBC63}" type="datetimeFigureOut">
               <a:rPr lang="en-US" smtClean="0"/>
-              <a:t>1/28/2020</a:t>
+              <a:t>3/18/20</a:t>
             </a:fld>
             <a:endParaRPr lang="en-US"/>
           </a:p>
@@ -10487,14 +10487,6 @@
   <p:clrMapOvr>
     <a:masterClrMapping/>
   </p:clrMapOvr>
-  <mc:AlternateContent xmlns:mc="http://schemas.openxmlformats.org/markup-compatibility/2006" xmlns:p14="http://schemas.microsoft.com/office/powerpoint/2010/main">
-    <mc:Choice Requires="p14">
-      <p:transition spd="slow" p14:dur="2000"/>
-    </mc:Choice>
-    <mc:Fallback xmlns="">
-      <p:transition spd="slow"/>
-    </mc:Fallback>
-  </mc:AlternateContent>
 </p:sld>
 </file>
 
@@ -10712,13 +10704,8 @@
           <a:p>
             <a:r>
               <a:rPr lang="en-US" sz="1400" dirty="0"/>
-              <a:t>Number </a:t>
+              <a:t>Number individuals</a:t>
             </a:r>
-            <a:r>
-              <a:rPr lang="en-US" sz="1400" dirty="0" smtClean="0"/>
-              <a:t>individuals</a:t>
-            </a:r>
-            <a:endParaRPr lang="en-US" sz="1400" dirty="0"/>
           </a:p>
         </p:txBody>
       </p:sp>
@@ -10921,10 +10908,9 @@
           <a:lstStyle/>
           <a:p>
             <a:r>
-              <a:rPr lang="en-US" sz="1100" dirty="0" smtClean="0"/>
+              <a:rPr lang="en-US" sz="1100" dirty="0"/>
               <a:t>NSH</a:t>
             </a:r>
-            <a:endParaRPr lang="en-US" sz="1100" dirty="0"/>
           </a:p>
         </p:txBody>
       </p:sp>
@@ -11252,12 +11238,8 @@
           <a:lstStyle/>
           <a:p>
             <a:r>
-              <a:rPr lang="en-US" sz="1400" dirty="0" smtClean="0"/>
-              <a:t>Expected(Species</a:t>
-            </a:r>
-            <a:r>
               <a:rPr lang="en-US" sz="1400" dirty="0"/>
-              <a:t>)</a:t>
+              <a:t>Expected(Species)</a:t>
             </a:r>
           </a:p>
         </p:txBody>
@@ -11456,10 +11438,9 @@
           <a:lstStyle/>
           <a:p>
             <a:r>
-              <a:rPr lang="en-US" sz="1100" dirty="0" smtClean="0"/>
+              <a:rPr lang="en-US" sz="1100" dirty="0"/>
               <a:t>NSH</a:t>
             </a:r>
-            <a:endParaRPr lang="en-US" sz="1100" dirty="0"/>
           </a:p>
         </p:txBody>
       </p:sp>
@@ -12068,13 +12049,8 @@
           <a:p>
             <a:r>
               <a:rPr lang="en-US" sz="1400" dirty="0"/>
-              <a:t> </a:t>
+              <a:t> Mean NDVI</a:t>
             </a:r>
-            <a:r>
-              <a:rPr lang="en-US" sz="1400" dirty="0" smtClean="0"/>
-              <a:t>Mean NDVI</a:t>
-            </a:r>
-            <a:endParaRPr lang="en-US" sz="1400" dirty="0"/>
           </a:p>
         </p:txBody>
       </p:sp>
@@ -12885,21 +12861,8 @@
           <a:p>
             <a:r>
               <a:rPr lang="en-US" sz="1400" dirty="0"/>
-              <a:t>Mean </a:t>
+              <a:t>Mean NDVI range</a:t>
             </a:r>
-            <a:r>
-              <a:rPr lang="en-US" sz="1400" dirty="0" smtClean="0"/>
-              <a:t>NDVI </a:t>
-            </a:r>
-            <a:r>
-              <a:rPr lang="en-US" sz="1400" dirty="0"/>
-              <a:t>r</a:t>
-            </a:r>
-            <a:r>
-              <a:rPr lang="en-US" sz="1400" dirty="0" smtClean="0"/>
-              <a:t>ange</a:t>
-            </a:r>
-            <a:endParaRPr lang="en-US" sz="1400" dirty="0"/>
           </a:p>
         </p:txBody>
       </p:sp>
@@ -13455,110 +13418,14 @@
         </p:blipFill>
         <p:spPr>
           <a:xfrm>
-            <a:off x="429484" y="1216713"/>
-            <a:ext cx="8173605" cy="4101736"/>
+            <a:off x="4065028" y="86586"/>
+            <a:ext cx="4302895" cy="2159309"/>
           </a:xfrm>
           <a:prstGeom prst="rect">
             <a:avLst/>
           </a:prstGeom>
         </p:spPr>
       </p:pic>
-      <p:grpSp>
-        <p:nvGrpSpPr>
-          <p:cNvPr id="11" name="Group 10"/>
-          <p:cNvGrpSpPr/>
-          <p:nvPr/>
-        </p:nvGrpSpPr>
-        <p:grpSpPr>
-          <a:xfrm>
-            <a:off x="299229" y="1216713"/>
-            <a:ext cx="11535003" cy="4202308"/>
-            <a:chOff x="42999" y="1285871"/>
-            <a:chExt cx="11535003" cy="4202308"/>
-          </a:xfrm>
-        </p:grpSpPr>
-        <p:sp>
-          <p:nvSpPr>
-            <p:cNvPr id="5" name="Rectangle 4"/>
-            <p:cNvSpPr/>
-            <p:nvPr/>
-          </p:nvSpPr>
-          <p:spPr>
-            <a:xfrm>
-              <a:off x="42999" y="1285871"/>
-              <a:ext cx="11535003" cy="4202308"/>
-            </a:xfrm>
-            <a:prstGeom prst="rect">
-              <a:avLst/>
-            </a:prstGeom>
-            <a:noFill/>
-            <a:ln>
-              <a:solidFill>
-                <a:schemeClr val="tx1"/>
-              </a:solidFill>
-            </a:ln>
-          </p:spPr>
-          <p:style>
-            <a:lnRef idx="2">
-              <a:schemeClr val="accent1">
-                <a:shade val="50000"/>
-              </a:schemeClr>
-            </a:lnRef>
-            <a:fillRef idx="1">
-              <a:schemeClr val="accent1"/>
-            </a:fillRef>
-            <a:effectRef idx="0">
-              <a:schemeClr val="accent1"/>
-            </a:effectRef>
-            <a:fontRef idx="minor">
-              <a:schemeClr val="lt1"/>
-            </a:fontRef>
-          </p:style>
-          <p:txBody>
-            <a:bodyPr rtlCol="0" anchor="ctr"/>
-            <a:lstStyle/>
-            <a:p>
-              <a:pPr algn="ctr"/>
-              <a:endParaRPr lang="en-US"/>
-            </a:p>
-          </p:txBody>
-        </p:sp>
-        <p:cxnSp>
-          <p:nvCxnSpPr>
-            <p:cNvPr id="9" name="Straight Connector 8"/>
-            <p:cNvCxnSpPr/>
-            <p:nvPr/>
-          </p:nvCxnSpPr>
-          <p:spPr>
-            <a:xfrm>
-              <a:off x="8237854" y="1285871"/>
-              <a:ext cx="0" cy="4186978"/>
-            </a:xfrm>
-            <a:prstGeom prst="line">
-              <a:avLst/>
-            </a:prstGeom>
-            <a:ln w="9525">
-              <a:solidFill>
-                <a:schemeClr val="tx1"/>
-              </a:solidFill>
-            </a:ln>
-          </p:spPr>
-          <p:style>
-            <a:lnRef idx="1">
-              <a:schemeClr val="accent1"/>
-            </a:lnRef>
-            <a:fillRef idx="0">
-              <a:schemeClr val="accent1"/>
-            </a:fillRef>
-            <a:effectRef idx="0">
-              <a:schemeClr val="accent1"/>
-            </a:effectRef>
-            <a:fontRef idx="minor">
-              <a:schemeClr val="tx1"/>
-            </a:fontRef>
-          </p:style>
-        </p:cxnSp>
-      </p:grpSp>
       <p:sp>
         <p:nvSpPr>
           <p:cNvPr id="17" name="TextBox 16"/>
@@ -13567,8 +13434,8 @@
         </p:nvSpPr>
         <p:spPr>
           <a:xfrm>
-            <a:off x="274634" y="1231154"/>
-            <a:ext cx="309700" cy="338554"/>
+            <a:off x="3991163" y="29496"/>
+            <a:ext cx="269626" cy="261610"/>
           </a:xfrm>
           <a:prstGeom prst="rect">
             <a:avLst/>
@@ -13582,16 +13449,21 @@
           <a:lstStyle/>
           <a:p>
             <a:r>
-              <a:rPr lang="en-US" sz="1600" b="1" dirty="0" smtClean="0"/>
+              <a:rPr lang="en-US" sz="1100" b="1" dirty="0"/>
               <a:t>A</a:t>
             </a:r>
-            <a:endParaRPr lang="en-US" sz="1600" b="1" dirty="0"/>
           </a:p>
         </p:txBody>
       </p:sp>
       <p:pic>
         <p:nvPicPr>
-          <p:cNvPr id="18" name="Picture 17"/>
+          <p:cNvPr id="3" name="Picture 2">
+            <a:extLst>
+              <a:ext uri="{FF2B5EF4-FFF2-40B4-BE49-F238E27FC236}">
+                <a16:creationId xmlns:a16="http://schemas.microsoft.com/office/drawing/2014/main" id="{15923D00-2CE5-A743-8D79-10803128E602}"/>
+              </a:ext>
+            </a:extLst>
+          </p:cNvPr>
           <p:cNvPicPr>
             <a:picLocks noChangeAspect="1"/>
           </p:cNvPicPr>
@@ -13605,8 +13477,8 @@
         </p:blipFill>
         <p:spPr>
           <a:xfrm>
-            <a:off x="8518680" y="1248705"/>
-            <a:ext cx="3315552" cy="4138324"/>
+            <a:off x="4065028" y="2473490"/>
+            <a:ext cx="4297925" cy="4297925"/>
           </a:xfrm>
           <a:prstGeom prst="rect">
             <a:avLst/>

</xml_diff>

<commit_message>
Make figure sizes consistent
</commit_message>
<xml_diff>
--- a/Figures/mih_paper_figures.pptx
+++ b/Figures/mih_paper_figures.pptx
@@ -205,7 +205,7 @@
           <a:p>
             <a:fld id="{11D58CBC-377E-2D41-95A0-D5F6A72FAB78}" type="datetimeFigureOut">
               <a:rPr lang="en-US" smtClean="0"/>
-              <a:t>3/18/20</a:t>
+              <a:t>3/26/20</a:t>
             </a:fld>
             <a:endParaRPr lang="en-US"/>
           </a:p>
@@ -1303,7 +1303,7 @@
           <a:p>
             <a:fld id="{2B014276-E290-3448-B189-1B145A2DBC63}" type="datetimeFigureOut">
               <a:rPr lang="en-US" smtClean="0"/>
-              <a:t>3/18/20</a:t>
+              <a:t>3/26/20</a:t>
             </a:fld>
             <a:endParaRPr lang="en-US"/>
           </a:p>
@@ -1501,7 +1501,7 @@
           <a:p>
             <a:fld id="{2B014276-E290-3448-B189-1B145A2DBC63}" type="datetimeFigureOut">
               <a:rPr lang="en-US" smtClean="0"/>
-              <a:t>3/18/20</a:t>
+              <a:t>3/26/20</a:t>
             </a:fld>
             <a:endParaRPr lang="en-US"/>
           </a:p>
@@ -1709,7 +1709,7 @@
           <a:p>
             <a:fld id="{2B014276-E290-3448-B189-1B145A2DBC63}" type="datetimeFigureOut">
               <a:rPr lang="en-US" smtClean="0"/>
-              <a:t>3/18/20</a:t>
+              <a:t>3/26/20</a:t>
             </a:fld>
             <a:endParaRPr lang="en-US"/>
           </a:p>
@@ -1907,7 +1907,7 @@
           <a:p>
             <a:fld id="{2B014276-E290-3448-B189-1B145A2DBC63}" type="datetimeFigureOut">
               <a:rPr lang="en-US" smtClean="0"/>
-              <a:t>3/18/20</a:t>
+              <a:t>3/26/20</a:t>
             </a:fld>
             <a:endParaRPr lang="en-US"/>
           </a:p>
@@ -2182,7 +2182,7 @@
           <a:p>
             <a:fld id="{2B014276-E290-3448-B189-1B145A2DBC63}" type="datetimeFigureOut">
               <a:rPr lang="en-US" smtClean="0"/>
-              <a:t>3/18/20</a:t>
+              <a:t>3/26/20</a:t>
             </a:fld>
             <a:endParaRPr lang="en-US"/>
           </a:p>
@@ -2447,7 +2447,7 @@
           <a:p>
             <a:fld id="{2B014276-E290-3448-B189-1B145A2DBC63}" type="datetimeFigureOut">
               <a:rPr lang="en-US" smtClean="0"/>
-              <a:t>3/18/20</a:t>
+              <a:t>3/26/20</a:t>
             </a:fld>
             <a:endParaRPr lang="en-US"/>
           </a:p>
@@ -2859,7 +2859,7 @@
           <a:p>
             <a:fld id="{2B014276-E290-3448-B189-1B145A2DBC63}" type="datetimeFigureOut">
               <a:rPr lang="en-US" smtClean="0"/>
-              <a:t>3/18/20</a:t>
+              <a:t>3/26/20</a:t>
             </a:fld>
             <a:endParaRPr lang="en-US"/>
           </a:p>
@@ -3000,7 +3000,7 @@
           <a:p>
             <a:fld id="{2B014276-E290-3448-B189-1B145A2DBC63}" type="datetimeFigureOut">
               <a:rPr lang="en-US" smtClean="0"/>
-              <a:t>3/18/20</a:t>
+              <a:t>3/26/20</a:t>
             </a:fld>
             <a:endParaRPr lang="en-US"/>
           </a:p>
@@ -3113,7 +3113,7 @@
           <a:p>
             <a:fld id="{2B014276-E290-3448-B189-1B145A2DBC63}" type="datetimeFigureOut">
               <a:rPr lang="en-US" smtClean="0"/>
-              <a:t>3/18/20</a:t>
+              <a:t>3/26/20</a:t>
             </a:fld>
             <a:endParaRPr lang="en-US"/>
           </a:p>
@@ -3424,7 +3424,7 @@
           <a:p>
             <a:fld id="{2B014276-E290-3448-B189-1B145A2DBC63}" type="datetimeFigureOut">
               <a:rPr lang="en-US" smtClean="0"/>
-              <a:t>3/18/20</a:t>
+              <a:t>3/26/20</a:t>
             </a:fld>
             <a:endParaRPr lang="en-US"/>
           </a:p>
@@ -3712,7 +3712,7 @@
           <a:p>
             <a:fld id="{2B014276-E290-3448-B189-1B145A2DBC63}" type="datetimeFigureOut">
               <a:rPr lang="en-US" smtClean="0"/>
-              <a:t>3/18/20</a:t>
+              <a:t>3/26/20</a:t>
             </a:fld>
             <a:endParaRPr lang="en-US"/>
           </a:p>
@@ -3953,7 +3953,7 @@
           <a:p>
             <a:fld id="{2B014276-E290-3448-B189-1B145A2DBC63}" type="datetimeFigureOut">
               <a:rPr lang="en-US" smtClean="0"/>
-              <a:t>3/18/20</a:t>
+              <a:t>3/26/20</a:t>
             </a:fld>
             <a:endParaRPr lang="en-US"/>
           </a:p>
@@ -13405,21 +13405,28 @@
       </p:grpSpPr>
       <p:pic>
         <p:nvPicPr>
-          <p:cNvPr id="8" name="Picture 7"/>
+          <p:cNvPr id="15" name="Picture 14" descr="A picture containing text, map&#10;&#10;Description automatically generated">
+            <a:extLst>
+              <a:ext uri="{FF2B5EF4-FFF2-40B4-BE49-F238E27FC236}">
+                <a16:creationId xmlns:a16="http://schemas.microsoft.com/office/drawing/2014/main" id="{8D4E7614-8DE2-3145-8FE0-97031A39A8DE}"/>
+              </a:ext>
+            </a:extLst>
+          </p:cNvPr>
           <p:cNvPicPr>
             <a:picLocks noChangeAspect="1"/>
           </p:cNvPicPr>
           <p:nvPr/>
         </p:nvPicPr>
-        <p:blipFill rotWithShape="1">
+        <p:blipFill>
           <a:blip r:embed="rId3"/>
-          <a:srcRect l="1755" t="2409" r="1791" b="12028"/>
-          <a:stretch/>
+          <a:stretch>
+            <a:fillRect/>
+          </a:stretch>
         </p:blipFill>
         <p:spPr>
           <a:xfrm>
-            <a:off x="4065028" y="86586"/>
-            <a:ext cx="4302895" cy="2159309"/>
+            <a:off x="3730899" y="95002"/>
+            <a:ext cx="4446048" cy="2268187"/>
           </a:xfrm>
           <a:prstGeom prst="rect">
             <a:avLst/>
@@ -13434,8 +13441,8 @@
         </p:nvSpPr>
         <p:spPr>
           <a:xfrm>
-            <a:off x="3991163" y="29496"/>
-            <a:ext cx="269626" cy="261610"/>
+            <a:off x="3730899" y="83126"/>
+            <a:ext cx="295274" cy="276999"/>
           </a:xfrm>
           <a:prstGeom prst="rect">
             <a:avLst/>
@@ -13449,7 +13456,10 @@
           <a:lstStyle/>
           <a:p>
             <a:r>
-              <a:rPr lang="en-US" sz="1100" b="1" dirty="0"/>
+              <a:rPr lang="en-US" sz="1200" b="1" dirty="0">
+                <a:latin typeface="Arial" panose="020B0604020202020204" pitchFamily="34" charset="0"/>
+                <a:cs typeface="Arial" panose="020B0604020202020204" pitchFamily="34" charset="0"/>
+              </a:rPr>
               <a:t>A</a:t>
             </a:r>
           </a:p>
@@ -13457,10 +13467,10 @@
       </p:sp>
       <p:pic>
         <p:nvPicPr>
-          <p:cNvPr id="3" name="Picture 2">
+          <p:cNvPr id="16" name="Picture 15">
             <a:extLst>
               <a:ext uri="{FF2B5EF4-FFF2-40B4-BE49-F238E27FC236}">
-                <a16:creationId xmlns:a16="http://schemas.microsoft.com/office/drawing/2014/main" id="{15923D00-2CE5-A743-8D79-10803128E602}"/>
+                <a16:creationId xmlns:a16="http://schemas.microsoft.com/office/drawing/2014/main" id="{12D38237-223D-EA4F-ABE2-8AF673ABFC89}"/>
               </a:ext>
             </a:extLst>
           </p:cNvPr>
@@ -13477,8 +13487,8 @@
         </p:blipFill>
         <p:spPr>
           <a:xfrm>
-            <a:off x="4065028" y="2473490"/>
-            <a:ext cx="4297925" cy="4297925"/>
+            <a:off x="3730899" y="2378279"/>
+            <a:ext cx="4473266" cy="4479721"/>
           </a:xfrm>
           <a:prstGeom prst="rect">
             <a:avLst/>

</xml_diff>

<commit_message>
Clean up figures folder
</commit_message>
<xml_diff>
--- a/Figures/mih_paper_figures.pptx
+++ b/Figures/mih_paper_figures.pptx
@@ -205,7 +205,7 @@
           <a:p>
             <a:fld id="{11D58CBC-377E-2D41-95A0-D5F6A72FAB78}" type="datetimeFigureOut">
               <a:rPr lang="en-US" smtClean="0"/>
-              <a:t>3/26/20</a:t>
+              <a:t>3/24/21</a:t>
             </a:fld>
             <a:endParaRPr lang="en-US"/>
           </a:p>
@@ -1303,7 +1303,7 @@
           <a:p>
             <a:fld id="{2B014276-E290-3448-B189-1B145A2DBC63}" type="datetimeFigureOut">
               <a:rPr lang="en-US" smtClean="0"/>
-              <a:t>3/26/20</a:t>
+              <a:t>3/24/21</a:t>
             </a:fld>
             <a:endParaRPr lang="en-US"/>
           </a:p>
@@ -1501,7 +1501,7 @@
           <a:p>
             <a:fld id="{2B014276-E290-3448-B189-1B145A2DBC63}" type="datetimeFigureOut">
               <a:rPr lang="en-US" smtClean="0"/>
-              <a:t>3/26/20</a:t>
+              <a:t>3/24/21</a:t>
             </a:fld>
             <a:endParaRPr lang="en-US"/>
           </a:p>
@@ -1709,7 +1709,7 @@
           <a:p>
             <a:fld id="{2B014276-E290-3448-B189-1B145A2DBC63}" type="datetimeFigureOut">
               <a:rPr lang="en-US" smtClean="0"/>
-              <a:t>3/26/20</a:t>
+              <a:t>3/24/21</a:t>
             </a:fld>
             <a:endParaRPr lang="en-US"/>
           </a:p>
@@ -1907,7 +1907,7 @@
           <a:p>
             <a:fld id="{2B014276-E290-3448-B189-1B145A2DBC63}" type="datetimeFigureOut">
               <a:rPr lang="en-US" smtClean="0"/>
-              <a:t>3/26/20</a:t>
+              <a:t>3/24/21</a:t>
             </a:fld>
             <a:endParaRPr lang="en-US"/>
           </a:p>
@@ -2182,7 +2182,7 @@
           <a:p>
             <a:fld id="{2B014276-E290-3448-B189-1B145A2DBC63}" type="datetimeFigureOut">
               <a:rPr lang="en-US" smtClean="0"/>
-              <a:t>3/26/20</a:t>
+              <a:t>3/24/21</a:t>
             </a:fld>
             <a:endParaRPr lang="en-US"/>
           </a:p>
@@ -2447,7 +2447,7 @@
           <a:p>
             <a:fld id="{2B014276-E290-3448-B189-1B145A2DBC63}" type="datetimeFigureOut">
               <a:rPr lang="en-US" smtClean="0"/>
-              <a:t>3/26/20</a:t>
+              <a:t>3/24/21</a:t>
             </a:fld>
             <a:endParaRPr lang="en-US"/>
           </a:p>
@@ -2859,7 +2859,7 @@
           <a:p>
             <a:fld id="{2B014276-E290-3448-B189-1B145A2DBC63}" type="datetimeFigureOut">
               <a:rPr lang="en-US" smtClean="0"/>
-              <a:t>3/26/20</a:t>
+              <a:t>3/24/21</a:t>
             </a:fld>
             <a:endParaRPr lang="en-US"/>
           </a:p>
@@ -3000,7 +3000,7 @@
           <a:p>
             <a:fld id="{2B014276-E290-3448-B189-1B145A2DBC63}" type="datetimeFigureOut">
               <a:rPr lang="en-US" smtClean="0"/>
-              <a:t>3/26/20</a:t>
+              <a:t>3/24/21</a:t>
             </a:fld>
             <a:endParaRPr lang="en-US"/>
           </a:p>
@@ -3113,7 +3113,7 @@
           <a:p>
             <a:fld id="{2B014276-E290-3448-B189-1B145A2DBC63}" type="datetimeFigureOut">
               <a:rPr lang="en-US" smtClean="0"/>
-              <a:t>3/26/20</a:t>
+              <a:t>3/24/21</a:t>
             </a:fld>
             <a:endParaRPr lang="en-US"/>
           </a:p>
@@ -3424,7 +3424,7 @@
           <a:p>
             <a:fld id="{2B014276-E290-3448-B189-1B145A2DBC63}" type="datetimeFigureOut">
               <a:rPr lang="en-US" smtClean="0"/>
-              <a:t>3/26/20</a:t>
+              <a:t>3/24/21</a:t>
             </a:fld>
             <a:endParaRPr lang="en-US"/>
           </a:p>
@@ -3712,7 +3712,7 @@
           <a:p>
             <a:fld id="{2B014276-E290-3448-B189-1B145A2DBC63}" type="datetimeFigureOut">
               <a:rPr lang="en-US" smtClean="0"/>
-              <a:t>3/26/20</a:t>
+              <a:t>3/24/21</a:t>
             </a:fld>
             <a:endParaRPr lang="en-US"/>
           </a:p>
@@ -3953,7 +3953,7 @@
           <a:p>
             <a:fld id="{2B014276-E290-3448-B189-1B145A2DBC63}" type="datetimeFigureOut">
               <a:rPr lang="en-US" smtClean="0"/>
-              <a:t>3/26/20</a:t>
+              <a:t>3/24/21</a:t>
             </a:fld>
             <a:endParaRPr lang="en-US"/>
           </a:p>
@@ -10660,7 +10660,7 @@
         <p:spPr>
           <a:xfrm>
             <a:off x="4201722" y="2109057"/>
-            <a:ext cx="768346" cy="307777"/>
+            <a:ext cx="768346" cy="276999"/>
           </a:xfrm>
           <a:prstGeom prst="rect">
             <a:avLst/>
@@ -10674,7 +10674,10 @@
           <a:lstStyle/>
           <a:p>
             <a:r>
-              <a:rPr lang="en-US" sz="1400" dirty="0"/>
+              <a:rPr lang="en-US" sz="1200" dirty="0">
+                <a:latin typeface="Arial" panose="020B0604020202020204" pitchFamily="34" charset="0"/>
+                <a:cs typeface="Arial" panose="020B0604020202020204" pitchFamily="34" charset="0"/>
+              </a:rPr>
               <a:t>NDVI</a:t>
             </a:r>
           </a:p>
@@ -10688,8 +10691,8 @@
         </p:nvSpPr>
         <p:spPr>
           <a:xfrm rot="16200000">
-            <a:off x="2405638" y="1129889"/>
-            <a:ext cx="1646158" cy="307777"/>
+            <a:off x="2405638" y="1145279"/>
+            <a:ext cx="1646158" cy="276999"/>
           </a:xfrm>
           <a:prstGeom prst="rect">
             <a:avLst/>
@@ -10703,7 +10706,10 @@
           <a:lstStyle/>
           <a:p>
             <a:r>
-              <a:rPr lang="en-US" sz="1400" dirty="0"/>
+              <a:rPr lang="en-US" sz="1200" dirty="0">
+                <a:latin typeface="Arial" panose="020B0604020202020204" pitchFamily="34" charset="0"/>
+                <a:cs typeface="Arial" panose="020B0604020202020204" pitchFamily="34" charset="0"/>
+              </a:rPr>
               <a:t>Number individuals</a:t>
             </a:r>
           </a:p>
@@ -10864,8 +10870,8 @@
         </p:nvSpPr>
         <p:spPr>
           <a:xfrm rot="19458989">
-            <a:off x="4160115" y="1043211"/>
-            <a:ext cx="467918" cy="261610"/>
+            <a:off x="4160115" y="1035517"/>
+            <a:ext cx="467918" cy="276999"/>
           </a:xfrm>
           <a:prstGeom prst="rect">
             <a:avLst/>
@@ -10879,7 +10885,10 @@
           <a:lstStyle/>
           <a:p>
             <a:r>
-              <a:rPr lang="en-US" sz="1100" dirty="0"/>
+              <a:rPr lang="en-US" sz="1200" dirty="0">
+                <a:latin typeface="Arial" panose="020B0604020202020204" pitchFamily="34" charset="0"/>
+                <a:cs typeface="Arial" panose="020B0604020202020204" pitchFamily="34" charset="0"/>
+              </a:rPr>
               <a:t>MIH</a:t>
             </a:r>
           </a:p>
@@ -10893,8 +10902,8 @@
         </p:nvSpPr>
         <p:spPr>
           <a:xfrm>
-            <a:off x="4464815" y="1665122"/>
-            <a:ext cx="480256" cy="261610"/>
+            <a:off x="4464814" y="1665122"/>
+            <a:ext cx="610447" cy="276999"/>
           </a:xfrm>
           <a:prstGeom prst="rect">
             <a:avLst/>
@@ -10908,7 +10917,10 @@
           <a:lstStyle/>
           <a:p>
             <a:r>
-              <a:rPr lang="en-US" sz="1100" dirty="0"/>
+              <a:rPr lang="en-US" sz="1200" dirty="0">
+                <a:latin typeface="Arial" panose="020B0604020202020204" pitchFamily="34" charset="0"/>
+                <a:cs typeface="Arial" panose="020B0604020202020204" pitchFamily="34" charset="0"/>
+              </a:rPr>
               <a:t>NSH</a:t>
             </a:r>
           </a:p>
@@ -11078,8 +11090,8 @@
         </p:nvSpPr>
         <p:spPr>
           <a:xfrm>
-            <a:off x="5797660" y="144655"/>
-            <a:ext cx="329184" cy="369332"/>
+            <a:off x="5695136" y="155858"/>
+            <a:ext cx="2517781" cy="307777"/>
           </a:xfrm>
           <a:prstGeom prst="rect">
             <a:avLst/>
@@ -11093,8 +11105,11 @@
           <a:lstStyle/>
           <a:p>
             <a:r>
-              <a:rPr lang="en-US" b="1" dirty="0"/>
-              <a:t>B</a:t>
+              <a:rPr lang="en-US" sz="1400" b="1" dirty="0">
+                <a:latin typeface="Arial" panose="020B0604020202020204" pitchFamily="34" charset="0"/>
+                <a:cs typeface="Arial" panose="020B0604020202020204" pitchFamily="34" charset="0"/>
+              </a:rPr>
+              <a:t>Prediction 2</a:t>
             </a:r>
           </a:p>
         </p:txBody>
@@ -11107,8 +11122,8 @@
         </p:nvSpPr>
         <p:spPr>
           <a:xfrm>
-            <a:off x="3149925" y="144655"/>
-            <a:ext cx="329184" cy="369332"/>
+            <a:off x="3252350" y="162460"/>
+            <a:ext cx="1709114" cy="307777"/>
           </a:xfrm>
           <a:prstGeom prst="rect">
             <a:avLst/>
@@ -11122,22 +11137,25 @@
           <a:lstStyle/>
           <a:p>
             <a:r>
-              <a:rPr lang="en-US" b="1" dirty="0"/>
-              <a:t>A</a:t>
+              <a:rPr lang="en-US" sz="1400" b="1" dirty="0">
+                <a:latin typeface="Arial" panose="020B0604020202020204" pitchFamily="34" charset="0"/>
+                <a:cs typeface="Arial" panose="020B0604020202020204" pitchFamily="34" charset="0"/>
+              </a:rPr>
+              <a:t>Prediction 1</a:t>
             </a:r>
           </a:p>
         </p:txBody>
       </p:sp>
       <p:sp>
         <p:nvSpPr>
-          <p:cNvPr id="166" name="TextBox 165"/>
+          <p:cNvPr id="167" name="TextBox 166"/>
           <p:cNvSpPr txBox="1"/>
           <p:nvPr/>
         </p:nvSpPr>
         <p:spPr>
-          <a:xfrm flipH="1">
-            <a:off x="3135506" y="2326236"/>
-            <a:ext cx="240792" cy="369332"/>
+          <a:xfrm>
+            <a:off x="3175606" y="2304039"/>
+            <a:ext cx="1771663" cy="307777"/>
           </a:xfrm>
           <a:prstGeom prst="rect">
             <a:avLst/>
@@ -11151,22 +11169,25 @@
           <a:lstStyle/>
           <a:p>
             <a:r>
-              <a:rPr lang="en-US" b="1" dirty="0"/>
-              <a:t>C</a:t>
+              <a:rPr lang="en-US" sz="1400" b="1" dirty="0">
+                <a:latin typeface="Arial" panose="020B0604020202020204" pitchFamily="34" charset="0"/>
+                <a:cs typeface="Arial" panose="020B0604020202020204" pitchFamily="34" charset="0"/>
+              </a:rPr>
+              <a:t>Prediction 3</a:t>
             </a:r>
           </a:p>
         </p:txBody>
       </p:sp>
       <p:sp>
         <p:nvSpPr>
-          <p:cNvPr id="167" name="TextBox 166"/>
+          <p:cNvPr id="130" name="TextBox 129"/>
           <p:cNvSpPr txBox="1"/>
           <p:nvPr/>
         </p:nvSpPr>
         <p:spPr>
           <a:xfrm>
-            <a:off x="5796747" y="2347520"/>
-            <a:ext cx="329184" cy="369332"/>
+            <a:off x="6846860" y="2125291"/>
+            <a:ext cx="765957" cy="276999"/>
           </a:xfrm>
           <a:prstGeom prst="rect">
             <a:avLst/>
@@ -11180,22 +11201,25 @@
           <a:lstStyle/>
           <a:p>
             <a:r>
-              <a:rPr lang="en-US" b="1" dirty="0"/>
-              <a:t>D</a:t>
+              <a:rPr lang="en-US" sz="1200" dirty="0">
+                <a:latin typeface="Arial" panose="020B0604020202020204" pitchFamily="34" charset="0"/>
+                <a:cs typeface="Arial" panose="020B0604020202020204" pitchFamily="34" charset="0"/>
+              </a:rPr>
+              <a:t>NDVI</a:t>
             </a:r>
           </a:p>
         </p:txBody>
       </p:sp>
       <p:sp>
         <p:nvSpPr>
-          <p:cNvPr id="130" name="TextBox 129"/>
+          <p:cNvPr id="131" name="TextBox 130"/>
           <p:cNvSpPr txBox="1"/>
           <p:nvPr/>
         </p:nvSpPr>
         <p:spPr>
-          <a:xfrm>
-            <a:off x="6846860" y="2125291"/>
-            <a:ext cx="765957" cy="307777"/>
+          <a:xfrm rot="16200000">
+            <a:off x="5077089" y="1129341"/>
+            <a:ext cx="1543871" cy="276999"/>
           </a:xfrm>
           <a:prstGeom prst="rect">
             <a:avLst/>
@@ -11209,36 +11233,10 @@
           <a:lstStyle/>
           <a:p>
             <a:r>
-              <a:rPr lang="en-US" sz="1400" dirty="0"/>
-              <a:t>NDVI</a:t>
-            </a:r>
-          </a:p>
-        </p:txBody>
-      </p:sp>
-      <p:sp>
-        <p:nvSpPr>
-          <p:cNvPr id="131" name="TextBox 130"/>
-          <p:cNvSpPr txBox="1"/>
-          <p:nvPr/>
-        </p:nvSpPr>
-        <p:spPr>
-          <a:xfrm rot="16200000">
-            <a:off x="5077089" y="1113951"/>
-            <a:ext cx="1543871" cy="307777"/>
-          </a:xfrm>
-          <a:prstGeom prst="rect">
-            <a:avLst/>
-          </a:prstGeom>
-          <a:noFill/>
-        </p:spPr>
-        <p:txBody>
-          <a:bodyPr wrap="square" rtlCol="0">
-            <a:spAutoFit/>
-          </a:bodyPr>
-          <a:lstStyle/>
-          <a:p>
-            <a:r>
-              <a:rPr lang="en-US" sz="1400" dirty="0"/>
+              <a:rPr lang="en-US" sz="1200" dirty="0">
+                <a:latin typeface="Arial" panose="020B0604020202020204" pitchFamily="34" charset="0"/>
+                <a:cs typeface="Arial" panose="020B0604020202020204" pitchFamily="34" charset="0"/>
+              </a:rPr>
               <a:t>Expected(Species)</a:t>
             </a:r>
           </a:p>
@@ -11359,7 +11357,7 @@
         <p:spPr>
           <a:xfrm>
             <a:off x="7699473" y="1008592"/>
-            <a:ext cx="467918" cy="261610"/>
+            <a:ext cx="467918" cy="276999"/>
           </a:xfrm>
           <a:prstGeom prst="rect">
             <a:avLst/>
@@ -11373,7 +11371,10 @@
           <a:lstStyle/>
           <a:p>
             <a:r>
-              <a:rPr lang="en-US" sz="1100" dirty="0"/>
+              <a:rPr lang="en-US" sz="1200" dirty="0">
+                <a:latin typeface="Arial" panose="020B0604020202020204" pitchFamily="34" charset="0"/>
+                <a:cs typeface="Arial" panose="020B0604020202020204" pitchFamily="34" charset="0"/>
+              </a:rPr>
               <a:t>MIH</a:t>
             </a:r>
           </a:p>
@@ -11423,8 +11424,8 @@
         </p:nvSpPr>
         <p:spPr>
           <a:xfrm rot="20173288">
-            <a:off x="7615323" y="645872"/>
-            <a:ext cx="467918" cy="261610"/>
+            <a:off x="7609436" y="610219"/>
+            <a:ext cx="606605" cy="276999"/>
           </a:xfrm>
           <a:prstGeom prst="rect">
             <a:avLst/>
@@ -11438,7 +11439,10 @@
           <a:lstStyle/>
           <a:p>
             <a:r>
-              <a:rPr lang="en-US" sz="1100" dirty="0"/>
+              <a:rPr lang="en-US" sz="1200" dirty="0">
+                <a:latin typeface="Arial" panose="020B0604020202020204" pitchFamily="34" charset="0"/>
+                <a:cs typeface="Arial" panose="020B0604020202020204" pitchFamily="34" charset="0"/>
+              </a:rPr>
               <a:t>NSH</a:t>
             </a:r>
           </a:p>
@@ -11998,14 +12002,14 @@
       </p:sp>
       <p:sp>
         <p:nvSpPr>
-          <p:cNvPr id="200" name="TextBox 199"/>
+          <p:cNvPr id="225" name="TextBox 224"/>
           <p:cNvSpPr txBox="1"/>
           <p:nvPr/>
         </p:nvSpPr>
         <p:spPr>
           <a:xfrm>
-            <a:off x="4013024" y="4288938"/>
-            <a:ext cx="765957" cy="307777"/>
+            <a:off x="4225905" y="4279926"/>
+            <a:ext cx="765957" cy="276999"/>
           </a:xfrm>
           <a:prstGeom prst="rect">
             <a:avLst/>
@@ -12019,22 +12023,25 @@
           <a:lstStyle/>
           <a:p>
             <a:r>
-              <a:rPr lang="en-US" sz="1400" dirty="0"/>
-              <a:t>Species</a:t>
+              <a:rPr lang="en-US" sz="1200" dirty="0">
+                <a:latin typeface="Arial" panose="020B0604020202020204" pitchFamily="34" charset="0"/>
+                <a:cs typeface="Arial" panose="020B0604020202020204" pitchFamily="34" charset="0"/>
+              </a:rPr>
+              <a:t>NDVI</a:t>
             </a:r>
           </a:p>
         </p:txBody>
       </p:sp>
       <p:sp>
         <p:nvSpPr>
-          <p:cNvPr id="201" name="TextBox 200"/>
+          <p:cNvPr id="258" name="TextBox 257"/>
           <p:cNvSpPr txBox="1"/>
           <p:nvPr/>
         </p:nvSpPr>
         <p:spPr>
           <a:xfrm rot="16200000">
-            <a:off x="2597573" y="3305569"/>
-            <a:ext cx="1260910" cy="307777"/>
+            <a:off x="2373115" y="3132714"/>
+            <a:ext cx="1758470" cy="276999"/>
           </a:xfrm>
           <a:prstGeom prst="rect">
             <a:avLst/>
@@ -12048,819 +12055,10 @@
           <a:lstStyle/>
           <a:p>
             <a:r>
-              <a:rPr lang="en-US" sz="1400" dirty="0"/>
-              <a:t> Mean NDVI</a:t>
-            </a:r>
-          </a:p>
-        </p:txBody>
-      </p:sp>
-      <p:cxnSp>
-        <p:nvCxnSpPr>
-          <p:cNvPr id="202" name="Straight Connector 201"/>
-          <p:cNvCxnSpPr/>
-          <p:nvPr/>
-        </p:nvCxnSpPr>
-        <p:spPr>
-          <a:xfrm>
-            <a:off x="3373908" y="2653447"/>
-            <a:ext cx="0" cy="1636621"/>
-          </a:xfrm>
-          <a:prstGeom prst="line">
-            <a:avLst/>
-          </a:prstGeom>
-          <a:ln>
-            <a:solidFill>
-              <a:schemeClr val="tx1"/>
-            </a:solidFill>
-          </a:ln>
-        </p:spPr>
-        <p:style>
-          <a:lnRef idx="1">
-            <a:schemeClr val="accent1"/>
-          </a:lnRef>
-          <a:fillRef idx="0">
-            <a:schemeClr val="accent1"/>
-          </a:fillRef>
-          <a:effectRef idx="0">
-            <a:schemeClr val="accent1"/>
-          </a:effectRef>
-          <a:fontRef idx="minor">
-            <a:schemeClr val="tx1"/>
-          </a:fontRef>
-        </p:style>
-      </p:cxnSp>
-      <p:cxnSp>
-        <p:nvCxnSpPr>
-          <p:cNvPr id="203" name="Straight Connector 202"/>
-          <p:cNvCxnSpPr/>
-          <p:nvPr/>
-        </p:nvCxnSpPr>
-        <p:spPr>
-          <a:xfrm flipH="1">
-            <a:off x="3376298" y="4293735"/>
-            <a:ext cx="2039582" cy="2983"/>
-          </a:xfrm>
-          <a:prstGeom prst="line">
-            <a:avLst/>
-          </a:prstGeom>
-          <a:ln>
-            <a:solidFill>
-              <a:schemeClr val="tx1"/>
-            </a:solidFill>
-          </a:ln>
-        </p:spPr>
-        <p:style>
-          <a:lnRef idx="1">
-            <a:schemeClr val="accent1"/>
-          </a:lnRef>
-          <a:fillRef idx="0">
-            <a:schemeClr val="accent1"/>
-          </a:fillRef>
-          <a:effectRef idx="0">
-            <a:schemeClr val="accent1"/>
-          </a:effectRef>
-          <a:fontRef idx="minor">
-            <a:schemeClr val="tx1"/>
-          </a:fontRef>
-        </p:style>
-      </p:cxnSp>
-      <p:cxnSp>
-        <p:nvCxnSpPr>
-          <p:cNvPr id="204" name="Straight Connector 203"/>
-          <p:cNvCxnSpPr/>
-          <p:nvPr/>
-        </p:nvCxnSpPr>
-        <p:spPr>
-          <a:xfrm flipV="1">
-            <a:off x="3741186" y="2653447"/>
-            <a:ext cx="0" cy="722353"/>
-          </a:xfrm>
-          <a:prstGeom prst="line">
-            <a:avLst/>
-          </a:prstGeom>
-          <a:ln w="28575">
-            <a:solidFill>
-              <a:schemeClr val="tx1"/>
-            </a:solidFill>
-            <a:prstDash val="solid"/>
-          </a:ln>
-        </p:spPr>
-        <p:style>
-          <a:lnRef idx="1">
-            <a:schemeClr val="accent1"/>
-          </a:lnRef>
-          <a:fillRef idx="0">
-            <a:schemeClr val="accent1"/>
-          </a:fillRef>
-          <a:effectRef idx="0">
-            <a:schemeClr val="accent1"/>
-          </a:effectRef>
-          <a:fontRef idx="minor">
-            <a:schemeClr val="tx1"/>
-          </a:fontRef>
-        </p:style>
-      </p:cxnSp>
-      <p:cxnSp>
-        <p:nvCxnSpPr>
-          <p:cNvPr id="205" name="Straight Connector 204"/>
-          <p:cNvCxnSpPr/>
-          <p:nvPr/>
-        </p:nvCxnSpPr>
-        <p:spPr>
-          <a:xfrm flipV="1">
-            <a:off x="3833590" y="2653447"/>
-            <a:ext cx="0" cy="722353"/>
-          </a:xfrm>
-          <a:prstGeom prst="line">
-            <a:avLst/>
-          </a:prstGeom>
-          <a:ln w="28575">
-            <a:solidFill>
-              <a:schemeClr val="tx1"/>
-            </a:solidFill>
-            <a:prstDash val="solid"/>
-          </a:ln>
-        </p:spPr>
-        <p:style>
-          <a:lnRef idx="1">
-            <a:schemeClr val="accent1"/>
-          </a:lnRef>
-          <a:fillRef idx="0">
-            <a:schemeClr val="accent1"/>
-          </a:fillRef>
-          <a:effectRef idx="0">
-            <a:schemeClr val="accent1"/>
-          </a:effectRef>
-          <a:fontRef idx="minor">
-            <a:schemeClr val="tx1"/>
-          </a:fontRef>
-        </p:style>
-      </p:cxnSp>
-      <p:cxnSp>
-        <p:nvCxnSpPr>
-          <p:cNvPr id="206" name="Straight Connector 205"/>
-          <p:cNvCxnSpPr/>
-          <p:nvPr/>
-        </p:nvCxnSpPr>
-        <p:spPr>
-          <a:xfrm flipV="1">
-            <a:off x="3928758" y="2653445"/>
-            <a:ext cx="0" cy="722353"/>
-          </a:xfrm>
-          <a:prstGeom prst="line">
-            <a:avLst/>
-          </a:prstGeom>
-          <a:ln w="28575">
-            <a:solidFill>
-              <a:schemeClr val="tx1"/>
-            </a:solidFill>
-            <a:prstDash val="solid"/>
-          </a:ln>
-        </p:spPr>
-        <p:style>
-          <a:lnRef idx="1">
-            <a:schemeClr val="accent1"/>
-          </a:lnRef>
-          <a:fillRef idx="0">
-            <a:schemeClr val="accent1"/>
-          </a:fillRef>
-          <a:effectRef idx="0">
-            <a:schemeClr val="accent1"/>
-          </a:effectRef>
-          <a:fontRef idx="minor">
-            <a:schemeClr val="tx1"/>
-          </a:fontRef>
-        </p:style>
-      </p:cxnSp>
-      <p:cxnSp>
-        <p:nvCxnSpPr>
-          <p:cNvPr id="207" name="Straight Connector 206"/>
-          <p:cNvCxnSpPr/>
-          <p:nvPr/>
-        </p:nvCxnSpPr>
-        <p:spPr>
-          <a:xfrm flipV="1">
-            <a:off x="4024735" y="2653445"/>
-            <a:ext cx="0" cy="1061157"/>
-          </a:xfrm>
-          <a:prstGeom prst="line">
-            <a:avLst/>
-          </a:prstGeom>
-          <a:ln w="28575">
-            <a:solidFill>
-              <a:schemeClr val="tx1"/>
-            </a:solidFill>
-            <a:prstDash val="solid"/>
-          </a:ln>
-        </p:spPr>
-        <p:style>
-          <a:lnRef idx="1">
-            <a:schemeClr val="accent1"/>
-          </a:lnRef>
-          <a:fillRef idx="0">
-            <a:schemeClr val="accent1"/>
-          </a:fillRef>
-          <a:effectRef idx="0">
-            <a:schemeClr val="accent1"/>
-          </a:effectRef>
-          <a:fontRef idx="minor">
-            <a:schemeClr val="tx1"/>
-          </a:fontRef>
-        </p:style>
-      </p:cxnSp>
-      <p:cxnSp>
-        <p:nvCxnSpPr>
-          <p:cNvPr id="208" name="Straight Connector 207"/>
-          <p:cNvCxnSpPr/>
-          <p:nvPr/>
-        </p:nvCxnSpPr>
-        <p:spPr>
-          <a:xfrm flipV="1">
-            <a:off x="4126133" y="2653447"/>
-            <a:ext cx="0" cy="1061157"/>
-          </a:xfrm>
-          <a:prstGeom prst="line">
-            <a:avLst/>
-          </a:prstGeom>
-          <a:ln w="28575">
-            <a:solidFill>
-              <a:schemeClr val="tx1"/>
-            </a:solidFill>
-            <a:prstDash val="solid"/>
-          </a:ln>
-        </p:spPr>
-        <p:style>
-          <a:lnRef idx="1">
-            <a:schemeClr val="accent1"/>
-          </a:lnRef>
-          <a:fillRef idx="0">
-            <a:schemeClr val="accent1"/>
-          </a:fillRef>
-          <a:effectRef idx="0">
-            <a:schemeClr val="accent1"/>
-          </a:effectRef>
-          <a:fontRef idx="minor">
-            <a:schemeClr val="tx1"/>
-          </a:fontRef>
-        </p:style>
-      </p:cxnSp>
-      <p:cxnSp>
-        <p:nvCxnSpPr>
-          <p:cNvPr id="209" name="Straight Connector 208"/>
-          <p:cNvCxnSpPr/>
-          <p:nvPr/>
-        </p:nvCxnSpPr>
-        <p:spPr>
-          <a:xfrm flipV="1">
-            <a:off x="4228137" y="2653447"/>
-            <a:ext cx="0" cy="1061157"/>
-          </a:xfrm>
-          <a:prstGeom prst="line">
-            <a:avLst/>
-          </a:prstGeom>
-          <a:ln w="28575">
-            <a:solidFill>
-              <a:schemeClr val="tx1"/>
-            </a:solidFill>
-            <a:prstDash val="solid"/>
-          </a:ln>
-        </p:spPr>
-        <p:style>
-          <a:lnRef idx="1">
-            <a:schemeClr val="accent1"/>
-          </a:lnRef>
-          <a:fillRef idx="0">
-            <a:schemeClr val="accent1"/>
-          </a:fillRef>
-          <a:effectRef idx="0">
-            <a:schemeClr val="accent1"/>
-          </a:effectRef>
-          <a:fontRef idx="minor">
-            <a:schemeClr val="tx1"/>
-          </a:fontRef>
-        </p:style>
-      </p:cxnSp>
-      <p:cxnSp>
-        <p:nvCxnSpPr>
-          <p:cNvPr id="210" name="Straight Connector 209"/>
-          <p:cNvCxnSpPr/>
-          <p:nvPr/>
-        </p:nvCxnSpPr>
-        <p:spPr>
-          <a:xfrm flipV="1">
-            <a:off x="4333785" y="2653445"/>
-            <a:ext cx="0" cy="1407244"/>
-          </a:xfrm>
-          <a:prstGeom prst="line">
-            <a:avLst/>
-          </a:prstGeom>
-          <a:ln w="28575">
-            <a:solidFill>
-              <a:schemeClr val="tx1"/>
-            </a:solidFill>
-            <a:prstDash val="solid"/>
-          </a:ln>
-        </p:spPr>
-        <p:style>
-          <a:lnRef idx="1">
-            <a:schemeClr val="accent1"/>
-          </a:lnRef>
-          <a:fillRef idx="0">
-            <a:schemeClr val="accent1"/>
-          </a:fillRef>
-          <a:effectRef idx="0">
-            <a:schemeClr val="accent1"/>
-          </a:effectRef>
-          <a:fontRef idx="minor">
-            <a:schemeClr val="tx1"/>
-          </a:fontRef>
-        </p:style>
-      </p:cxnSp>
-      <p:cxnSp>
-        <p:nvCxnSpPr>
-          <p:cNvPr id="211" name="Straight Connector 210"/>
-          <p:cNvCxnSpPr/>
-          <p:nvPr/>
-        </p:nvCxnSpPr>
-        <p:spPr>
-          <a:xfrm flipV="1">
-            <a:off x="4453428" y="2653445"/>
-            <a:ext cx="0" cy="1407244"/>
-          </a:xfrm>
-          <a:prstGeom prst="line">
-            <a:avLst/>
-          </a:prstGeom>
-          <a:ln w="28575">
-            <a:solidFill>
-              <a:schemeClr val="tx1"/>
-            </a:solidFill>
-            <a:prstDash val="solid"/>
-          </a:ln>
-        </p:spPr>
-        <p:style>
-          <a:lnRef idx="1">
-            <a:schemeClr val="accent1"/>
-          </a:lnRef>
-          <a:fillRef idx="0">
-            <a:schemeClr val="accent1"/>
-          </a:fillRef>
-          <a:effectRef idx="0">
-            <a:schemeClr val="accent1"/>
-          </a:effectRef>
-          <a:fontRef idx="minor">
-            <a:schemeClr val="tx1"/>
-          </a:fontRef>
-        </p:style>
-      </p:cxnSp>
-      <p:cxnSp>
-        <p:nvCxnSpPr>
-          <p:cNvPr id="212" name="Straight Connector 211"/>
-          <p:cNvCxnSpPr/>
-          <p:nvPr/>
-        </p:nvCxnSpPr>
-        <p:spPr>
-          <a:xfrm flipV="1">
-            <a:off x="4566332" y="2653445"/>
-            <a:ext cx="0" cy="1407244"/>
-          </a:xfrm>
-          <a:prstGeom prst="line">
-            <a:avLst/>
-          </a:prstGeom>
-          <a:ln w="28575">
-            <a:solidFill>
-              <a:schemeClr val="tx1"/>
-            </a:solidFill>
-            <a:prstDash val="solid"/>
-          </a:ln>
-        </p:spPr>
-        <p:style>
-          <a:lnRef idx="1">
-            <a:schemeClr val="accent1"/>
-          </a:lnRef>
-          <a:fillRef idx="0">
-            <a:schemeClr val="accent1"/>
-          </a:fillRef>
-          <a:effectRef idx="0">
-            <a:schemeClr val="accent1"/>
-          </a:effectRef>
-          <a:fontRef idx="minor">
-            <a:schemeClr val="tx1"/>
-          </a:fontRef>
-        </p:style>
-      </p:cxnSp>
-      <p:cxnSp>
-        <p:nvCxnSpPr>
-          <p:cNvPr id="213" name="Straight Connector 212"/>
-          <p:cNvCxnSpPr/>
-          <p:nvPr/>
-        </p:nvCxnSpPr>
-        <p:spPr>
-          <a:xfrm flipV="1">
-            <a:off x="4675623" y="2652318"/>
-            <a:ext cx="0" cy="1614282"/>
-          </a:xfrm>
-          <a:prstGeom prst="line">
-            <a:avLst/>
-          </a:prstGeom>
-          <a:ln w="28575">
-            <a:solidFill>
-              <a:schemeClr val="tx1"/>
-            </a:solidFill>
-            <a:prstDash val="solid"/>
-          </a:ln>
-        </p:spPr>
-        <p:style>
-          <a:lnRef idx="1">
-            <a:schemeClr val="accent1"/>
-          </a:lnRef>
-          <a:fillRef idx="0">
-            <a:schemeClr val="accent1"/>
-          </a:fillRef>
-          <a:effectRef idx="0">
-            <a:schemeClr val="accent1"/>
-          </a:effectRef>
-          <a:fontRef idx="minor">
-            <a:schemeClr val="tx1"/>
-          </a:fontRef>
-        </p:style>
-      </p:cxnSp>
-      <p:cxnSp>
-        <p:nvCxnSpPr>
-          <p:cNvPr id="214" name="Straight Connector 213"/>
-          <p:cNvCxnSpPr/>
-          <p:nvPr/>
-        </p:nvCxnSpPr>
-        <p:spPr>
-          <a:xfrm flipV="1">
-            <a:off x="4776751" y="2652318"/>
-            <a:ext cx="0" cy="1614282"/>
-          </a:xfrm>
-          <a:prstGeom prst="line">
-            <a:avLst/>
-          </a:prstGeom>
-          <a:ln w="28575">
-            <a:solidFill>
-              <a:schemeClr val="tx1"/>
-            </a:solidFill>
-            <a:prstDash val="solid"/>
-          </a:ln>
-        </p:spPr>
-        <p:style>
-          <a:lnRef idx="1">
-            <a:schemeClr val="accent1"/>
-          </a:lnRef>
-          <a:fillRef idx="0">
-            <a:schemeClr val="accent1"/>
-          </a:fillRef>
-          <a:effectRef idx="0">
-            <a:schemeClr val="accent1"/>
-          </a:effectRef>
-          <a:fontRef idx="minor">
-            <a:schemeClr val="tx1"/>
-          </a:fontRef>
-        </p:style>
-      </p:cxnSp>
-      <p:cxnSp>
-        <p:nvCxnSpPr>
-          <p:cNvPr id="215" name="Straight Connector 214"/>
-          <p:cNvCxnSpPr/>
-          <p:nvPr/>
-        </p:nvCxnSpPr>
-        <p:spPr>
-          <a:xfrm flipV="1">
-            <a:off x="4871555" y="2655443"/>
-            <a:ext cx="0" cy="1614282"/>
-          </a:xfrm>
-          <a:prstGeom prst="line">
-            <a:avLst/>
-          </a:prstGeom>
-          <a:ln w="28575">
-            <a:solidFill>
-              <a:schemeClr val="tx1"/>
-            </a:solidFill>
-            <a:prstDash val="solid"/>
-          </a:ln>
-        </p:spPr>
-        <p:style>
-          <a:lnRef idx="1">
-            <a:schemeClr val="accent1"/>
-          </a:lnRef>
-          <a:fillRef idx="0">
-            <a:schemeClr val="accent1"/>
-          </a:fillRef>
-          <a:effectRef idx="0">
-            <a:schemeClr val="accent1"/>
-          </a:effectRef>
-          <a:fontRef idx="minor">
-            <a:schemeClr val="tx1"/>
-          </a:fontRef>
-        </p:style>
-      </p:cxnSp>
-      <p:cxnSp>
-        <p:nvCxnSpPr>
-          <p:cNvPr id="216" name="Straight Connector 215"/>
-          <p:cNvCxnSpPr/>
-          <p:nvPr/>
-        </p:nvCxnSpPr>
-        <p:spPr>
-          <a:xfrm flipV="1">
-            <a:off x="3649504" y="2652319"/>
-            <a:ext cx="0" cy="424753"/>
-          </a:xfrm>
-          <a:prstGeom prst="line">
-            <a:avLst/>
-          </a:prstGeom>
-          <a:ln w="28575">
-            <a:solidFill>
-              <a:schemeClr val="tx1"/>
-            </a:solidFill>
-            <a:prstDash val="solid"/>
-          </a:ln>
-        </p:spPr>
-        <p:style>
-          <a:lnRef idx="1">
-            <a:schemeClr val="accent1"/>
-          </a:lnRef>
-          <a:fillRef idx="0">
-            <a:schemeClr val="accent1"/>
-          </a:fillRef>
-          <a:effectRef idx="0">
-            <a:schemeClr val="accent1"/>
-          </a:effectRef>
-          <a:fontRef idx="minor">
-            <a:schemeClr val="tx1"/>
-          </a:fontRef>
-        </p:style>
-      </p:cxnSp>
-      <p:cxnSp>
-        <p:nvCxnSpPr>
-          <p:cNvPr id="217" name="Straight Connector 216"/>
-          <p:cNvCxnSpPr/>
-          <p:nvPr/>
-        </p:nvCxnSpPr>
-        <p:spPr>
-          <a:xfrm flipV="1">
-            <a:off x="3557283" y="2652318"/>
-            <a:ext cx="0" cy="424753"/>
-          </a:xfrm>
-          <a:prstGeom prst="line">
-            <a:avLst/>
-          </a:prstGeom>
-          <a:ln w="28575">
-            <a:solidFill>
-              <a:schemeClr val="tx1"/>
-            </a:solidFill>
-            <a:prstDash val="solid"/>
-          </a:ln>
-        </p:spPr>
-        <p:style>
-          <a:lnRef idx="1">
-            <a:schemeClr val="accent1"/>
-          </a:lnRef>
-          <a:fillRef idx="0">
-            <a:schemeClr val="accent1"/>
-          </a:fillRef>
-          <a:effectRef idx="0">
-            <a:schemeClr val="accent1"/>
-          </a:effectRef>
-          <a:fontRef idx="minor">
-            <a:schemeClr val="tx1"/>
-          </a:fontRef>
-        </p:style>
-      </p:cxnSp>
-      <p:cxnSp>
-        <p:nvCxnSpPr>
-          <p:cNvPr id="218" name="Straight Connector 217"/>
-          <p:cNvCxnSpPr/>
-          <p:nvPr/>
-        </p:nvCxnSpPr>
-        <p:spPr>
-          <a:xfrm flipV="1">
-            <a:off x="3462675" y="2652317"/>
-            <a:ext cx="0" cy="424753"/>
-          </a:xfrm>
-          <a:prstGeom prst="line">
-            <a:avLst/>
-          </a:prstGeom>
-          <a:ln w="28575">
-            <a:solidFill>
-              <a:schemeClr val="tx1"/>
-            </a:solidFill>
-            <a:prstDash val="solid"/>
-          </a:ln>
-        </p:spPr>
-        <p:style>
-          <a:lnRef idx="1">
-            <a:schemeClr val="accent1"/>
-          </a:lnRef>
-          <a:fillRef idx="0">
-            <a:schemeClr val="accent1"/>
-          </a:fillRef>
-          <a:effectRef idx="0">
-            <a:schemeClr val="accent1"/>
-          </a:effectRef>
-          <a:fontRef idx="minor">
-            <a:schemeClr val="tx1"/>
-          </a:fontRef>
-        </p:style>
-      </p:cxnSp>
-      <p:cxnSp>
-        <p:nvCxnSpPr>
-          <p:cNvPr id="219" name="Straight Connector 218"/>
-          <p:cNvCxnSpPr/>
-          <p:nvPr/>
-        </p:nvCxnSpPr>
-        <p:spPr>
-          <a:xfrm flipV="1">
-            <a:off x="4977422" y="2652318"/>
-            <a:ext cx="0" cy="1614282"/>
-          </a:xfrm>
-          <a:prstGeom prst="line">
-            <a:avLst/>
-          </a:prstGeom>
-          <a:ln w="28575">
-            <a:solidFill>
-              <a:schemeClr val="tx1"/>
-            </a:solidFill>
-            <a:prstDash val="solid"/>
-          </a:ln>
-        </p:spPr>
-        <p:style>
-          <a:lnRef idx="1">
-            <a:schemeClr val="accent1"/>
-          </a:lnRef>
-          <a:fillRef idx="0">
-            <a:schemeClr val="accent1"/>
-          </a:fillRef>
-          <a:effectRef idx="0">
-            <a:schemeClr val="accent1"/>
-          </a:effectRef>
-          <a:fontRef idx="minor">
-            <a:schemeClr val="tx1"/>
-          </a:fontRef>
-        </p:style>
-      </p:cxnSp>
-      <p:cxnSp>
-        <p:nvCxnSpPr>
-          <p:cNvPr id="220" name="Straight Connector 219"/>
-          <p:cNvCxnSpPr/>
-          <p:nvPr/>
-        </p:nvCxnSpPr>
-        <p:spPr>
-          <a:xfrm flipV="1">
-            <a:off x="5078550" y="2652318"/>
-            <a:ext cx="0" cy="1614282"/>
-          </a:xfrm>
-          <a:prstGeom prst="line">
-            <a:avLst/>
-          </a:prstGeom>
-          <a:ln w="28575">
-            <a:solidFill>
-              <a:schemeClr val="tx1"/>
-            </a:solidFill>
-            <a:prstDash val="solid"/>
-          </a:ln>
-        </p:spPr>
-        <p:style>
-          <a:lnRef idx="1">
-            <a:schemeClr val="accent1"/>
-          </a:lnRef>
-          <a:fillRef idx="0">
-            <a:schemeClr val="accent1"/>
-          </a:fillRef>
-          <a:effectRef idx="0">
-            <a:schemeClr val="accent1"/>
-          </a:effectRef>
-          <a:fontRef idx="minor">
-            <a:schemeClr val="tx1"/>
-          </a:fontRef>
-        </p:style>
-      </p:cxnSp>
-      <p:cxnSp>
-        <p:nvCxnSpPr>
-          <p:cNvPr id="221" name="Straight Connector 220"/>
-          <p:cNvCxnSpPr/>
-          <p:nvPr/>
-        </p:nvCxnSpPr>
-        <p:spPr>
-          <a:xfrm flipV="1">
-            <a:off x="5173354" y="2655443"/>
-            <a:ext cx="0" cy="1614282"/>
-          </a:xfrm>
-          <a:prstGeom prst="line">
-            <a:avLst/>
-          </a:prstGeom>
-          <a:ln w="28575">
-            <a:solidFill>
-              <a:schemeClr val="tx1"/>
-            </a:solidFill>
-            <a:prstDash val="solid"/>
-          </a:ln>
-        </p:spPr>
-        <p:style>
-          <a:lnRef idx="1">
-            <a:schemeClr val="accent1"/>
-          </a:lnRef>
-          <a:fillRef idx="0">
-            <a:schemeClr val="accent1"/>
-          </a:fillRef>
-          <a:effectRef idx="0">
-            <a:schemeClr val="accent1"/>
-          </a:effectRef>
-          <a:fontRef idx="minor">
-            <a:schemeClr val="tx1"/>
-          </a:fontRef>
-        </p:style>
-      </p:cxnSp>
-      <p:cxnSp>
-        <p:nvCxnSpPr>
-          <p:cNvPr id="224" name="Straight Connector 223"/>
-          <p:cNvCxnSpPr/>
-          <p:nvPr/>
-        </p:nvCxnSpPr>
-        <p:spPr>
-          <a:xfrm flipV="1">
-            <a:off x="5278706" y="2652317"/>
-            <a:ext cx="0" cy="1614282"/>
-          </a:xfrm>
-          <a:prstGeom prst="line">
-            <a:avLst/>
-          </a:prstGeom>
-          <a:ln w="28575">
-            <a:solidFill>
-              <a:schemeClr val="tx1"/>
-            </a:solidFill>
-            <a:prstDash val="solid"/>
-          </a:ln>
-        </p:spPr>
-        <p:style>
-          <a:lnRef idx="1">
-            <a:schemeClr val="accent1"/>
-          </a:lnRef>
-          <a:fillRef idx="0">
-            <a:schemeClr val="accent1"/>
-          </a:fillRef>
-          <a:effectRef idx="0">
-            <a:schemeClr val="accent1"/>
-          </a:effectRef>
-          <a:fontRef idx="minor">
-            <a:schemeClr val="tx1"/>
-          </a:fontRef>
-        </p:style>
-      </p:cxnSp>
-      <p:sp>
-        <p:nvSpPr>
-          <p:cNvPr id="225" name="TextBox 224"/>
-          <p:cNvSpPr txBox="1"/>
-          <p:nvPr/>
-        </p:nvSpPr>
-        <p:spPr>
-          <a:xfrm>
-            <a:off x="6849250" y="4278889"/>
-            <a:ext cx="765957" cy="307777"/>
-          </a:xfrm>
-          <a:prstGeom prst="rect">
-            <a:avLst/>
-          </a:prstGeom>
-          <a:noFill/>
-        </p:spPr>
-        <p:txBody>
-          <a:bodyPr wrap="square" rtlCol="0">
-            <a:spAutoFit/>
-          </a:bodyPr>
-          <a:lstStyle/>
-          <a:p>
-            <a:r>
-              <a:rPr lang="en-US" sz="1400" dirty="0"/>
-              <a:t>NDVI</a:t>
-            </a:r>
-          </a:p>
-        </p:txBody>
-      </p:sp>
-      <p:sp>
-        <p:nvSpPr>
-          <p:cNvPr id="258" name="TextBox 257"/>
-          <p:cNvSpPr txBox="1"/>
-          <p:nvPr/>
-        </p:nvSpPr>
-        <p:spPr>
-          <a:xfrm rot="16200000">
-            <a:off x="4972828" y="3216792"/>
-            <a:ext cx="1758470" cy="307777"/>
-          </a:xfrm>
-          <a:prstGeom prst="rect">
-            <a:avLst/>
-          </a:prstGeom>
-          <a:noFill/>
-        </p:spPr>
-        <p:txBody>
-          <a:bodyPr wrap="square" rtlCol="0">
-            <a:spAutoFit/>
-          </a:bodyPr>
-          <a:lstStyle/>
-          <a:p>
-            <a:r>
-              <a:rPr lang="en-US" sz="1400" dirty="0"/>
+              <a:rPr lang="en-US" sz="1200" dirty="0">
+                <a:latin typeface="Arial" panose="020B0604020202020204" pitchFamily="34" charset="0"/>
+                <a:cs typeface="Arial" panose="020B0604020202020204" pitchFamily="34" charset="0"/>
+              </a:rPr>
               <a:t>Mean NDVI range</a:t>
             </a:r>
           </a:p>
@@ -12874,7 +12072,7 @@
         </p:nvCxnSpPr>
         <p:spPr>
           <a:xfrm>
-            <a:off x="6002913" y="2665736"/>
+            <a:off x="3379568" y="2666773"/>
             <a:ext cx="0" cy="1636621"/>
           </a:xfrm>
           <a:prstGeom prst="line">
@@ -12909,7 +12107,7 @@
         </p:nvCxnSpPr>
         <p:spPr>
           <a:xfrm flipH="1">
-            <a:off x="6005303" y="4306024"/>
+            <a:off x="3381958" y="4307061"/>
             <a:ext cx="2039582" cy="2983"/>
           </a:xfrm>
           <a:prstGeom prst="line">
@@ -12944,7 +12142,7 @@
         </p:nvCxnSpPr>
         <p:spPr>
           <a:xfrm>
-            <a:off x="6104409" y="2708411"/>
+            <a:off x="3481064" y="2709448"/>
             <a:ext cx="1863628" cy="1551628"/>
           </a:xfrm>
           <a:prstGeom prst="line">
@@ -13188,8 +12386,8 @@
         </p:nvSpPr>
         <p:spPr>
           <a:xfrm>
-            <a:off x="4216777" y="6404569"/>
-            <a:ext cx="765957" cy="307777"/>
+            <a:off x="6800481" y="4260804"/>
+            <a:ext cx="765957" cy="276999"/>
           </a:xfrm>
           <a:prstGeom prst="rect">
             <a:avLst/>
@@ -13203,7 +12401,10 @@
           <a:lstStyle/>
           <a:p>
             <a:r>
-              <a:rPr lang="en-US" sz="1400" dirty="0"/>
+              <a:rPr lang="en-US" sz="1200" dirty="0">
+                <a:latin typeface="Arial" panose="020B0604020202020204" pitchFamily="34" charset="0"/>
+                <a:cs typeface="Arial" panose="020B0604020202020204" pitchFamily="34" charset="0"/>
+              </a:rPr>
               <a:t>NDVI</a:t>
             </a:r>
           </a:p>
@@ -13217,8 +12418,8 @@
         </p:nvSpPr>
         <p:spPr>
           <a:xfrm rot="16200000">
-            <a:off x="2237090" y="5363018"/>
-            <a:ext cx="2007576" cy="307777"/>
+            <a:off x="4820794" y="3234643"/>
+            <a:ext cx="2007576" cy="276999"/>
           </a:xfrm>
           <a:prstGeom prst="rect">
             <a:avLst/>
@@ -13232,7 +12433,10 @@
           <a:lstStyle/>
           <a:p>
             <a:r>
-              <a:rPr lang="en-US" sz="1400" dirty="0"/>
+              <a:rPr lang="en-US" sz="1200" dirty="0">
+                <a:latin typeface="Arial" panose="020B0604020202020204" pitchFamily="34" charset="0"/>
+                <a:cs typeface="Arial" panose="020B0604020202020204" pitchFamily="34" charset="0"/>
+              </a:rPr>
               <a:t>Foraging guild richness</a:t>
             </a:r>
           </a:p>
@@ -13246,7 +12450,7 @@
         </p:nvCxnSpPr>
         <p:spPr>
           <a:xfrm>
-            <a:off x="3372830" y="4795083"/>
+            <a:off x="5956534" y="2651318"/>
             <a:ext cx="0" cy="1636621"/>
           </a:xfrm>
           <a:prstGeom prst="line">
@@ -13281,7 +12485,7 @@
         </p:nvCxnSpPr>
         <p:spPr>
           <a:xfrm flipH="1">
-            <a:off x="3372830" y="6431704"/>
+            <a:off x="5956534" y="4287939"/>
             <a:ext cx="2039582" cy="2983"/>
           </a:xfrm>
           <a:prstGeom prst="line">
@@ -13316,7 +12520,7 @@
         </p:nvCxnSpPr>
         <p:spPr>
           <a:xfrm flipV="1">
-            <a:off x="3394767" y="4833831"/>
+            <a:off x="5978471" y="2690066"/>
             <a:ext cx="1926105" cy="1511865"/>
           </a:xfrm>
           <a:prstGeom prst="line">
@@ -13352,8 +12556,8 @@
         </p:nvSpPr>
         <p:spPr>
           <a:xfrm>
-            <a:off x="3111433" y="4450932"/>
-            <a:ext cx="566670" cy="369332"/>
+            <a:off x="5695136" y="2307167"/>
+            <a:ext cx="1871293" cy="307777"/>
           </a:xfrm>
           <a:prstGeom prst="rect">
             <a:avLst/>
@@ -13367,8 +12571,11 @@
           <a:lstStyle/>
           <a:p>
             <a:r>
-              <a:rPr lang="en-US" b="1" dirty="0"/>
-              <a:t>E</a:t>
+              <a:rPr lang="en-US" sz="1400" b="1" dirty="0">
+                <a:latin typeface="Arial" panose="020B0604020202020204" pitchFamily="34" charset="0"/>
+                <a:cs typeface="Arial" panose="020B0604020202020204" pitchFamily="34" charset="0"/>
+              </a:rPr>
+              <a:t>Prediction 4</a:t>
             </a:r>
           </a:p>
         </p:txBody>

</xml_diff>

<commit_message>
NDVI range null model
</commit_message>
<xml_diff>
--- a/Figures/mih_paper_figures.pptx
+++ b/Figures/mih_paper_figures.pptx
@@ -205,7 +205,7 @@
           <a:p>
             <a:fld id="{11D58CBC-377E-2D41-95A0-D5F6A72FAB78}" type="datetimeFigureOut">
               <a:rPr lang="en-US" smtClean="0"/>
-              <a:t>3/24/21</a:t>
+              <a:t>4/7/21</a:t>
             </a:fld>
             <a:endParaRPr lang="en-US"/>
           </a:p>
@@ -1303,7 +1303,7 @@
           <a:p>
             <a:fld id="{2B014276-E290-3448-B189-1B145A2DBC63}" type="datetimeFigureOut">
               <a:rPr lang="en-US" smtClean="0"/>
-              <a:t>3/24/21</a:t>
+              <a:t>4/7/21</a:t>
             </a:fld>
             <a:endParaRPr lang="en-US"/>
           </a:p>
@@ -1501,7 +1501,7 @@
           <a:p>
             <a:fld id="{2B014276-E290-3448-B189-1B145A2DBC63}" type="datetimeFigureOut">
               <a:rPr lang="en-US" smtClean="0"/>
-              <a:t>3/24/21</a:t>
+              <a:t>4/7/21</a:t>
             </a:fld>
             <a:endParaRPr lang="en-US"/>
           </a:p>
@@ -1709,7 +1709,7 @@
           <a:p>
             <a:fld id="{2B014276-E290-3448-B189-1B145A2DBC63}" type="datetimeFigureOut">
               <a:rPr lang="en-US" smtClean="0"/>
-              <a:t>3/24/21</a:t>
+              <a:t>4/7/21</a:t>
             </a:fld>
             <a:endParaRPr lang="en-US"/>
           </a:p>
@@ -1907,7 +1907,7 @@
           <a:p>
             <a:fld id="{2B014276-E290-3448-B189-1B145A2DBC63}" type="datetimeFigureOut">
               <a:rPr lang="en-US" smtClean="0"/>
-              <a:t>3/24/21</a:t>
+              <a:t>4/7/21</a:t>
             </a:fld>
             <a:endParaRPr lang="en-US"/>
           </a:p>
@@ -2182,7 +2182,7 @@
           <a:p>
             <a:fld id="{2B014276-E290-3448-B189-1B145A2DBC63}" type="datetimeFigureOut">
               <a:rPr lang="en-US" smtClean="0"/>
-              <a:t>3/24/21</a:t>
+              <a:t>4/7/21</a:t>
             </a:fld>
             <a:endParaRPr lang="en-US"/>
           </a:p>
@@ -2447,7 +2447,7 @@
           <a:p>
             <a:fld id="{2B014276-E290-3448-B189-1B145A2DBC63}" type="datetimeFigureOut">
               <a:rPr lang="en-US" smtClean="0"/>
-              <a:t>3/24/21</a:t>
+              <a:t>4/7/21</a:t>
             </a:fld>
             <a:endParaRPr lang="en-US"/>
           </a:p>
@@ -2859,7 +2859,7 @@
           <a:p>
             <a:fld id="{2B014276-E290-3448-B189-1B145A2DBC63}" type="datetimeFigureOut">
               <a:rPr lang="en-US" smtClean="0"/>
-              <a:t>3/24/21</a:t>
+              <a:t>4/7/21</a:t>
             </a:fld>
             <a:endParaRPr lang="en-US"/>
           </a:p>
@@ -3000,7 +3000,7 @@
           <a:p>
             <a:fld id="{2B014276-E290-3448-B189-1B145A2DBC63}" type="datetimeFigureOut">
               <a:rPr lang="en-US" smtClean="0"/>
-              <a:t>3/24/21</a:t>
+              <a:t>4/7/21</a:t>
             </a:fld>
             <a:endParaRPr lang="en-US"/>
           </a:p>
@@ -3113,7 +3113,7 @@
           <a:p>
             <a:fld id="{2B014276-E290-3448-B189-1B145A2DBC63}" type="datetimeFigureOut">
               <a:rPr lang="en-US" smtClean="0"/>
-              <a:t>3/24/21</a:t>
+              <a:t>4/7/21</a:t>
             </a:fld>
             <a:endParaRPr lang="en-US"/>
           </a:p>
@@ -3424,7 +3424,7 @@
           <a:p>
             <a:fld id="{2B014276-E290-3448-B189-1B145A2DBC63}" type="datetimeFigureOut">
               <a:rPr lang="en-US" smtClean="0"/>
-              <a:t>3/24/21</a:t>
+              <a:t>4/7/21</a:t>
             </a:fld>
             <a:endParaRPr lang="en-US"/>
           </a:p>
@@ -3712,7 +3712,7 @@
           <a:p>
             <a:fld id="{2B014276-E290-3448-B189-1B145A2DBC63}" type="datetimeFigureOut">
               <a:rPr lang="en-US" smtClean="0"/>
-              <a:t>3/24/21</a:t>
+              <a:t>4/7/21</a:t>
             </a:fld>
             <a:endParaRPr lang="en-US"/>
           </a:p>
@@ -3953,7 +3953,7 @@
           <a:p>
             <a:fld id="{2B014276-E290-3448-B189-1B145A2DBC63}" type="datetimeFigureOut">
               <a:rPr lang="en-US" smtClean="0"/>
-              <a:t>3/24/21</a:t>
+              <a:t>4/7/21</a:t>
             </a:fld>
             <a:endParaRPr lang="en-US"/>
           </a:p>
@@ -10691,8 +10691,8 @@
         </p:nvSpPr>
         <p:spPr>
           <a:xfrm rot="16200000">
-            <a:off x="2405638" y="1145279"/>
-            <a:ext cx="1646158" cy="276999"/>
+            <a:off x="2349482" y="1089123"/>
+            <a:ext cx="1758471" cy="276999"/>
           </a:xfrm>
           <a:prstGeom prst="rect">
             <a:avLst/>
@@ -10710,7 +10710,7 @@
                 <a:latin typeface="Arial" panose="020B0604020202020204" pitchFamily="34" charset="0"/>
                 <a:cs typeface="Arial" panose="020B0604020202020204" pitchFamily="34" charset="0"/>
               </a:rPr>
-              <a:t>Number individuals</a:t>
+              <a:t>Community abundance</a:t>
             </a:r>
           </a:p>
         </p:txBody>
@@ -10870,7 +10870,7 @@
         </p:nvSpPr>
         <p:spPr>
           <a:xfrm rot="19458989">
-            <a:off x="4160115" y="1035517"/>
+            <a:off x="4160115" y="1021767"/>
             <a:ext cx="467918" cy="276999"/>
           </a:xfrm>
           <a:prstGeom prst="rect">
@@ -10902,7 +10902,7 @@
         </p:nvSpPr>
         <p:spPr>
           <a:xfrm>
-            <a:off x="4464814" y="1665122"/>
+            <a:off x="4464814" y="1651372"/>
             <a:ext cx="610447" cy="276999"/>
           </a:xfrm>
           <a:prstGeom prst="rect">
@@ -11237,7 +11237,7 @@
                 <a:latin typeface="Arial" panose="020B0604020202020204" pitchFamily="34" charset="0"/>
                 <a:cs typeface="Arial" panose="020B0604020202020204" pitchFamily="34" charset="0"/>
               </a:rPr>
-              <a:t>Expected(Species)</a:t>
+              <a:t>Rarified richness</a:t>
             </a:r>
           </a:p>
         </p:txBody>
@@ -12576,6 +12576,242 @@
                 <a:cs typeface="Arial" panose="020B0604020202020204" pitchFamily="34" charset="0"/>
               </a:rPr>
               <a:t>Prediction 4</a:t>
+            </a:r>
+          </a:p>
+        </p:txBody>
+      </p:sp>
+      <p:cxnSp>
+        <p:nvCxnSpPr>
+          <p:cNvPr id="53" name="Straight Connector 52">
+            <a:extLst>
+              <a:ext uri="{FF2B5EF4-FFF2-40B4-BE49-F238E27FC236}">
+                <a16:creationId xmlns:a16="http://schemas.microsoft.com/office/drawing/2014/main" id="{181752D1-B931-2143-815D-D147975EC03A}"/>
+              </a:ext>
+            </a:extLst>
+          </p:cNvPr>
+          <p:cNvCxnSpPr/>
+          <p:nvPr/>
+        </p:nvCxnSpPr>
+        <p:spPr>
+          <a:xfrm>
+            <a:off x="5963082" y="3474732"/>
+            <a:ext cx="2000354" cy="0"/>
+          </a:xfrm>
+          <a:prstGeom prst="line">
+            <a:avLst/>
+          </a:prstGeom>
+          <a:ln w="19050">
+            <a:solidFill>
+              <a:schemeClr val="tx1"/>
+            </a:solidFill>
+            <a:prstDash val="solid"/>
+          </a:ln>
+        </p:spPr>
+        <p:style>
+          <a:lnRef idx="1">
+            <a:schemeClr val="accent1"/>
+          </a:lnRef>
+          <a:fillRef idx="0">
+            <a:schemeClr val="accent1"/>
+          </a:fillRef>
+          <a:effectRef idx="0">
+            <a:schemeClr val="accent1"/>
+          </a:effectRef>
+          <a:fontRef idx="minor">
+            <a:schemeClr val="tx1"/>
+          </a:fontRef>
+        </p:style>
+      </p:cxnSp>
+      <p:sp>
+        <p:nvSpPr>
+          <p:cNvPr id="54" name="TextBox 53">
+            <a:extLst>
+              <a:ext uri="{FF2B5EF4-FFF2-40B4-BE49-F238E27FC236}">
+                <a16:creationId xmlns:a16="http://schemas.microsoft.com/office/drawing/2014/main" id="{3AA83825-20DD-9943-8799-C65E68F10754}"/>
+              </a:ext>
+            </a:extLst>
+          </p:cNvPr>
+          <p:cNvSpPr txBox="1"/>
+          <p:nvPr/>
+        </p:nvSpPr>
+        <p:spPr>
+          <a:xfrm>
+            <a:off x="7620414" y="3267422"/>
+            <a:ext cx="467918" cy="276999"/>
+          </a:xfrm>
+          <a:prstGeom prst="rect">
+            <a:avLst/>
+          </a:prstGeom>
+          <a:noFill/>
+        </p:spPr>
+        <p:txBody>
+          <a:bodyPr wrap="square" rtlCol="0">
+            <a:spAutoFit/>
+          </a:bodyPr>
+          <a:lstStyle/>
+          <a:p>
+            <a:r>
+              <a:rPr lang="en-US" sz="1200" dirty="0">
+                <a:latin typeface="Arial" panose="020B0604020202020204" pitchFamily="34" charset="0"/>
+                <a:cs typeface="Arial" panose="020B0604020202020204" pitchFamily="34" charset="0"/>
+              </a:rPr>
+              <a:t>MIH</a:t>
+            </a:r>
+          </a:p>
+        </p:txBody>
+      </p:sp>
+      <p:cxnSp>
+        <p:nvCxnSpPr>
+          <p:cNvPr id="55" name="Straight Connector 54">
+            <a:extLst>
+              <a:ext uri="{FF2B5EF4-FFF2-40B4-BE49-F238E27FC236}">
+                <a16:creationId xmlns:a16="http://schemas.microsoft.com/office/drawing/2014/main" id="{B2D03AD0-54A3-4E4F-8900-9C6A2C6CB24B}"/>
+              </a:ext>
+            </a:extLst>
+          </p:cNvPr>
+          <p:cNvCxnSpPr/>
+          <p:nvPr/>
+        </p:nvCxnSpPr>
+        <p:spPr>
+          <a:xfrm>
+            <a:off x="3416363" y="3489639"/>
+            <a:ext cx="2000354" cy="0"/>
+          </a:xfrm>
+          <a:prstGeom prst="line">
+            <a:avLst/>
+          </a:prstGeom>
+          <a:ln w="19050">
+            <a:solidFill>
+              <a:schemeClr val="tx1"/>
+            </a:solidFill>
+            <a:prstDash val="solid"/>
+          </a:ln>
+        </p:spPr>
+        <p:style>
+          <a:lnRef idx="1">
+            <a:schemeClr val="accent1"/>
+          </a:lnRef>
+          <a:fillRef idx="0">
+            <a:schemeClr val="accent1"/>
+          </a:fillRef>
+          <a:effectRef idx="0">
+            <a:schemeClr val="accent1"/>
+          </a:effectRef>
+          <a:fontRef idx="minor">
+            <a:schemeClr val="tx1"/>
+          </a:fontRef>
+        </p:style>
+      </p:cxnSp>
+      <p:sp>
+        <p:nvSpPr>
+          <p:cNvPr id="56" name="TextBox 55">
+            <a:extLst>
+              <a:ext uri="{FF2B5EF4-FFF2-40B4-BE49-F238E27FC236}">
+                <a16:creationId xmlns:a16="http://schemas.microsoft.com/office/drawing/2014/main" id="{FA71EBBC-44CB-E048-A61E-D78AF73CF394}"/>
+              </a:ext>
+            </a:extLst>
+          </p:cNvPr>
+          <p:cNvSpPr txBox="1"/>
+          <p:nvPr/>
+        </p:nvSpPr>
+        <p:spPr>
+          <a:xfrm>
+            <a:off x="5073695" y="3282329"/>
+            <a:ext cx="467918" cy="276999"/>
+          </a:xfrm>
+          <a:prstGeom prst="rect">
+            <a:avLst/>
+          </a:prstGeom>
+          <a:noFill/>
+        </p:spPr>
+        <p:txBody>
+          <a:bodyPr wrap="square" rtlCol="0">
+            <a:spAutoFit/>
+          </a:bodyPr>
+          <a:lstStyle/>
+          <a:p>
+            <a:r>
+              <a:rPr lang="en-US" sz="1200" dirty="0">
+                <a:latin typeface="Arial" panose="020B0604020202020204" pitchFamily="34" charset="0"/>
+                <a:cs typeface="Arial" panose="020B0604020202020204" pitchFamily="34" charset="0"/>
+              </a:rPr>
+              <a:t>MIH</a:t>
+            </a:r>
+          </a:p>
+        </p:txBody>
+      </p:sp>
+      <p:sp>
+        <p:nvSpPr>
+          <p:cNvPr id="57" name="TextBox 56">
+            <a:extLst>
+              <a:ext uri="{FF2B5EF4-FFF2-40B4-BE49-F238E27FC236}">
+                <a16:creationId xmlns:a16="http://schemas.microsoft.com/office/drawing/2014/main" id="{49BE76D8-D1EB-3F47-8E7F-F47B8A03088E}"/>
+              </a:ext>
+            </a:extLst>
+          </p:cNvPr>
+          <p:cNvSpPr txBox="1"/>
+          <p:nvPr/>
+        </p:nvSpPr>
+        <p:spPr>
+          <a:xfrm rot="2373436">
+            <a:off x="4865624" y="3844787"/>
+            <a:ext cx="606605" cy="276999"/>
+          </a:xfrm>
+          <a:prstGeom prst="rect">
+            <a:avLst/>
+          </a:prstGeom>
+          <a:noFill/>
+        </p:spPr>
+        <p:txBody>
+          <a:bodyPr wrap="square" rtlCol="0">
+            <a:spAutoFit/>
+          </a:bodyPr>
+          <a:lstStyle/>
+          <a:p>
+            <a:r>
+              <a:rPr lang="en-US" sz="1200" dirty="0">
+                <a:latin typeface="Arial" panose="020B0604020202020204" pitchFamily="34" charset="0"/>
+                <a:cs typeface="Arial" panose="020B0604020202020204" pitchFamily="34" charset="0"/>
+              </a:rPr>
+              <a:t>NSH</a:t>
+            </a:r>
+          </a:p>
+        </p:txBody>
+      </p:sp>
+      <p:sp>
+        <p:nvSpPr>
+          <p:cNvPr id="58" name="TextBox 57">
+            <a:extLst>
+              <a:ext uri="{FF2B5EF4-FFF2-40B4-BE49-F238E27FC236}">
+                <a16:creationId xmlns:a16="http://schemas.microsoft.com/office/drawing/2014/main" id="{09D43F0B-D20B-BF47-A249-34BFAB254B07}"/>
+              </a:ext>
+            </a:extLst>
+          </p:cNvPr>
+          <p:cNvSpPr txBox="1"/>
+          <p:nvPr/>
+        </p:nvSpPr>
+        <p:spPr>
+          <a:xfrm rot="19585578">
+            <a:off x="7276036" y="2669802"/>
+            <a:ext cx="606605" cy="276999"/>
+          </a:xfrm>
+          <a:prstGeom prst="rect">
+            <a:avLst/>
+          </a:prstGeom>
+          <a:noFill/>
+        </p:spPr>
+        <p:txBody>
+          <a:bodyPr wrap="square" rtlCol="0">
+            <a:spAutoFit/>
+          </a:bodyPr>
+          <a:lstStyle/>
+          <a:p>
+            <a:r>
+              <a:rPr lang="en-US" sz="1200" dirty="0">
+                <a:latin typeface="Arial" panose="020B0604020202020204" pitchFamily="34" charset="0"/>
+                <a:cs typeface="Arial" panose="020B0604020202020204" pitchFamily="34" charset="0"/>
+              </a:rPr>
+              <a:t>NSH</a:t>
             </a:r>
           </a:p>
         </p:txBody>

</xml_diff>

<commit_message>
fig tweaks, gaps in ndvi null mod
</commit_message>
<xml_diff>
--- a/Figures/mih_paper_figures.pptx
+++ b/Figures/mih_paper_figures.pptx
@@ -5,7 +5,7 @@
     <p:sldMasterId id="2147483648" r:id="rId1"/>
   </p:sldMasterIdLst>
   <p:notesMasterIdLst>
-    <p:notesMasterId r:id="rId11"/>
+    <p:notesMasterId r:id="rId12"/>
   </p:notesMasterIdLst>
   <p:sldIdLst>
     <p:sldId id="263" r:id="rId2"/>
@@ -17,6 +17,7 @@
     <p:sldId id="266" r:id="rId8"/>
     <p:sldId id="260" r:id="rId9"/>
     <p:sldId id="261" r:id="rId10"/>
+    <p:sldId id="267" r:id="rId11"/>
   </p:sldIdLst>
   <p:sldSz cx="12192000" cy="6858000"/>
   <p:notesSz cx="6858000" cy="9144000"/>
@@ -205,7 +206,7 @@
           <a:p>
             <a:fld id="{11D58CBC-377E-2D41-95A0-D5F6A72FAB78}" type="datetimeFigureOut">
               <a:rPr lang="en-US" smtClean="0"/>
-              <a:t>4/7/21</a:t>
+              <a:t>4/28/22</a:t>
             </a:fld>
             <a:endParaRPr lang="en-US"/>
           </a:p>
@@ -1303,7 +1304,7 @@
           <a:p>
             <a:fld id="{2B014276-E290-3448-B189-1B145A2DBC63}" type="datetimeFigureOut">
               <a:rPr lang="en-US" smtClean="0"/>
-              <a:t>4/7/21</a:t>
+              <a:t>4/28/22</a:t>
             </a:fld>
             <a:endParaRPr lang="en-US"/>
           </a:p>
@@ -1501,7 +1502,7 @@
           <a:p>
             <a:fld id="{2B014276-E290-3448-B189-1B145A2DBC63}" type="datetimeFigureOut">
               <a:rPr lang="en-US" smtClean="0"/>
-              <a:t>4/7/21</a:t>
+              <a:t>4/28/22</a:t>
             </a:fld>
             <a:endParaRPr lang="en-US"/>
           </a:p>
@@ -1709,7 +1710,7 @@
           <a:p>
             <a:fld id="{2B014276-E290-3448-B189-1B145A2DBC63}" type="datetimeFigureOut">
               <a:rPr lang="en-US" smtClean="0"/>
-              <a:t>4/7/21</a:t>
+              <a:t>4/28/22</a:t>
             </a:fld>
             <a:endParaRPr lang="en-US"/>
           </a:p>
@@ -1907,7 +1908,7 @@
           <a:p>
             <a:fld id="{2B014276-E290-3448-B189-1B145A2DBC63}" type="datetimeFigureOut">
               <a:rPr lang="en-US" smtClean="0"/>
-              <a:t>4/7/21</a:t>
+              <a:t>4/28/22</a:t>
             </a:fld>
             <a:endParaRPr lang="en-US"/>
           </a:p>
@@ -2182,7 +2183,7 @@
           <a:p>
             <a:fld id="{2B014276-E290-3448-B189-1B145A2DBC63}" type="datetimeFigureOut">
               <a:rPr lang="en-US" smtClean="0"/>
-              <a:t>4/7/21</a:t>
+              <a:t>4/28/22</a:t>
             </a:fld>
             <a:endParaRPr lang="en-US"/>
           </a:p>
@@ -2447,7 +2448,7 @@
           <a:p>
             <a:fld id="{2B014276-E290-3448-B189-1B145A2DBC63}" type="datetimeFigureOut">
               <a:rPr lang="en-US" smtClean="0"/>
-              <a:t>4/7/21</a:t>
+              <a:t>4/28/22</a:t>
             </a:fld>
             <a:endParaRPr lang="en-US"/>
           </a:p>
@@ -2859,7 +2860,7 @@
           <a:p>
             <a:fld id="{2B014276-E290-3448-B189-1B145A2DBC63}" type="datetimeFigureOut">
               <a:rPr lang="en-US" smtClean="0"/>
-              <a:t>4/7/21</a:t>
+              <a:t>4/28/22</a:t>
             </a:fld>
             <a:endParaRPr lang="en-US"/>
           </a:p>
@@ -3000,7 +3001,7 @@
           <a:p>
             <a:fld id="{2B014276-E290-3448-B189-1B145A2DBC63}" type="datetimeFigureOut">
               <a:rPr lang="en-US" smtClean="0"/>
-              <a:t>4/7/21</a:t>
+              <a:t>4/28/22</a:t>
             </a:fld>
             <a:endParaRPr lang="en-US"/>
           </a:p>
@@ -3113,7 +3114,7 @@
           <a:p>
             <a:fld id="{2B014276-E290-3448-B189-1B145A2DBC63}" type="datetimeFigureOut">
               <a:rPr lang="en-US" smtClean="0"/>
-              <a:t>4/7/21</a:t>
+              <a:t>4/28/22</a:t>
             </a:fld>
             <a:endParaRPr lang="en-US"/>
           </a:p>
@@ -3424,7 +3425,7 @@
           <a:p>
             <a:fld id="{2B014276-E290-3448-B189-1B145A2DBC63}" type="datetimeFigureOut">
               <a:rPr lang="en-US" smtClean="0"/>
-              <a:t>4/7/21</a:t>
+              <a:t>4/28/22</a:t>
             </a:fld>
             <a:endParaRPr lang="en-US"/>
           </a:p>
@@ -3712,7 +3713,7 @@
           <a:p>
             <a:fld id="{2B014276-E290-3448-B189-1B145A2DBC63}" type="datetimeFigureOut">
               <a:rPr lang="en-US" smtClean="0"/>
-              <a:t>4/7/21</a:t>
+              <a:t>4/28/22</a:t>
             </a:fld>
             <a:endParaRPr lang="en-US"/>
           </a:p>
@@ -3953,7 +3954,7 @@
           <a:p>
             <a:fld id="{2B014276-E290-3448-B189-1B145A2DBC63}" type="datetimeFigureOut">
               <a:rPr lang="en-US" smtClean="0"/>
-              <a:t>4/7/21</a:t>
+              <a:t>4/28/22</a:t>
             </a:fld>
             <a:endParaRPr lang="en-US"/>
           </a:p>
@@ -10490,6 +10491,2304 @@
 </p:sld>
 </file>
 
+<file path=ppt/slides/slide10.xml><?xml version="1.0" encoding="utf-8"?>
+<p:sld xmlns:a="http://schemas.openxmlformats.org/drawingml/2006/main" xmlns:r="http://schemas.openxmlformats.org/officeDocument/2006/relationships" xmlns:p="http://schemas.openxmlformats.org/presentationml/2006/main">
+  <p:cSld>
+    <p:spTree>
+      <p:nvGrpSpPr>
+        <p:cNvPr id="1" name=""/>
+        <p:cNvGrpSpPr/>
+        <p:nvPr/>
+      </p:nvGrpSpPr>
+      <p:grpSpPr>
+        <a:xfrm>
+          <a:off x="0" y="0"/>
+          <a:ext cx="0" cy="0"/>
+          <a:chOff x="0" y="0"/>
+          <a:chExt cx="0" cy="0"/>
+        </a:xfrm>
+      </p:grpSpPr>
+      <p:cxnSp>
+        <p:nvCxnSpPr>
+          <p:cNvPr id="2" name="Straight Connector 1">
+            <a:extLst>
+              <a:ext uri="{FF2B5EF4-FFF2-40B4-BE49-F238E27FC236}">
+                <a16:creationId xmlns:a16="http://schemas.microsoft.com/office/drawing/2014/main" id="{E124DCAA-60B1-01A4-C727-F589507ED890}"/>
+              </a:ext>
+            </a:extLst>
+          </p:cNvPr>
+          <p:cNvCxnSpPr/>
+          <p:nvPr/>
+        </p:nvCxnSpPr>
+        <p:spPr>
+          <a:xfrm flipH="1">
+            <a:off x="1918542" y="3561338"/>
+            <a:ext cx="2039582" cy="2983"/>
+          </a:xfrm>
+          <a:prstGeom prst="line">
+            <a:avLst/>
+          </a:prstGeom>
+          <a:ln>
+            <a:solidFill>
+              <a:schemeClr val="tx1"/>
+            </a:solidFill>
+          </a:ln>
+        </p:spPr>
+        <p:style>
+          <a:lnRef idx="1">
+            <a:schemeClr val="accent1"/>
+          </a:lnRef>
+          <a:fillRef idx="0">
+            <a:schemeClr val="accent1"/>
+          </a:fillRef>
+          <a:effectRef idx="0">
+            <a:schemeClr val="accent1"/>
+          </a:effectRef>
+          <a:fontRef idx="minor">
+            <a:schemeClr val="tx1"/>
+          </a:fontRef>
+        </p:style>
+      </p:cxnSp>
+      <p:cxnSp>
+        <p:nvCxnSpPr>
+          <p:cNvPr id="4" name="Straight Connector 3">
+            <a:extLst>
+              <a:ext uri="{FF2B5EF4-FFF2-40B4-BE49-F238E27FC236}">
+                <a16:creationId xmlns:a16="http://schemas.microsoft.com/office/drawing/2014/main" id="{71A018F7-D00A-A97B-2AD7-0D02FECB6DB1}"/>
+              </a:ext>
+            </a:extLst>
+          </p:cNvPr>
+          <p:cNvCxnSpPr/>
+          <p:nvPr/>
+        </p:nvCxnSpPr>
+        <p:spPr>
+          <a:xfrm>
+            <a:off x="2938332" y="2891482"/>
+            <a:ext cx="1019791" cy="0"/>
+          </a:xfrm>
+          <a:prstGeom prst="line">
+            <a:avLst/>
+          </a:prstGeom>
+          <a:ln w="28575"/>
+        </p:spPr>
+        <p:style>
+          <a:lnRef idx="1">
+            <a:schemeClr val="accent1"/>
+          </a:lnRef>
+          <a:fillRef idx="0">
+            <a:schemeClr val="accent1"/>
+          </a:fillRef>
+          <a:effectRef idx="0">
+            <a:schemeClr val="accent1"/>
+          </a:effectRef>
+          <a:fontRef idx="minor">
+            <a:schemeClr val="tx1"/>
+          </a:fontRef>
+        </p:style>
+      </p:cxnSp>
+      <p:cxnSp>
+        <p:nvCxnSpPr>
+          <p:cNvPr id="5" name="Straight Connector 4">
+            <a:extLst>
+              <a:ext uri="{FF2B5EF4-FFF2-40B4-BE49-F238E27FC236}">
+                <a16:creationId xmlns:a16="http://schemas.microsoft.com/office/drawing/2014/main" id="{8D980157-8CBD-2E9A-D1AF-E697E3B593B4}"/>
+              </a:ext>
+            </a:extLst>
+          </p:cNvPr>
+          <p:cNvCxnSpPr>
+            <a:cxnSpLocks/>
+          </p:cNvCxnSpPr>
+          <p:nvPr/>
+        </p:nvCxnSpPr>
+        <p:spPr>
+          <a:xfrm>
+            <a:off x="2038253" y="3315729"/>
+            <a:ext cx="1503247" cy="0"/>
+          </a:xfrm>
+          <a:prstGeom prst="line">
+            <a:avLst/>
+          </a:prstGeom>
+          <a:ln w="28575">
+            <a:solidFill>
+              <a:schemeClr val="accent4">
+                <a:lumMod val="60000"/>
+                <a:lumOff val="40000"/>
+              </a:schemeClr>
+            </a:solidFill>
+            <a:prstDash val="sysDash"/>
+          </a:ln>
+        </p:spPr>
+        <p:style>
+          <a:lnRef idx="1">
+            <a:schemeClr val="accent1"/>
+          </a:lnRef>
+          <a:fillRef idx="0">
+            <a:schemeClr val="accent1"/>
+          </a:fillRef>
+          <a:effectRef idx="0">
+            <a:schemeClr val="accent1"/>
+          </a:effectRef>
+          <a:fontRef idx="minor">
+            <a:schemeClr val="tx1"/>
+          </a:fontRef>
+        </p:style>
+      </p:cxnSp>
+      <p:cxnSp>
+        <p:nvCxnSpPr>
+          <p:cNvPr id="7" name="Straight Connector 6">
+            <a:extLst>
+              <a:ext uri="{FF2B5EF4-FFF2-40B4-BE49-F238E27FC236}">
+                <a16:creationId xmlns:a16="http://schemas.microsoft.com/office/drawing/2014/main" id="{1368EA1A-2F36-D1BC-2A8B-34B2B8DF40AA}"/>
+              </a:ext>
+            </a:extLst>
+          </p:cNvPr>
+          <p:cNvCxnSpPr>
+            <a:cxnSpLocks/>
+          </p:cNvCxnSpPr>
+          <p:nvPr/>
+        </p:nvCxnSpPr>
+        <p:spPr>
+          <a:xfrm>
+            <a:off x="3390137" y="2458062"/>
+            <a:ext cx="509896" cy="0"/>
+          </a:xfrm>
+          <a:prstGeom prst="line">
+            <a:avLst/>
+          </a:prstGeom>
+          <a:ln w="28575">
+            <a:solidFill>
+              <a:schemeClr val="accent6"/>
+            </a:solidFill>
+          </a:ln>
+        </p:spPr>
+        <p:style>
+          <a:lnRef idx="1">
+            <a:schemeClr val="accent1"/>
+          </a:lnRef>
+          <a:fillRef idx="0">
+            <a:schemeClr val="accent1"/>
+          </a:fillRef>
+          <a:effectRef idx="0">
+            <a:schemeClr val="accent1"/>
+          </a:effectRef>
+          <a:fontRef idx="minor">
+            <a:schemeClr val="tx1"/>
+          </a:fontRef>
+        </p:style>
+      </p:cxnSp>
+      <p:sp>
+        <p:nvSpPr>
+          <p:cNvPr id="10" name="TextBox 9">
+            <a:extLst>
+              <a:ext uri="{FF2B5EF4-FFF2-40B4-BE49-F238E27FC236}">
+                <a16:creationId xmlns:a16="http://schemas.microsoft.com/office/drawing/2014/main" id="{18BC5363-5EAE-A425-9D71-DD9387A0298E}"/>
+              </a:ext>
+            </a:extLst>
+          </p:cNvPr>
+          <p:cNvSpPr txBox="1"/>
+          <p:nvPr/>
+        </p:nvSpPr>
+        <p:spPr>
+          <a:xfrm>
+            <a:off x="2554160" y="3561338"/>
+            <a:ext cx="768346" cy="276999"/>
+          </a:xfrm>
+          <a:prstGeom prst="rect">
+            <a:avLst/>
+          </a:prstGeom>
+          <a:noFill/>
+        </p:spPr>
+        <p:txBody>
+          <a:bodyPr wrap="square" rtlCol="0">
+            <a:spAutoFit/>
+          </a:bodyPr>
+          <a:lstStyle/>
+          <a:p>
+            <a:r>
+              <a:rPr lang="en-US" sz="1200" dirty="0">
+                <a:latin typeface="Arial" panose="020B0604020202020204" pitchFamily="34" charset="0"/>
+                <a:cs typeface="Arial" panose="020B0604020202020204" pitchFamily="34" charset="0"/>
+              </a:rPr>
+              <a:t>NDVI</a:t>
+            </a:r>
+          </a:p>
+        </p:txBody>
+      </p:sp>
+      <p:cxnSp>
+        <p:nvCxnSpPr>
+          <p:cNvPr id="11" name="Straight Connector 10">
+            <a:extLst>
+              <a:ext uri="{FF2B5EF4-FFF2-40B4-BE49-F238E27FC236}">
+                <a16:creationId xmlns:a16="http://schemas.microsoft.com/office/drawing/2014/main" id="{11731F8C-A2DF-A32A-234E-5E884FDD35AE}"/>
+              </a:ext>
+            </a:extLst>
+          </p:cNvPr>
+          <p:cNvCxnSpPr>
+            <a:cxnSpLocks/>
+          </p:cNvCxnSpPr>
+          <p:nvPr/>
+        </p:nvCxnSpPr>
+        <p:spPr>
+          <a:xfrm>
+            <a:off x="1918542" y="1944130"/>
+            <a:ext cx="0" cy="1617208"/>
+          </a:xfrm>
+          <a:prstGeom prst="line">
+            <a:avLst/>
+          </a:prstGeom>
+          <a:ln>
+            <a:solidFill>
+              <a:schemeClr val="tx1"/>
+            </a:solidFill>
+          </a:ln>
+        </p:spPr>
+        <p:style>
+          <a:lnRef idx="1">
+            <a:schemeClr val="accent1"/>
+          </a:lnRef>
+          <a:fillRef idx="0">
+            <a:schemeClr val="accent1"/>
+          </a:fillRef>
+          <a:effectRef idx="0">
+            <a:schemeClr val="accent1"/>
+          </a:effectRef>
+          <a:fontRef idx="minor">
+            <a:schemeClr val="tx1"/>
+          </a:fontRef>
+        </p:style>
+      </p:cxnSp>
+      <p:sp>
+        <p:nvSpPr>
+          <p:cNvPr id="13" name="TextBox 12">
+            <a:extLst>
+              <a:ext uri="{FF2B5EF4-FFF2-40B4-BE49-F238E27FC236}">
+                <a16:creationId xmlns:a16="http://schemas.microsoft.com/office/drawing/2014/main" id="{591DB21E-39FF-D608-9359-E139714F371B}"/>
+              </a:ext>
+            </a:extLst>
+          </p:cNvPr>
+          <p:cNvSpPr txBox="1"/>
+          <p:nvPr/>
+        </p:nvSpPr>
+        <p:spPr>
+          <a:xfrm>
+            <a:off x="1506236" y="2371830"/>
+            <a:ext cx="650789" cy="338554"/>
+          </a:xfrm>
+          <a:prstGeom prst="rect">
+            <a:avLst/>
+          </a:prstGeom>
+          <a:noFill/>
+        </p:spPr>
+        <p:txBody>
+          <a:bodyPr wrap="square" rtlCol="0">
+            <a:spAutoFit/>
+          </a:bodyPr>
+          <a:lstStyle/>
+          <a:p>
+            <a:r>
+              <a:rPr lang="en-US" sz="1600" dirty="0">
+                <a:solidFill>
+                  <a:schemeClr val="accent6"/>
+                </a:solidFill>
+                <a:latin typeface="Arial" panose="020B0604020202020204" pitchFamily="34" charset="0"/>
+                <a:cs typeface="Arial" panose="020B0604020202020204" pitchFamily="34" charset="0"/>
+              </a:rPr>
+              <a:t>S1</a:t>
+            </a:r>
+          </a:p>
+        </p:txBody>
+      </p:sp>
+      <p:sp>
+        <p:nvSpPr>
+          <p:cNvPr id="14" name="TextBox 13">
+            <a:extLst>
+              <a:ext uri="{FF2B5EF4-FFF2-40B4-BE49-F238E27FC236}">
+                <a16:creationId xmlns:a16="http://schemas.microsoft.com/office/drawing/2014/main" id="{30046363-7FEB-E09D-E0CD-AC40CB818DBF}"/>
+              </a:ext>
+            </a:extLst>
+          </p:cNvPr>
+          <p:cNvSpPr txBox="1"/>
+          <p:nvPr/>
+        </p:nvSpPr>
+        <p:spPr>
+          <a:xfrm>
+            <a:off x="1491048" y="2726953"/>
+            <a:ext cx="650789" cy="338554"/>
+          </a:xfrm>
+          <a:prstGeom prst="rect">
+            <a:avLst/>
+          </a:prstGeom>
+          <a:noFill/>
+        </p:spPr>
+        <p:txBody>
+          <a:bodyPr wrap="square" rtlCol="0">
+            <a:spAutoFit/>
+          </a:bodyPr>
+          <a:lstStyle/>
+          <a:p>
+            <a:r>
+              <a:rPr lang="en-US" sz="1600" dirty="0">
+                <a:solidFill>
+                  <a:schemeClr val="accent1"/>
+                </a:solidFill>
+                <a:latin typeface="Arial" panose="020B0604020202020204" pitchFamily="34" charset="0"/>
+                <a:cs typeface="Arial" panose="020B0604020202020204" pitchFamily="34" charset="0"/>
+              </a:rPr>
+              <a:t>S2</a:t>
+            </a:r>
+          </a:p>
+        </p:txBody>
+      </p:sp>
+      <p:sp>
+        <p:nvSpPr>
+          <p:cNvPr id="15" name="TextBox 14">
+            <a:extLst>
+              <a:ext uri="{FF2B5EF4-FFF2-40B4-BE49-F238E27FC236}">
+                <a16:creationId xmlns:a16="http://schemas.microsoft.com/office/drawing/2014/main" id="{4300C380-0ACC-DD50-CFA0-48C522CBBC09}"/>
+              </a:ext>
+            </a:extLst>
+          </p:cNvPr>
+          <p:cNvSpPr txBox="1"/>
+          <p:nvPr/>
+        </p:nvSpPr>
+        <p:spPr>
+          <a:xfrm>
+            <a:off x="1491048" y="3079386"/>
+            <a:ext cx="650789" cy="338554"/>
+          </a:xfrm>
+          <a:prstGeom prst="rect">
+            <a:avLst/>
+          </a:prstGeom>
+          <a:noFill/>
+          <a:ln>
+            <a:noFill/>
+          </a:ln>
+        </p:spPr>
+        <p:txBody>
+          <a:bodyPr wrap="square" rtlCol="0">
+            <a:spAutoFit/>
+          </a:bodyPr>
+          <a:lstStyle/>
+          <a:p>
+            <a:r>
+              <a:rPr lang="en-US" sz="1600" dirty="0">
+                <a:solidFill>
+                  <a:schemeClr val="accent4"/>
+                </a:solidFill>
+                <a:latin typeface="Arial" panose="020B0604020202020204" pitchFamily="34" charset="0"/>
+                <a:cs typeface="Arial" panose="020B0604020202020204" pitchFamily="34" charset="0"/>
+              </a:rPr>
+              <a:t>S3</a:t>
+            </a:r>
+          </a:p>
+        </p:txBody>
+      </p:sp>
+      <p:cxnSp>
+        <p:nvCxnSpPr>
+          <p:cNvPr id="49" name="Straight Connector 48">
+            <a:extLst>
+              <a:ext uri="{FF2B5EF4-FFF2-40B4-BE49-F238E27FC236}">
+                <a16:creationId xmlns:a16="http://schemas.microsoft.com/office/drawing/2014/main" id="{2F5C5045-A23E-C71B-DA3C-941B0B8F007C}"/>
+              </a:ext>
+            </a:extLst>
+          </p:cNvPr>
+          <p:cNvCxnSpPr>
+            <a:cxnSpLocks/>
+          </p:cNvCxnSpPr>
+          <p:nvPr/>
+        </p:nvCxnSpPr>
+        <p:spPr>
+          <a:xfrm>
+            <a:off x="2683384" y="2541107"/>
+            <a:ext cx="509896" cy="0"/>
+          </a:xfrm>
+          <a:prstGeom prst="line">
+            <a:avLst/>
+          </a:prstGeom>
+          <a:ln w="28575">
+            <a:solidFill>
+              <a:schemeClr val="accent6"/>
+            </a:solidFill>
+            <a:prstDash val="sysDash"/>
+          </a:ln>
+        </p:spPr>
+        <p:style>
+          <a:lnRef idx="1">
+            <a:schemeClr val="accent1"/>
+          </a:lnRef>
+          <a:fillRef idx="0">
+            <a:schemeClr val="accent1"/>
+          </a:fillRef>
+          <a:effectRef idx="0">
+            <a:schemeClr val="accent1"/>
+          </a:effectRef>
+          <a:fontRef idx="minor">
+            <a:schemeClr val="tx1"/>
+          </a:fontRef>
+        </p:style>
+      </p:cxnSp>
+      <p:cxnSp>
+        <p:nvCxnSpPr>
+          <p:cNvPr id="50" name="Straight Connector 49">
+            <a:extLst>
+              <a:ext uri="{FF2B5EF4-FFF2-40B4-BE49-F238E27FC236}">
+                <a16:creationId xmlns:a16="http://schemas.microsoft.com/office/drawing/2014/main" id="{F8D9DC19-606E-3166-FE3A-BE46DCE41EFD}"/>
+              </a:ext>
+            </a:extLst>
+          </p:cNvPr>
+          <p:cNvCxnSpPr/>
+          <p:nvPr/>
+        </p:nvCxnSpPr>
+        <p:spPr>
+          <a:xfrm>
+            <a:off x="2425141" y="2786944"/>
+            <a:ext cx="1019791" cy="0"/>
+          </a:xfrm>
+          <a:prstGeom prst="line">
+            <a:avLst/>
+          </a:prstGeom>
+          <a:ln w="28575">
+            <a:prstDash val="sysDot"/>
+          </a:ln>
+        </p:spPr>
+        <p:style>
+          <a:lnRef idx="1">
+            <a:schemeClr val="accent1"/>
+          </a:lnRef>
+          <a:fillRef idx="0">
+            <a:schemeClr val="accent1"/>
+          </a:fillRef>
+          <a:effectRef idx="0">
+            <a:schemeClr val="accent1"/>
+          </a:effectRef>
+          <a:fontRef idx="minor">
+            <a:schemeClr val="tx1"/>
+          </a:fontRef>
+        </p:style>
+      </p:cxnSp>
+      <p:cxnSp>
+        <p:nvCxnSpPr>
+          <p:cNvPr id="51" name="Straight Connector 50">
+            <a:extLst>
+              <a:ext uri="{FF2B5EF4-FFF2-40B4-BE49-F238E27FC236}">
+                <a16:creationId xmlns:a16="http://schemas.microsoft.com/office/drawing/2014/main" id="{25B2943B-49DD-76EB-F088-F922E6EAF241}"/>
+              </a:ext>
+            </a:extLst>
+          </p:cNvPr>
+          <p:cNvCxnSpPr>
+            <a:cxnSpLocks/>
+          </p:cNvCxnSpPr>
+          <p:nvPr/>
+        </p:nvCxnSpPr>
+        <p:spPr>
+          <a:xfrm>
+            <a:off x="2441656" y="3405046"/>
+            <a:ext cx="1503247" cy="0"/>
+          </a:xfrm>
+          <a:prstGeom prst="line">
+            <a:avLst/>
+          </a:prstGeom>
+          <a:ln w="28575">
+            <a:solidFill>
+              <a:schemeClr val="accent4">
+                <a:lumMod val="60000"/>
+                <a:lumOff val="40000"/>
+              </a:schemeClr>
+            </a:solidFill>
+            <a:prstDash val="solid"/>
+          </a:ln>
+        </p:spPr>
+        <p:style>
+          <a:lnRef idx="1">
+            <a:schemeClr val="accent1"/>
+          </a:lnRef>
+          <a:fillRef idx="0">
+            <a:schemeClr val="accent1"/>
+          </a:fillRef>
+          <a:effectRef idx="0">
+            <a:schemeClr val="accent1"/>
+          </a:effectRef>
+          <a:fontRef idx="minor">
+            <a:schemeClr val="tx1"/>
+          </a:fontRef>
+        </p:style>
+      </p:cxnSp>
+      <p:cxnSp>
+        <p:nvCxnSpPr>
+          <p:cNvPr id="52" name="Straight Connector 51">
+            <a:extLst>
+              <a:ext uri="{FF2B5EF4-FFF2-40B4-BE49-F238E27FC236}">
+                <a16:creationId xmlns:a16="http://schemas.microsoft.com/office/drawing/2014/main" id="{7ECEBCAD-6882-A4D6-5645-250943769122}"/>
+              </a:ext>
+            </a:extLst>
+          </p:cNvPr>
+          <p:cNvCxnSpPr>
+            <a:cxnSpLocks/>
+          </p:cNvCxnSpPr>
+          <p:nvPr/>
+        </p:nvCxnSpPr>
+        <p:spPr>
+          <a:xfrm>
+            <a:off x="2141837" y="2437733"/>
+            <a:ext cx="509896" cy="0"/>
+          </a:xfrm>
+          <a:prstGeom prst="line">
+            <a:avLst/>
+          </a:prstGeom>
+          <a:ln w="28575">
+            <a:solidFill>
+              <a:schemeClr val="accent6"/>
+            </a:solidFill>
+            <a:prstDash val="sysDot"/>
+          </a:ln>
+        </p:spPr>
+        <p:style>
+          <a:lnRef idx="1">
+            <a:schemeClr val="accent1"/>
+          </a:lnRef>
+          <a:fillRef idx="0">
+            <a:schemeClr val="accent1"/>
+          </a:fillRef>
+          <a:effectRef idx="0">
+            <a:schemeClr val="accent1"/>
+          </a:effectRef>
+          <a:fontRef idx="minor">
+            <a:schemeClr val="tx1"/>
+          </a:fontRef>
+        </p:style>
+      </p:cxnSp>
+      <p:cxnSp>
+        <p:nvCxnSpPr>
+          <p:cNvPr id="53" name="Straight Connector 52">
+            <a:extLst>
+              <a:ext uri="{FF2B5EF4-FFF2-40B4-BE49-F238E27FC236}">
+                <a16:creationId xmlns:a16="http://schemas.microsoft.com/office/drawing/2014/main" id="{13A8409E-2962-7F7C-59F6-C438174D3FD0}"/>
+              </a:ext>
+            </a:extLst>
+          </p:cNvPr>
+          <p:cNvCxnSpPr/>
+          <p:nvPr/>
+        </p:nvCxnSpPr>
+        <p:spPr>
+          <a:xfrm>
+            <a:off x="2226789" y="2999742"/>
+            <a:ext cx="1019791" cy="0"/>
+          </a:xfrm>
+          <a:prstGeom prst="line">
+            <a:avLst/>
+          </a:prstGeom>
+          <a:ln w="28575">
+            <a:prstDash val="sysDash"/>
+          </a:ln>
+        </p:spPr>
+        <p:style>
+          <a:lnRef idx="1">
+            <a:schemeClr val="accent1"/>
+          </a:lnRef>
+          <a:fillRef idx="0">
+            <a:schemeClr val="accent1"/>
+          </a:fillRef>
+          <a:effectRef idx="0">
+            <a:schemeClr val="accent1"/>
+          </a:effectRef>
+          <a:fontRef idx="minor">
+            <a:schemeClr val="tx1"/>
+          </a:fontRef>
+        </p:style>
+      </p:cxnSp>
+      <p:cxnSp>
+        <p:nvCxnSpPr>
+          <p:cNvPr id="54" name="Straight Connector 53">
+            <a:extLst>
+              <a:ext uri="{FF2B5EF4-FFF2-40B4-BE49-F238E27FC236}">
+                <a16:creationId xmlns:a16="http://schemas.microsoft.com/office/drawing/2014/main" id="{CF371DB5-1D93-F21C-9BDC-36922C698F26}"/>
+              </a:ext>
+            </a:extLst>
+          </p:cNvPr>
+          <p:cNvCxnSpPr>
+            <a:cxnSpLocks/>
+          </p:cNvCxnSpPr>
+          <p:nvPr/>
+        </p:nvCxnSpPr>
+        <p:spPr>
+          <a:xfrm>
+            <a:off x="2282797" y="3215710"/>
+            <a:ext cx="1503247" cy="0"/>
+          </a:xfrm>
+          <a:prstGeom prst="line">
+            <a:avLst/>
+          </a:prstGeom>
+          <a:ln w="28575">
+            <a:solidFill>
+              <a:schemeClr val="accent4">
+                <a:lumMod val="60000"/>
+                <a:lumOff val="40000"/>
+              </a:schemeClr>
+            </a:solidFill>
+            <a:prstDash val="sysDot"/>
+          </a:ln>
+        </p:spPr>
+        <p:style>
+          <a:lnRef idx="1">
+            <a:schemeClr val="accent1"/>
+          </a:lnRef>
+          <a:fillRef idx="0">
+            <a:schemeClr val="accent1"/>
+          </a:fillRef>
+          <a:effectRef idx="0">
+            <a:schemeClr val="accent1"/>
+          </a:effectRef>
+          <a:fontRef idx="minor">
+            <a:schemeClr val="tx1"/>
+          </a:fontRef>
+        </p:style>
+      </p:cxnSp>
+      <p:sp>
+        <p:nvSpPr>
+          <p:cNvPr id="55" name="TextBox 54">
+            <a:extLst>
+              <a:ext uri="{FF2B5EF4-FFF2-40B4-BE49-F238E27FC236}">
+                <a16:creationId xmlns:a16="http://schemas.microsoft.com/office/drawing/2014/main" id="{8591A675-9671-F307-406E-BFAECE0A5E1A}"/>
+              </a:ext>
+            </a:extLst>
+          </p:cNvPr>
+          <p:cNvSpPr txBox="1"/>
+          <p:nvPr/>
+        </p:nvSpPr>
+        <p:spPr>
+          <a:xfrm>
+            <a:off x="4007551" y="2049887"/>
+            <a:ext cx="885726" cy="307777"/>
+          </a:xfrm>
+          <a:prstGeom prst="rect">
+            <a:avLst/>
+          </a:prstGeom>
+          <a:noFill/>
+          <a:ln w="12700">
+            <a:solidFill>
+              <a:schemeClr val="tx1"/>
+            </a:solidFill>
+            <a:prstDash val="sysDot"/>
+          </a:ln>
+        </p:spPr>
+        <p:txBody>
+          <a:bodyPr wrap="square" rtlCol="0">
+            <a:spAutoFit/>
+          </a:bodyPr>
+          <a:lstStyle/>
+          <a:p>
+            <a:r>
+              <a:rPr lang="en-US" sz="1400" dirty="0">
+                <a:latin typeface="Arial" panose="020B0604020202020204" pitchFamily="34" charset="0"/>
+                <a:cs typeface="Arial" panose="020B0604020202020204" pitchFamily="34" charset="0"/>
+              </a:rPr>
+              <a:t>Shuffle 1</a:t>
+            </a:r>
+          </a:p>
+        </p:txBody>
+      </p:sp>
+      <p:sp>
+        <p:nvSpPr>
+          <p:cNvPr id="56" name="TextBox 55">
+            <a:extLst>
+              <a:ext uri="{FF2B5EF4-FFF2-40B4-BE49-F238E27FC236}">
+                <a16:creationId xmlns:a16="http://schemas.microsoft.com/office/drawing/2014/main" id="{F9795CAF-615F-CFDA-F42C-1A39F0EDA47D}"/>
+              </a:ext>
+            </a:extLst>
+          </p:cNvPr>
+          <p:cNvSpPr txBox="1"/>
+          <p:nvPr/>
+        </p:nvSpPr>
+        <p:spPr>
+          <a:xfrm>
+            <a:off x="4007550" y="2487692"/>
+            <a:ext cx="885727" cy="307777"/>
+          </a:xfrm>
+          <a:prstGeom prst="rect">
+            <a:avLst/>
+          </a:prstGeom>
+          <a:noFill/>
+          <a:ln w="12700">
+            <a:solidFill>
+              <a:schemeClr val="tx1"/>
+            </a:solidFill>
+            <a:prstDash val="dash"/>
+          </a:ln>
+        </p:spPr>
+        <p:txBody>
+          <a:bodyPr wrap="square" rtlCol="0">
+            <a:spAutoFit/>
+          </a:bodyPr>
+          <a:lstStyle/>
+          <a:p>
+            <a:r>
+              <a:rPr lang="en-US" sz="1400" dirty="0">
+                <a:latin typeface="Arial" panose="020B0604020202020204" pitchFamily="34" charset="0"/>
+                <a:cs typeface="Arial" panose="020B0604020202020204" pitchFamily="34" charset="0"/>
+              </a:rPr>
+              <a:t>Shuffle 2</a:t>
+            </a:r>
+          </a:p>
+        </p:txBody>
+      </p:sp>
+      <p:sp>
+        <p:nvSpPr>
+          <p:cNvPr id="57" name="TextBox 56">
+            <a:extLst>
+              <a:ext uri="{FF2B5EF4-FFF2-40B4-BE49-F238E27FC236}">
+                <a16:creationId xmlns:a16="http://schemas.microsoft.com/office/drawing/2014/main" id="{4C9DAA35-CE21-EDAF-5A2C-3201F4BB172B}"/>
+              </a:ext>
+            </a:extLst>
+          </p:cNvPr>
+          <p:cNvSpPr txBox="1"/>
+          <p:nvPr/>
+        </p:nvSpPr>
+        <p:spPr>
+          <a:xfrm>
+            <a:off x="4007550" y="2925497"/>
+            <a:ext cx="885727" cy="307777"/>
+          </a:xfrm>
+          <a:prstGeom prst="rect">
+            <a:avLst/>
+          </a:prstGeom>
+          <a:noFill/>
+          <a:ln w="12700">
+            <a:solidFill>
+              <a:schemeClr val="tx1"/>
+            </a:solidFill>
+          </a:ln>
+        </p:spPr>
+        <p:txBody>
+          <a:bodyPr wrap="square" rtlCol="0">
+            <a:spAutoFit/>
+          </a:bodyPr>
+          <a:lstStyle/>
+          <a:p>
+            <a:r>
+              <a:rPr lang="en-US" sz="1400" dirty="0">
+                <a:latin typeface="Arial" panose="020B0604020202020204" pitchFamily="34" charset="0"/>
+                <a:cs typeface="Arial" panose="020B0604020202020204" pitchFamily="34" charset="0"/>
+              </a:rPr>
+              <a:t>Shuffle 3</a:t>
+            </a:r>
+          </a:p>
+        </p:txBody>
+      </p:sp>
+      <p:cxnSp>
+        <p:nvCxnSpPr>
+          <p:cNvPr id="59" name="Straight Connector 58">
+            <a:extLst>
+              <a:ext uri="{FF2B5EF4-FFF2-40B4-BE49-F238E27FC236}">
+                <a16:creationId xmlns:a16="http://schemas.microsoft.com/office/drawing/2014/main" id="{B1546B21-EAB9-35C8-09CF-2E2DDA66C88C}"/>
+              </a:ext>
+            </a:extLst>
+          </p:cNvPr>
+          <p:cNvCxnSpPr>
+            <a:cxnSpLocks/>
+          </p:cNvCxnSpPr>
+          <p:nvPr/>
+        </p:nvCxnSpPr>
+        <p:spPr>
+          <a:xfrm>
+            <a:off x="2141837" y="1944130"/>
+            <a:ext cx="0" cy="1617208"/>
+          </a:xfrm>
+          <a:prstGeom prst="line">
+            <a:avLst/>
+          </a:prstGeom>
+          <a:ln w="12700">
+            <a:solidFill>
+              <a:schemeClr val="accent2">
+                <a:lumMod val="60000"/>
+                <a:lumOff val="40000"/>
+              </a:schemeClr>
+            </a:solidFill>
+          </a:ln>
+        </p:spPr>
+        <p:style>
+          <a:lnRef idx="1">
+            <a:schemeClr val="accent1"/>
+          </a:lnRef>
+          <a:fillRef idx="0">
+            <a:schemeClr val="accent1"/>
+          </a:fillRef>
+          <a:effectRef idx="0">
+            <a:schemeClr val="accent1"/>
+          </a:effectRef>
+          <a:fontRef idx="minor">
+            <a:schemeClr val="tx1"/>
+          </a:fontRef>
+        </p:style>
+      </p:cxnSp>
+      <p:cxnSp>
+        <p:nvCxnSpPr>
+          <p:cNvPr id="63" name="Straight Connector 62">
+            <a:extLst>
+              <a:ext uri="{FF2B5EF4-FFF2-40B4-BE49-F238E27FC236}">
+                <a16:creationId xmlns:a16="http://schemas.microsoft.com/office/drawing/2014/main" id="{16417A6C-1610-6F48-1883-1312750A934E}"/>
+              </a:ext>
+            </a:extLst>
+          </p:cNvPr>
+          <p:cNvCxnSpPr>
+            <a:cxnSpLocks/>
+          </p:cNvCxnSpPr>
+          <p:nvPr/>
+        </p:nvCxnSpPr>
+        <p:spPr>
+          <a:xfrm>
+            <a:off x="3529142" y="1944130"/>
+            <a:ext cx="0" cy="1617208"/>
+          </a:xfrm>
+          <a:prstGeom prst="line">
+            <a:avLst/>
+          </a:prstGeom>
+          <a:ln w="12700">
+            <a:solidFill>
+              <a:schemeClr val="accent5">
+                <a:lumMod val="75000"/>
+              </a:schemeClr>
+            </a:solidFill>
+          </a:ln>
+        </p:spPr>
+        <p:style>
+          <a:lnRef idx="1">
+            <a:schemeClr val="accent1"/>
+          </a:lnRef>
+          <a:fillRef idx="0">
+            <a:schemeClr val="accent1"/>
+          </a:fillRef>
+          <a:effectRef idx="0">
+            <a:schemeClr val="accent1"/>
+          </a:effectRef>
+          <a:fontRef idx="minor">
+            <a:schemeClr val="tx1"/>
+          </a:fontRef>
+        </p:style>
+      </p:cxnSp>
+      <p:sp>
+        <p:nvSpPr>
+          <p:cNvPr id="65" name="Left Bracket 64">
+            <a:extLst>
+              <a:ext uri="{FF2B5EF4-FFF2-40B4-BE49-F238E27FC236}">
+                <a16:creationId xmlns:a16="http://schemas.microsoft.com/office/drawing/2014/main" id="{9EC86066-5528-D838-F48A-95BD991A99DA}"/>
+              </a:ext>
+            </a:extLst>
+          </p:cNvPr>
+          <p:cNvSpPr/>
+          <p:nvPr/>
+        </p:nvSpPr>
+        <p:spPr>
+          <a:xfrm rot="16200000">
+            <a:off x="2099777" y="3533534"/>
+            <a:ext cx="96088" cy="305295"/>
+          </a:xfrm>
+          <a:prstGeom prst="leftBracket">
+            <a:avLst/>
+          </a:prstGeom>
+          <a:ln>
+            <a:solidFill>
+              <a:schemeClr val="accent2">
+                <a:lumMod val="60000"/>
+                <a:lumOff val="40000"/>
+              </a:schemeClr>
+            </a:solidFill>
+          </a:ln>
+        </p:spPr>
+        <p:style>
+          <a:lnRef idx="1">
+            <a:schemeClr val="accent1"/>
+          </a:lnRef>
+          <a:fillRef idx="0">
+            <a:schemeClr val="accent1"/>
+          </a:fillRef>
+          <a:effectRef idx="0">
+            <a:schemeClr val="accent1"/>
+          </a:effectRef>
+          <a:fontRef idx="minor">
+            <a:schemeClr val="tx1"/>
+          </a:fontRef>
+        </p:style>
+        <p:txBody>
+          <a:bodyPr rtlCol="0" anchor="ctr"/>
+          <a:lstStyle/>
+          <a:p>
+            <a:pPr algn="ctr"/>
+            <a:endParaRPr lang="en-US"/>
+          </a:p>
+        </p:txBody>
+      </p:sp>
+      <p:sp>
+        <p:nvSpPr>
+          <p:cNvPr id="66" name="Left Bracket 65">
+            <a:extLst>
+              <a:ext uri="{FF2B5EF4-FFF2-40B4-BE49-F238E27FC236}">
+                <a16:creationId xmlns:a16="http://schemas.microsoft.com/office/drawing/2014/main" id="{0400BE6C-1609-9C2F-4C1D-9FE64D52E3BE}"/>
+              </a:ext>
+            </a:extLst>
+          </p:cNvPr>
+          <p:cNvSpPr/>
+          <p:nvPr/>
+        </p:nvSpPr>
+        <p:spPr>
+          <a:xfrm rot="16200000">
+            <a:off x="3481098" y="3528582"/>
+            <a:ext cx="96088" cy="305295"/>
+          </a:xfrm>
+          <a:prstGeom prst="leftBracket">
+            <a:avLst/>
+          </a:prstGeom>
+          <a:ln>
+            <a:solidFill>
+              <a:schemeClr val="accent5">
+                <a:lumMod val="75000"/>
+              </a:schemeClr>
+            </a:solidFill>
+          </a:ln>
+        </p:spPr>
+        <p:style>
+          <a:lnRef idx="1">
+            <a:schemeClr val="accent1"/>
+          </a:lnRef>
+          <a:fillRef idx="0">
+            <a:schemeClr val="accent1"/>
+          </a:fillRef>
+          <a:effectRef idx="0">
+            <a:schemeClr val="accent1"/>
+          </a:effectRef>
+          <a:fontRef idx="minor">
+            <a:schemeClr val="tx1"/>
+          </a:fontRef>
+        </p:style>
+        <p:txBody>
+          <a:bodyPr rtlCol="0" anchor="ctr"/>
+          <a:lstStyle/>
+          <a:p>
+            <a:pPr algn="ctr"/>
+            <a:endParaRPr lang="en-US">
+              <a:solidFill>
+                <a:schemeClr val="accent5">
+                  <a:lumMod val="75000"/>
+                </a:schemeClr>
+              </a:solidFill>
+            </a:endParaRPr>
+          </a:p>
+        </p:txBody>
+      </p:sp>
+      <p:sp>
+        <p:nvSpPr>
+          <p:cNvPr id="67" name="TextBox 66">
+            <a:extLst>
+              <a:ext uri="{FF2B5EF4-FFF2-40B4-BE49-F238E27FC236}">
+                <a16:creationId xmlns:a16="http://schemas.microsoft.com/office/drawing/2014/main" id="{906822EF-B3F5-E1FE-B588-791E25D44547}"/>
+              </a:ext>
+            </a:extLst>
+          </p:cNvPr>
+          <p:cNvSpPr txBox="1"/>
+          <p:nvPr/>
+        </p:nvSpPr>
+        <p:spPr>
+          <a:xfrm>
+            <a:off x="1903856" y="3726165"/>
+            <a:ext cx="757881" cy="246221"/>
+          </a:xfrm>
+          <a:prstGeom prst="rect">
+            <a:avLst/>
+          </a:prstGeom>
+          <a:noFill/>
+        </p:spPr>
+        <p:txBody>
+          <a:bodyPr wrap="square" rtlCol="0">
+            <a:spAutoFit/>
+          </a:bodyPr>
+          <a:lstStyle/>
+          <a:p>
+            <a:r>
+              <a:rPr lang="en-US" sz="1000" dirty="0">
+                <a:solidFill>
+                  <a:schemeClr val="accent2">
+                    <a:lumMod val="60000"/>
+                    <a:lumOff val="40000"/>
+                  </a:schemeClr>
+                </a:solidFill>
+              </a:rPr>
+              <a:t>Bin 1</a:t>
+            </a:r>
+          </a:p>
+        </p:txBody>
+      </p:sp>
+      <p:sp>
+        <p:nvSpPr>
+          <p:cNvPr id="68" name="TextBox 67">
+            <a:extLst>
+              <a:ext uri="{FF2B5EF4-FFF2-40B4-BE49-F238E27FC236}">
+                <a16:creationId xmlns:a16="http://schemas.microsoft.com/office/drawing/2014/main" id="{C0FF29DE-8AAC-89AB-88F3-07EDE1690278}"/>
+              </a:ext>
+            </a:extLst>
+          </p:cNvPr>
+          <p:cNvSpPr txBox="1"/>
+          <p:nvPr/>
+        </p:nvSpPr>
+        <p:spPr>
+          <a:xfrm>
+            <a:off x="3312041" y="3699529"/>
+            <a:ext cx="757881" cy="246221"/>
+          </a:xfrm>
+          <a:prstGeom prst="rect">
+            <a:avLst/>
+          </a:prstGeom>
+          <a:noFill/>
+        </p:spPr>
+        <p:txBody>
+          <a:bodyPr wrap="square" rtlCol="0">
+            <a:spAutoFit/>
+          </a:bodyPr>
+          <a:lstStyle/>
+          <a:p>
+            <a:r>
+              <a:rPr lang="en-US" sz="1000" dirty="0">
+                <a:solidFill>
+                  <a:schemeClr val="accent5">
+                    <a:lumMod val="75000"/>
+                  </a:schemeClr>
+                </a:solidFill>
+              </a:rPr>
+              <a:t>Bin 2</a:t>
+            </a:r>
+          </a:p>
+        </p:txBody>
+      </p:sp>
+      <p:cxnSp>
+        <p:nvCxnSpPr>
+          <p:cNvPr id="69" name="Straight Connector 68">
+            <a:extLst>
+              <a:ext uri="{FF2B5EF4-FFF2-40B4-BE49-F238E27FC236}">
+                <a16:creationId xmlns:a16="http://schemas.microsoft.com/office/drawing/2014/main" id="{D3BE8DB9-876E-1978-603D-8E5489476017}"/>
+              </a:ext>
+            </a:extLst>
+          </p:cNvPr>
+          <p:cNvCxnSpPr/>
+          <p:nvPr/>
+        </p:nvCxnSpPr>
+        <p:spPr>
+          <a:xfrm flipH="1">
+            <a:off x="1915246" y="5640509"/>
+            <a:ext cx="2039582" cy="2983"/>
+          </a:xfrm>
+          <a:prstGeom prst="line">
+            <a:avLst/>
+          </a:prstGeom>
+          <a:ln>
+            <a:solidFill>
+              <a:schemeClr val="tx1"/>
+            </a:solidFill>
+          </a:ln>
+        </p:spPr>
+        <p:style>
+          <a:lnRef idx="1">
+            <a:schemeClr val="accent1"/>
+          </a:lnRef>
+          <a:fillRef idx="0">
+            <a:schemeClr val="accent1"/>
+          </a:fillRef>
+          <a:effectRef idx="0">
+            <a:schemeClr val="accent1"/>
+          </a:effectRef>
+          <a:fontRef idx="minor">
+            <a:schemeClr val="tx1"/>
+          </a:fontRef>
+        </p:style>
+      </p:cxnSp>
+      <p:sp>
+        <p:nvSpPr>
+          <p:cNvPr id="70" name="TextBox 69">
+            <a:extLst>
+              <a:ext uri="{FF2B5EF4-FFF2-40B4-BE49-F238E27FC236}">
+                <a16:creationId xmlns:a16="http://schemas.microsoft.com/office/drawing/2014/main" id="{0B931B6A-B5F8-BE7F-FFE5-9A8431CFDD96}"/>
+              </a:ext>
+            </a:extLst>
+          </p:cNvPr>
+          <p:cNvSpPr txBox="1"/>
+          <p:nvPr/>
+        </p:nvSpPr>
+        <p:spPr>
+          <a:xfrm>
+            <a:off x="2550863" y="5640509"/>
+            <a:ext cx="825627" cy="276999"/>
+          </a:xfrm>
+          <a:prstGeom prst="rect">
+            <a:avLst/>
+          </a:prstGeom>
+          <a:noFill/>
+        </p:spPr>
+        <p:txBody>
+          <a:bodyPr wrap="square" rtlCol="0">
+            <a:spAutoFit/>
+          </a:bodyPr>
+          <a:lstStyle/>
+          <a:p>
+            <a:r>
+              <a:rPr lang="en-US" sz="1200" dirty="0">
+                <a:latin typeface="Arial" panose="020B0604020202020204" pitchFamily="34" charset="0"/>
+                <a:cs typeface="Arial" panose="020B0604020202020204" pitchFamily="34" charset="0"/>
+              </a:rPr>
+              <a:t>NDVI bin</a:t>
+            </a:r>
+          </a:p>
+        </p:txBody>
+      </p:sp>
+      <p:cxnSp>
+        <p:nvCxnSpPr>
+          <p:cNvPr id="71" name="Straight Connector 70">
+            <a:extLst>
+              <a:ext uri="{FF2B5EF4-FFF2-40B4-BE49-F238E27FC236}">
+                <a16:creationId xmlns:a16="http://schemas.microsoft.com/office/drawing/2014/main" id="{44814A13-EACF-655D-BB09-95F4841E1F0A}"/>
+              </a:ext>
+            </a:extLst>
+          </p:cNvPr>
+          <p:cNvCxnSpPr>
+            <a:cxnSpLocks/>
+          </p:cNvCxnSpPr>
+          <p:nvPr/>
+        </p:nvCxnSpPr>
+        <p:spPr>
+          <a:xfrm>
+            <a:off x="1915246" y="4023301"/>
+            <a:ext cx="0" cy="1617208"/>
+          </a:xfrm>
+          <a:prstGeom prst="line">
+            <a:avLst/>
+          </a:prstGeom>
+          <a:ln>
+            <a:solidFill>
+              <a:schemeClr val="tx1"/>
+            </a:solidFill>
+          </a:ln>
+        </p:spPr>
+        <p:style>
+          <a:lnRef idx="1">
+            <a:schemeClr val="accent1"/>
+          </a:lnRef>
+          <a:fillRef idx="0">
+            <a:schemeClr val="accent1"/>
+          </a:fillRef>
+          <a:effectRef idx="0">
+            <a:schemeClr val="accent1"/>
+          </a:effectRef>
+          <a:fontRef idx="minor">
+            <a:schemeClr val="tx1"/>
+          </a:fontRef>
+        </p:style>
+      </p:cxnSp>
+      <p:sp>
+        <p:nvSpPr>
+          <p:cNvPr id="72" name="TextBox 71">
+            <a:extLst>
+              <a:ext uri="{FF2B5EF4-FFF2-40B4-BE49-F238E27FC236}">
+                <a16:creationId xmlns:a16="http://schemas.microsoft.com/office/drawing/2014/main" id="{B72548CA-ED40-1CF3-4688-FD097045EE20}"/>
+              </a:ext>
+            </a:extLst>
+          </p:cNvPr>
+          <p:cNvSpPr txBox="1"/>
+          <p:nvPr/>
+        </p:nvSpPr>
+        <p:spPr>
+          <a:xfrm>
+            <a:off x="1931760" y="1578135"/>
+            <a:ext cx="509896" cy="400110"/>
+          </a:xfrm>
+          <a:prstGeom prst="rect">
+            <a:avLst/>
+          </a:prstGeom>
+          <a:noFill/>
+        </p:spPr>
+        <p:txBody>
+          <a:bodyPr wrap="square" rtlCol="0">
+            <a:spAutoFit/>
+          </a:bodyPr>
+          <a:lstStyle/>
+          <a:p>
+            <a:pPr algn="ctr"/>
+            <a:r>
+              <a:rPr lang="en-US" sz="1000" dirty="0">
+                <a:solidFill>
+                  <a:schemeClr val="accent2">
+                    <a:lumMod val="60000"/>
+                    <a:lumOff val="40000"/>
+                  </a:schemeClr>
+                </a:solidFill>
+                <a:latin typeface="Arial" panose="020B0604020202020204" pitchFamily="34" charset="0"/>
+                <a:cs typeface="Arial" panose="020B0604020202020204" pitchFamily="34" charset="0"/>
+              </a:rPr>
+              <a:t>Avg range</a:t>
+            </a:r>
+          </a:p>
+        </p:txBody>
+      </p:sp>
+      <p:sp>
+        <p:nvSpPr>
+          <p:cNvPr id="73" name="TextBox 72">
+            <a:extLst>
+              <a:ext uri="{FF2B5EF4-FFF2-40B4-BE49-F238E27FC236}">
+                <a16:creationId xmlns:a16="http://schemas.microsoft.com/office/drawing/2014/main" id="{37D6785B-29A6-032D-446D-F918B033592D}"/>
+              </a:ext>
+            </a:extLst>
+          </p:cNvPr>
+          <p:cNvSpPr txBox="1"/>
+          <p:nvPr/>
+        </p:nvSpPr>
+        <p:spPr>
+          <a:xfrm>
+            <a:off x="3265407" y="1572853"/>
+            <a:ext cx="509896" cy="400110"/>
+          </a:xfrm>
+          <a:prstGeom prst="rect">
+            <a:avLst/>
+          </a:prstGeom>
+          <a:noFill/>
+        </p:spPr>
+        <p:txBody>
+          <a:bodyPr wrap="square" rtlCol="0">
+            <a:spAutoFit/>
+          </a:bodyPr>
+          <a:lstStyle/>
+          <a:p>
+            <a:pPr algn="ctr"/>
+            <a:r>
+              <a:rPr lang="en-US" sz="1000" dirty="0">
+                <a:solidFill>
+                  <a:schemeClr val="accent5">
+                    <a:lumMod val="75000"/>
+                  </a:schemeClr>
+                </a:solidFill>
+                <a:latin typeface="Arial" panose="020B0604020202020204" pitchFamily="34" charset="0"/>
+                <a:cs typeface="Arial" panose="020B0604020202020204" pitchFamily="34" charset="0"/>
+              </a:rPr>
+              <a:t>Avg range</a:t>
+            </a:r>
+          </a:p>
+        </p:txBody>
+      </p:sp>
+      <p:sp>
+        <p:nvSpPr>
+          <p:cNvPr id="74" name="TextBox 73">
+            <a:extLst>
+              <a:ext uri="{FF2B5EF4-FFF2-40B4-BE49-F238E27FC236}">
+                <a16:creationId xmlns:a16="http://schemas.microsoft.com/office/drawing/2014/main" id="{49EAE6FF-871E-8C60-E81D-910DCB714ABE}"/>
+              </a:ext>
+            </a:extLst>
+          </p:cNvPr>
+          <p:cNvSpPr txBox="1"/>
+          <p:nvPr/>
+        </p:nvSpPr>
+        <p:spPr>
+          <a:xfrm rot="16200000">
+            <a:off x="1279341" y="4593281"/>
+            <a:ext cx="994812" cy="276999"/>
+          </a:xfrm>
+          <a:prstGeom prst="rect">
+            <a:avLst/>
+          </a:prstGeom>
+          <a:noFill/>
+        </p:spPr>
+        <p:txBody>
+          <a:bodyPr wrap="square" rtlCol="0">
+            <a:spAutoFit/>
+          </a:bodyPr>
+          <a:lstStyle/>
+          <a:p>
+            <a:r>
+              <a:rPr lang="en-US" sz="1200" dirty="0">
+                <a:latin typeface="Arial" panose="020B0604020202020204" pitchFamily="34" charset="0"/>
+                <a:cs typeface="Arial" panose="020B0604020202020204" pitchFamily="34" charset="0"/>
+              </a:rPr>
+              <a:t>Avg. range</a:t>
+            </a:r>
+          </a:p>
+        </p:txBody>
+      </p:sp>
+      <p:sp>
+        <p:nvSpPr>
+          <p:cNvPr id="75" name="Oval 74">
+            <a:extLst>
+              <a:ext uri="{FF2B5EF4-FFF2-40B4-BE49-F238E27FC236}">
+                <a16:creationId xmlns:a16="http://schemas.microsoft.com/office/drawing/2014/main" id="{13199269-967E-1DE9-14AB-918508A42AC2}"/>
+              </a:ext>
+            </a:extLst>
+          </p:cNvPr>
+          <p:cNvSpPr/>
+          <p:nvPr/>
+        </p:nvSpPr>
+        <p:spPr>
+          <a:xfrm>
+            <a:off x="2109012" y="4312858"/>
+            <a:ext cx="65649" cy="65649"/>
+          </a:xfrm>
+          <a:prstGeom prst="ellipse">
+            <a:avLst/>
+          </a:prstGeom>
+          <a:solidFill>
+            <a:schemeClr val="accent2">
+              <a:lumMod val="60000"/>
+              <a:lumOff val="40000"/>
+            </a:schemeClr>
+          </a:solidFill>
+          <a:ln>
+            <a:solidFill>
+              <a:schemeClr val="accent2">
+                <a:lumMod val="60000"/>
+                <a:lumOff val="40000"/>
+              </a:schemeClr>
+            </a:solidFill>
+          </a:ln>
+        </p:spPr>
+        <p:style>
+          <a:lnRef idx="2">
+            <a:schemeClr val="accent1">
+              <a:shade val="50000"/>
+            </a:schemeClr>
+          </a:lnRef>
+          <a:fillRef idx="1">
+            <a:schemeClr val="accent1"/>
+          </a:fillRef>
+          <a:effectRef idx="0">
+            <a:schemeClr val="accent1"/>
+          </a:effectRef>
+          <a:fontRef idx="minor">
+            <a:schemeClr val="lt1"/>
+          </a:fontRef>
+        </p:style>
+        <p:txBody>
+          <a:bodyPr rtlCol="0" anchor="ctr"/>
+          <a:lstStyle/>
+          <a:p>
+            <a:pPr algn="ctr"/>
+            <a:endParaRPr lang="en-US"/>
+          </a:p>
+        </p:txBody>
+      </p:sp>
+      <p:sp>
+        <p:nvSpPr>
+          <p:cNvPr id="76" name="Oval 75">
+            <a:extLst>
+              <a:ext uri="{FF2B5EF4-FFF2-40B4-BE49-F238E27FC236}">
+                <a16:creationId xmlns:a16="http://schemas.microsoft.com/office/drawing/2014/main" id="{AF39A9E0-BB33-DFFB-4CC5-B01F7CD641A7}"/>
+              </a:ext>
+            </a:extLst>
+          </p:cNvPr>
+          <p:cNvSpPr/>
+          <p:nvPr/>
+        </p:nvSpPr>
+        <p:spPr>
+          <a:xfrm>
+            <a:off x="2472201" y="4354587"/>
+            <a:ext cx="65649" cy="65649"/>
+          </a:xfrm>
+          <a:prstGeom prst="ellipse">
+            <a:avLst/>
+          </a:prstGeom>
+          <a:solidFill>
+            <a:schemeClr val="tx1"/>
+          </a:solidFill>
+          <a:ln>
+            <a:noFill/>
+          </a:ln>
+        </p:spPr>
+        <p:style>
+          <a:lnRef idx="2">
+            <a:schemeClr val="accent1">
+              <a:shade val="50000"/>
+            </a:schemeClr>
+          </a:lnRef>
+          <a:fillRef idx="1">
+            <a:schemeClr val="accent1"/>
+          </a:fillRef>
+          <a:effectRef idx="0">
+            <a:schemeClr val="accent1"/>
+          </a:effectRef>
+          <a:fontRef idx="minor">
+            <a:schemeClr val="lt1"/>
+          </a:fontRef>
+        </p:style>
+        <p:txBody>
+          <a:bodyPr rtlCol="0" anchor="ctr"/>
+          <a:lstStyle/>
+          <a:p>
+            <a:pPr algn="ctr"/>
+            <a:endParaRPr lang="en-US"/>
+          </a:p>
+        </p:txBody>
+      </p:sp>
+      <p:sp>
+        <p:nvSpPr>
+          <p:cNvPr id="77" name="Oval 76">
+            <a:extLst>
+              <a:ext uri="{FF2B5EF4-FFF2-40B4-BE49-F238E27FC236}">
+                <a16:creationId xmlns:a16="http://schemas.microsoft.com/office/drawing/2014/main" id="{B84C1039-F394-5F47-365B-F489B0CF3709}"/>
+              </a:ext>
+            </a:extLst>
+          </p:cNvPr>
+          <p:cNvSpPr/>
+          <p:nvPr/>
+        </p:nvSpPr>
+        <p:spPr>
+          <a:xfrm>
+            <a:off x="2757051" y="4577732"/>
+            <a:ext cx="65649" cy="65649"/>
+          </a:xfrm>
+          <a:prstGeom prst="ellipse">
+            <a:avLst/>
+          </a:prstGeom>
+          <a:solidFill>
+            <a:schemeClr val="tx1"/>
+          </a:solidFill>
+          <a:ln>
+            <a:noFill/>
+          </a:ln>
+        </p:spPr>
+        <p:style>
+          <a:lnRef idx="2">
+            <a:schemeClr val="accent1">
+              <a:shade val="50000"/>
+            </a:schemeClr>
+          </a:lnRef>
+          <a:fillRef idx="1">
+            <a:schemeClr val="accent1"/>
+          </a:fillRef>
+          <a:effectRef idx="0">
+            <a:schemeClr val="accent1"/>
+          </a:effectRef>
+          <a:fontRef idx="minor">
+            <a:schemeClr val="lt1"/>
+          </a:fontRef>
+        </p:style>
+        <p:txBody>
+          <a:bodyPr rtlCol="0" anchor="ctr"/>
+          <a:lstStyle/>
+          <a:p>
+            <a:pPr algn="ctr"/>
+            <a:endParaRPr lang="en-US"/>
+          </a:p>
+        </p:txBody>
+      </p:sp>
+      <p:sp>
+        <p:nvSpPr>
+          <p:cNvPr id="78" name="Oval 77">
+            <a:extLst>
+              <a:ext uri="{FF2B5EF4-FFF2-40B4-BE49-F238E27FC236}">
+                <a16:creationId xmlns:a16="http://schemas.microsoft.com/office/drawing/2014/main" id="{281951D6-7242-022A-EF5C-C8A0B029824D}"/>
+              </a:ext>
+            </a:extLst>
+          </p:cNvPr>
+          <p:cNvSpPr/>
+          <p:nvPr/>
+        </p:nvSpPr>
+        <p:spPr>
+          <a:xfrm>
+            <a:off x="3034420" y="4762672"/>
+            <a:ext cx="65649" cy="65649"/>
+          </a:xfrm>
+          <a:prstGeom prst="ellipse">
+            <a:avLst/>
+          </a:prstGeom>
+          <a:solidFill>
+            <a:schemeClr val="tx1"/>
+          </a:solidFill>
+          <a:ln>
+            <a:noFill/>
+          </a:ln>
+        </p:spPr>
+        <p:style>
+          <a:lnRef idx="2">
+            <a:schemeClr val="accent1">
+              <a:shade val="50000"/>
+            </a:schemeClr>
+          </a:lnRef>
+          <a:fillRef idx="1">
+            <a:schemeClr val="accent1"/>
+          </a:fillRef>
+          <a:effectRef idx="0">
+            <a:schemeClr val="accent1"/>
+          </a:effectRef>
+          <a:fontRef idx="minor">
+            <a:schemeClr val="lt1"/>
+          </a:fontRef>
+        </p:style>
+        <p:txBody>
+          <a:bodyPr rtlCol="0" anchor="ctr"/>
+          <a:lstStyle/>
+          <a:p>
+            <a:pPr algn="ctr"/>
+            <a:endParaRPr lang="en-US"/>
+          </a:p>
+        </p:txBody>
+      </p:sp>
+      <p:sp>
+        <p:nvSpPr>
+          <p:cNvPr id="79" name="Oval 78">
+            <a:extLst>
+              <a:ext uri="{FF2B5EF4-FFF2-40B4-BE49-F238E27FC236}">
+                <a16:creationId xmlns:a16="http://schemas.microsoft.com/office/drawing/2014/main" id="{E304E9A4-B465-D66D-33FB-EF5D41C04F2F}"/>
+              </a:ext>
+            </a:extLst>
+          </p:cNvPr>
+          <p:cNvSpPr/>
+          <p:nvPr/>
+        </p:nvSpPr>
+        <p:spPr>
+          <a:xfrm>
+            <a:off x="3372932" y="4888701"/>
+            <a:ext cx="65649" cy="65649"/>
+          </a:xfrm>
+          <a:prstGeom prst="ellipse">
+            <a:avLst/>
+          </a:prstGeom>
+          <a:solidFill>
+            <a:schemeClr val="tx1"/>
+          </a:solidFill>
+          <a:ln>
+            <a:noFill/>
+          </a:ln>
+        </p:spPr>
+        <p:style>
+          <a:lnRef idx="2">
+            <a:schemeClr val="accent1">
+              <a:shade val="50000"/>
+            </a:schemeClr>
+          </a:lnRef>
+          <a:fillRef idx="1">
+            <a:schemeClr val="accent1"/>
+          </a:fillRef>
+          <a:effectRef idx="0">
+            <a:schemeClr val="accent1"/>
+          </a:effectRef>
+          <a:fontRef idx="minor">
+            <a:schemeClr val="lt1"/>
+          </a:fontRef>
+        </p:style>
+        <p:txBody>
+          <a:bodyPr rtlCol="0" anchor="ctr"/>
+          <a:lstStyle/>
+          <a:p>
+            <a:pPr algn="ctr"/>
+            <a:endParaRPr lang="en-US"/>
+          </a:p>
+        </p:txBody>
+      </p:sp>
+      <p:sp>
+        <p:nvSpPr>
+          <p:cNvPr id="80" name="Oval 79">
+            <a:extLst>
+              <a:ext uri="{FF2B5EF4-FFF2-40B4-BE49-F238E27FC236}">
+                <a16:creationId xmlns:a16="http://schemas.microsoft.com/office/drawing/2014/main" id="{7E0967B4-3496-F3D3-1D91-7768F120D117}"/>
+              </a:ext>
+            </a:extLst>
+          </p:cNvPr>
+          <p:cNvSpPr/>
+          <p:nvPr/>
+        </p:nvSpPr>
+        <p:spPr>
+          <a:xfrm>
+            <a:off x="3709654" y="5119871"/>
+            <a:ext cx="65649" cy="65649"/>
+          </a:xfrm>
+          <a:prstGeom prst="ellipse">
+            <a:avLst/>
+          </a:prstGeom>
+          <a:solidFill>
+            <a:schemeClr val="accent5">
+              <a:lumMod val="75000"/>
+            </a:schemeClr>
+          </a:solidFill>
+          <a:ln>
+            <a:solidFill>
+              <a:schemeClr val="accent5">
+                <a:lumMod val="75000"/>
+              </a:schemeClr>
+            </a:solidFill>
+          </a:ln>
+        </p:spPr>
+        <p:style>
+          <a:lnRef idx="2">
+            <a:schemeClr val="accent1">
+              <a:shade val="50000"/>
+            </a:schemeClr>
+          </a:lnRef>
+          <a:fillRef idx="1">
+            <a:schemeClr val="accent1"/>
+          </a:fillRef>
+          <a:effectRef idx="0">
+            <a:schemeClr val="accent1"/>
+          </a:effectRef>
+          <a:fontRef idx="minor">
+            <a:schemeClr val="lt1"/>
+          </a:fontRef>
+        </p:style>
+        <p:txBody>
+          <a:bodyPr rtlCol="0" anchor="ctr"/>
+          <a:lstStyle/>
+          <a:p>
+            <a:pPr algn="ctr"/>
+            <a:endParaRPr lang="en-US"/>
+          </a:p>
+        </p:txBody>
+      </p:sp>
+      <p:cxnSp>
+        <p:nvCxnSpPr>
+          <p:cNvPr id="83" name="Straight Connector 82">
+            <a:extLst>
+              <a:ext uri="{FF2B5EF4-FFF2-40B4-BE49-F238E27FC236}">
+                <a16:creationId xmlns:a16="http://schemas.microsoft.com/office/drawing/2014/main" id="{89DEF72B-BFA9-313E-9AC7-0D8E993C10F8}"/>
+              </a:ext>
+            </a:extLst>
+          </p:cNvPr>
+          <p:cNvCxnSpPr/>
+          <p:nvPr/>
+        </p:nvCxnSpPr>
+        <p:spPr>
+          <a:xfrm>
+            <a:off x="2113279" y="4256411"/>
+            <a:ext cx="1763151" cy="885497"/>
+          </a:xfrm>
+          <a:prstGeom prst="line">
+            <a:avLst/>
+          </a:prstGeom>
+          <a:ln>
+            <a:solidFill>
+              <a:schemeClr val="bg2">
+                <a:lumMod val="50000"/>
+              </a:schemeClr>
+            </a:solidFill>
+          </a:ln>
+        </p:spPr>
+        <p:style>
+          <a:lnRef idx="1">
+            <a:schemeClr val="accent1"/>
+          </a:lnRef>
+          <a:fillRef idx="0">
+            <a:schemeClr val="accent1"/>
+          </a:fillRef>
+          <a:effectRef idx="0">
+            <a:schemeClr val="accent1"/>
+          </a:effectRef>
+          <a:fontRef idx="minor">
+            <a:schemeClr val="tx1"/>
+          </a:fontRef>
+        </p:style>
+      </p:cxnSp>
+      <p:sp>
+        <p:nvSpPr>
+          <p:cNvPr id="85" name="TextBox 84">
+            <a:extLst>
+              <a:ext uri="{FF2B5EF4-FFF2-40B4-BE49-F238E27FC236}">
+                <a16:creationId xmlns:a16="http://schemas.microsoft.com/office/drawing/2014/main" id="{FF9F6818-E70F-EF6C-59C9-CB5FFBF4D5A8}"/>
+              </a:ext>
+            </a:extLst>
+          </p:cNvPr>
+          <p:cNvSpPr txBox="1"/>
+          <p:nvPr/>
+        </p:nvSpPr>
+        <p:spPr>
+          <a:xfrm>
+            <a:off x="1510125" y="1633496"/>
+            <a:ext cx="436338" cy="338554"/>
+          </a:xfrm>
+          <a:prstGeom prst="rect">
+            <a:avLst/>
+          </a:prstGeom>
+          <a:noFill/>
+        </p:spPr>
+        <p:txBody>
+          <a:bodyPr wrap="none" rtlCol="0">
+            <a:spAutoFit/>
+          </a:bodyPr>
+          <a:lstStyle/>
+          <a:p>
+            <a:r>
+              <a:rPr lang="en-US" sz="1600" dirty="0">
+                <a:latin typeface="Arial" panose="020B0604020202020204" pitchFamily="34" charset="0"/>
+                <a:cs typeface="Arial" panose="020B0604020202020204" pitchFamily="34" charset="0"/>
+              </a:rPr>
+              <a:t>(1)</a:t>
+            </a:r>
+          </a:p>
+        </p:txBody>
+      </p:sp>
+      <p:sp>
+        <p:nvSpPr>
+          <p:cNvPr id="86" name="TextBox 85">
+            <a:extLst>
+              <a:ext uri="{FF2B5EF4-FFF2-40B4-BE49-F238E27FC236}">
+                <a16:creationId xmlns:a16="http://schemas.microsoft.com/office/drawing/2014/main" id="{72101721-596E-9B2D-1BA8-5598A0C9135B}"/>
+              </a:ext>
+            </a:extLst>
+          </p:cNvPr>
+          <p:cNvSpPr txBox="1"/>
+          <p:nvPr/>
+        </p:nvSpPr>
+        <p:spPr>
+          <a:xfrm>
+            <a:off x="1543028" y="3791345"/>
+            <a:ext cx="436338" cy="338554"/>
+          </a:xfrm>
+          <a:prstGeom prst="rect">
+            <a:avLst/>
+          </a:prstGeom>
+          <a:noFill/>
+        </p:spPr>
+        <p:txBody>
+          <a:bodyPr wrap="none" rtlCol="0">
+            <a:spAutoFit/>
+          </a:bodyPr>
+          <a:lstStyle/>
+          <a:p>
+            <a:r>
+              <a:rPr lang="en-US" sz="1600" dirty="0">
+                <a:latin typeface="Arial" panose="020B0604020202020204" pitchFamily="34" charset="0"/>
+                <a:cs typeface="Arial" panose="020B0604020202020204" pitchFamily="34" charset="0"/>
+              </a:rPr>
+              <a:t>(2)</a:t>
+            </a:r>
+          </a:p>
+        </p:txBody>
+      </p:sp>
+      <p:sp>
+        <p:nvSpPr>
+          <p:cNvPr id="87" name="TextBox 86">
+            <a:extLst>
+              <a:ext uri="{FF2B5EF4-FFF2-40B4-BE49-F238E27FC236}">
+                <a16:creationId xmlns:a16="http://schemas.microsoft.com/office/drawing/2014/main" id="{3957793C-1E70-C9F5-6FDA-31337AE489D7}"/>
+              </a:ext>
+            </a:extLst>
+          </p:cNvPr>
+          <p:cNvSpPr txBox="1"/>
+          <p:nvPr/>
+        </p:nvSpPr>
+        <p:spPr>
+          <a:xfrm>
+            <a:off x="4069922" y="3762527"/>
+            <a:ext cx="436338" cy="338554"/>
+          </a:xfrm>
+          <a:prstGeom prst="rect">
+            <a:avLst/>
+          </a:prstGeom>
+          <a:noFill/>
+        </p:spPr>
+        <p:txBody>
+          <a:bodyPr wrap="none" rtlCol="0">
+            <a:spAutoFit/>
+          </a:bodyPr>
+          <a:lstStyle/>
+          <a:p>
+            <a:r>
+              <a:rPr lang="en-US" sz="1600" dirty="0">
+                <a:latin typeface="Arial" panose="020B0604020202020204" pitchFamily="34" charset="0"/>
+                <a:cs typeface="Arial" panose="020B0604020202020204" pitchFamily="34" charset="0"/>
+              </a:rPr>
+              <a:t>(3)</a:t>
+            </a:r>
+          </a:p>
+        </p:txBody>
+      </p:sp>
+      <p:cxnSp>
+        <p:nvCxnSpPr>
+          <p:cNvPr id="88" name="Straight Connector 87">
+            <a:extLst>
+              <a:ext uri="{FF2B5EF4-FFF2-40B4-BE49-F238E27FC236}">
+                <a16:creationId xmlns:a16="http://schemas.microsoft.com/office/drawing/2014/main" id="{9EDBA52A-F2B0-C12B-DA16-4C0F7E18BB69}"/>
+              </a:ext>
+            </a:extLst>
+          </p:cNvPr>
+          <p:cNvCxnSpPr/>
+          <p:nvPr/>
+        </p:nvCxnSpPr>
+        <p:spPr>
+          <a:xfrm flipH="1">
+            <a:off x="4456427" y="5635078"/>
+            <a:ext cx="2039582" cy="2983"/>
+          </a:xfrm>
+          <a:prstGeom prst="line">
+            <a:avLst/>
+          </a:prstGeom>
+          <a:ln>
+            <a:solidFill>
+              <a:schemeClr val="tx1"/>
+            </a:solidFill>
+          </a:ln>
+        </p:spPr>
+        <p:style>
+          <a:lnRef idx="1">
+            <a:schemeClr val="accent1"/>
+          </a:lnRef>
+          <a:fillRef idx="0">
+            <a:schemeClr val="accent1"/>
+          </a:fillRef>
+          <a:effectRef idx="0">
+            <a:schemeClr val="accent1"/>
+          </a:effectRef>
+          <a:fontRef idx="minor">
+            <a:schemeClr val="tx1"/>
+          </a:fontRef>
+        </p:style>
+      </p:cxnSp>
+      <p:cxnSp>
+        <p:nvCxnSpPr>
+          <p:cNvPr id="89" name="Straight Connector 88">
+            <a:extLst>
+              <a:ext uri="{FF2B5EF4-FFF2-40B4-BE49-F238E27FC236}">
+                <a16:creationId xmlns:a16="http://schemas.microsoft.com/office/drawing/2014/main" id="{51DCF467-FF8C-4DB5-E3F0-4CE8F537BA09}"/>
+              </a:ext>
+            </a:extLst>
+          </p:cNvPr>
+          <p:cNvCxnSpPr>
+            <a:cxnSpLocks/>
+          </p:cNvCxnSpPr>
+          <p:nvPr/>
+        </p:nvCxnSpPr>
+        <p:spPr>
+          <a:xfrm>
+            <a:off x="4456427" y="4017870"/>
+            <a:ext cx="0" cy="1617208"/>
+          </a:xfrm>
+          <a:prstGeom prst="line">
+            <a:avLst/>
+          </a:prstGeom>
+          <a:ln>
+            <a:solidFill>
+              <a:schemeClr val="tx1"/>
+            </a:solidFill>
+          </a:ln>
+        </p:spPr>
+        <p:style>
+          <a:lnRef idx="1">
+            <a:schemeClr val="accent1"/>
+          </a:lnRef>
+          <a:fillRef idx="0">
+            <a:schemeClr val="accent1"/>
+          </a:fillRef>
+          <a:effectRef idx="0">
+            <a:schemeClr val="accent1"/>
+          </a:effectRef>
+          <a:fontRef idx="minor">
+            <a:schemeClr val="tx1"/>
+          </a:fontRef>
+        </p:style>
+      </p:cxnSp>
+      <p:sp>
+        <p:nvSpPr>
+          <p:cNvPr id="90" name="Rectangle 89">
+            <a:extLst>
+              <a:ext uri="{FF2B5EF4-FFF2-40B4-BE49-F238E27FC236}">
+                <a16:creationId xmlns:a16="http://schemas.microsoft.com/office/drawing/2014/main" id="{03B6C70F-A34B-E98F-3975-A65DED6EDF98}"/>
+              </a:ext>
+            </a:extLst>
+          </p:cNvPr>
+          <p:cNvSpPr/>
+          <p:nvPr/>
+        </p:nvSpPr>
+        <p:spPr>
+          <a:xfrm>
+            <a:off x="4706679" y="5401340"/>
+            <a:ext cx="276447" cy="233738"/>
+          </a:xfrm>
+          <a:prstGeom prst="rect">
+            <a:avLst/>
+          </a:prstGeom>
+        </p:spPr>
+        <p:style>
+          <a:lnRef idx="2">
+            <a:schemeClr val="accent1">
+              <a:shade val="50000"/>
+            </a:schemeClr>
+          </a:lnRef>
+          <a:fillRef idx="1">
+            <a:schemeClr val="accent1"/>
+          </a:fillRef>
+          <a:effectRef idx="0">
+            <a:schemeClr val="accent1"/>
+          </a:effectRef>
+          <a:fontRef idx="minor">
+            <a:schemeClr val="lt1"/>
+          </a:fontRef>
+        </p:style>
+        <p:txBody>
+          <a:bodyPr rtlCol="0" anchor="ctr"/>
+          <a:lstStyle/>
+          <a:p>
+            <a:pPr algn="ctr"/>
+            <a:endParaRPr lang="en-US"/>
+          </a:p>
+        </p:txBody>
+      </p:sp>
+      <p:sp>
+        <p:nvSpPr>
+          <p:cNvPr id="91" name="Rectangle 90">
+            <a:extLst>
+              <a:ext uri="{FF2B5EF4-FFF2-40B4-BE49-F238E27FC236}">
+                <a16:creationId xmlns:a16="http://schemas.microsoft.com/office/drawing/2014/main" id="{DEA5B343-2B7A-9AFD-E4ED-82DFCE986B5C}"/>
+              </a:ext>
+            </a:extLst>
+          </p:cNvPr>
+          <p:cNvSpPr/>
+          <p:nvPr/>
+        </p:nvSpPr>
+        <p:spPr>
+          <a:xfrm>
+            <a:off x="4983126" y="4954350"/>
+            <a:ext cx="276447" cy="677745"/>
+          </a:xfrm>
+          <a:prstGeom prst="rect">
+            <a:avLst/>
+          </a:prstGeom>
+        </p:spPr>
+        <p:style>
+          <a:lnRef idx="2">
+            <a:schemeClr val="accent1">
+              <a:shade val="50000"/>
+            </a:schemeClr>
+          </a:lnRef>
+          <a:fillRef idx="1">
+            <a:schemeClr val="accent1"/>
+          </a:fillRef>
+          <a:effectRef idx="0">
+            <a:schemeClr val="accent1"/>
+          </a:effectRef>
+          <a:fontRef idx="minor">
+            <a:schemeClr val="lt1"/>
+          </a:fontRef>
+        </p:style>
+        <p:txBody>
+          <a:bodyPr rtlCol="0" anchor="ctr"/>
+          <a:lstStyle/>
+          <a:p>
+            <a:pPr algn="ctr"/>
+            <a:endParaRPr lang="en-US"/>
+          </a:p>
+        </p:txBody>
+      </p:sp>
+      <p:sp>
+        <p:nvSpPr>
+          <p:cNvPr id="92" name="Rectangle 91">
+            <a:extLst>
+              <a:ext uri="{FF2B5EF4-FFF2-40B4-BE49-F238E27FC236}">
+                <a16:creationId xmlns:a16="http://schemas.microsoft.com/office/drawing/2014/main" id="{BFE228A1-D2E0-13B6-FC70-F49E8FC2E385}"/>
+              </a:ext>
+            </a:extLst>
+          </p:cNvPr>
+          <p:cNvSpPr/>
+          <p:nvPr/>
+        </p:nvSpPr>
+        <p:spPr>
+          <a:xfrm>
+            <a:off x="5259573" y="4643381"/>
+            <a:ext cx="276447" cy="988714"/>
+          </a:xfrm>
+          <a:prstGeom prst="rect">
+            <a:avLst/>
+          </a:prstGeom>
+        </p:spPr>
+        <p:style>
+          <a:lnRef idx="2">
+            <a:schemeClr val="accent1">
+              <a:shade val="50000"/>
+            </a:schemeClr>
+          </a:lnRef>
+          <a:fillRef idx="1">
+            <a:schemeClr val="accent1"/>
+          </a:fillRef>
+          <a:effectRef idx="0">
+            <a:schemeClr val="accent1"/>
+          </a:effectRef>
+          <a:fontRef idx="minor">
+            <a:schemeClr val="lt1"/>
+          </a:fontRef>
+        </p:style>
+        <p:txBody>
+          <a:bodyPr rtlCol="0" anchor="ctr"/>
+          <a:lstStyle/>
+          <a:p>
+            <a:pPr algn="ctr"/>
+            <a:endParaRPr lang="en-US"/>
+          </a:p>
+        </p:txBody>
+      </p:sp>
+      <p:sp>
+        <p:nvSpPr>
+          <p:cNvPr id="93" name="Rectangle 92">
+            <a:extLst>
+              <a:ext uri="{FF2B5EF4-FFF2-40B4-BE49-F238E27FC236}">
+                <a16:creationId xmlns:a16="http://schemas.microsoft.com/office/drawing/2014/main" id="{A354F359-34E2-F1DD-F508-0649A5CBAA47}"/>
+              </a:ext>
+            </a:extLst>
+          </p:cNvPr>
+          <p:cNvSpPr/>
+          <p:nvPr/>
+        </p:nvSpPr>
+        <p:spPr>
+          <a:xfrm>
+            <a:off x="5536020" y="5065941"/>
+            <a:ext cx="276447" cy="566154"/>
+          </a:xfrm>
+          <a:prstGeom prst="rect">
+            <a:avLst/>
+          </a:prstGeom>
+        </p:spPr>
+        <p:style>
+          <a:lnRef idx="2">
+            <a:schemeClr val="accent1">
+              <a:shade val="50000"/>
+            </a:schemeClr>
+          </a:lnRef>
+          <a:fillRef idx="1">
+            <a:schemeClr val="accent1"/>
+          </a:fillRef>
+          <a:effectRef idx="0">
+            <a:schemeClr val="accent1"/>
+          </a:effectRef>
+          <a:fontRef idx="minor">
+            <a:schemeClr val="lt1"/>
+          </a:fontRef>
+        </p:style>
+        <p:txBody>
+          <a:bodyPr rtlCol="0" anchor="ctr"/>
+          <a:lstStyle/>
+          <a:p>
+            <a:pPr algn="ctr"/>
+            <a:endParaRPr lang="en-US" b="1" dirty="0"/>
+          </a:p>
+        </p:txBody>
+      </p:sp>
+      <p:sp>
+        <p:nvSpPr>
+          <p:cNvPr id="94" name="Rectangle 93">
+            <a:extLst>
+              <a:ext uri="{FF2B5EF4-FFF2-40B4-BE49-F238E27FC236}">
+                <a16:creationId xmlns:a16="http://schemas.microsoft.com/office/drawing/2014/main" id="{9F8104A8-20AC-F699-1884-FCF4D9E55A2A}"/>
+              </a:ext>
+            </a:extLst>
+          </p:cNvPr>
+          <p:cNvSpPr/>
+          <p:nvPr/>
+        </p:nvSpPr>
+        <p:spPr>
+          <a:xfrm>
+            <a:off x="5812467" y="5318140"/>
+            <a:ext cx="276447" cy="312120"/>
+          </a:xfrm>
+          <a:prstGeom prst="rect">
+            <a:avLst/>
+          </a:prstGeom>
+        </p:spPr>
+        <p:style>
+          <a:lnRef idx="2">
+            <a:schemeClr val="accent1">
+              <a:shade val="50000"/>
+            </a:schemeClr>
+          </a:lnRef>
+          <a:fillRef idx="1">
+            <a:schemeClr val="accent1"/>
+          </a:fillRef>
+          <a:effectRef idx="0">
+            <a:schemeClr val="accent1"/>
+          </a:effectRef>
+          <a:fontRef idx="minor">
+            <a:schemeClr val="lt1"/>
+          </a:fontRef>
+        </p:style>
+        <p:txBody>
+          <a:bodyPr rtlCol="0" anchor="ctr"/>
+          <a:lstStyle/>
+          <a:p>
+            <a:pPr algn="ctr"/>
+            <a:endParaRPr lang="en-US"/>
+          </a:p>
+        </p:txBody>
+      </p:sp>
+      <p:sp>
+        <p:nvSpPr>
+          <p:cNvPr id="95" name="TextBox 94">
+            <a:extLst>
+              <a:ext uri="{FF2B5EF4-FFF2-40B4-BE49-F238E27FC236}">
+                <a16:creationId xmlns:a16="http://schemas.microsoft.com/office/drawing/2014/main" id="{5C6CD754-E396-824D-90D4-B1B5FC3A948C}"/>
+              </a:ext>
+            </a:extLst>
+          </p:cNvPr>
+          <p:cNvSpPr txBox="1"/>
+          <p:nvPr/>
+        </p:nvSpPr>
+        <p:spPr>
+          <a:xfrm>
+            <a:off x="4777563" y="5643492"/>
+            <a:ext cx="1382234" cy="276999"/>
+          </a:xfrm>
+          <a:prstGeom prst="rect">
+            <a:avLst/>
+          </a:prstGeom>
+          <a:noFill/>
+        </p:spPr>
+        <p:txBody>
+          <a:bodyPr wrap="square" rtlCol="0">
+            <a:spAutoFit/>
+          </a:bodyPr>
+          <a:lstStyle/>
+          <a:p>
+            <a:r>
+              <a:rPr lang="en-US" sz="1200" dirty="0">
+                <a:latin typeface="Arial" panose="020B0604020202020204" pitchFamily="34" charset="0"/>
+                <a:cs typeface="Arial" panose="020B0604020202020204" pitchFamily="34" charset="0"/>
+              </a:rPr>
+              <a:t>Slope estimates</a:t>
+            </a:r>
+          </a:p>
+        </p:txBody>
+      </p:sp>
+      <p:cxnSp>
+        <p:nvCxnSpPr>
+          <p:cNvPr id="97" name="Straight Arrow Connector 96">
+            <a:extLst>
+              <a:ext uri="{FF2B5EF4-FFF2-40B4-BE49-F238E27FC236}">
+                <a16:creationId xmlns:a16="http://schemas.microsoft.com/office/drawing/2014/main" id="{8C61DA18-F922-ABF4-B82D-CA8C33D76AB3}"/>
+              </a:ext>
+            </a:extLst>
+          </p:cNvPr>
+          <p:cNvCxnSpPr/>
+          <p:nvPr/>
+        </p:nvCxnSpPr>
+        <p:spPr>
+          <a:xfrm>
+            <a:off x="2141837" y="3945750"/>
+            <a:ext cx="0" cy="310661"/>
+          </a:xfrm>
+          <a:prstGeom prst="straightConnector1">
+            <a:avLst/>
+          </a:prstGeom>
+          <a:ln>
+            <a:solidFill>
+              <a:schemeClr val="accent2">
+                <a:lumMod val="60000"/>
+                <a:lumOff val="40000"/>
+              </a:schemeClr>
+            </a:solidFill>
+            <a:tailEnd type="triangle"/>
+          </a:ln>
+        </p:spPr>
+        <p:style>
+          <a:lnRef idx="1">
+            <a:schemeClr val="accent1"/>
+          </a:lnRef>
+          <a:fillRef idx="0">
+            <a:schemeClr val="accent1"/>
+          </a:fillRef>
+          <a:effectRef idx="0">
+            <a:schemeClr val="accent1"/>
+          </a:effectRef>
+          <a:fontRef idx="minor">
+            <a:schemeClr val="tx1"/>
+          </a:fontRef>
+        </p:style>
+      </p:cxnSp>
+      <p:cxnSp>
+        <p:nvCxnSpPr>
+          <p:cNvPr id="98" name="Straight Arrow Connector 97">
+            <a:extLst>
+              <a:ext uri="{FF2B5EF4-FFF2-40B4-BE49-F238E27FC236}">
+                <a16:creationId xmlns:a16="http://schemas.microsoft.com/office/drawing/2014/main" id="{D414715C-ECA3-27B7-1047-15AA8947BA31}"/>
+              </a:ext>
+            </a:extLst>
+          </p:cNvPr>
+          <p:cNvCxnSpPr>
+            <a:cxnSpLocks/>
+          </p:cNvCxnSpPr>
+          <p:nvPr/>
+        </p:nvCxnSpPr>
+        <p:spPr>
+          <a:xfrm>
+            <a:off x="3598498" y="3945750"/>
+            <a:ext cx="176805" cy="1065729"/>
+          </a:xfrm>
+          <a:prstGeom prst="straightConnector1">
+            <a:avLst/>
+          </a:prstGeom>
+          <a:ln>
+            <a:solidFill>
+              <a:schemeClr val="accent5">
+                <a:lumMod val="75000"/>
+              </a:schemeClr>
+            </a:solidFill>
+            <a:tailEnd type="triangle"/>
+          </a:ln>
+        </p:spPr>
+        <p:style>
+          <a:lnRef idx="1">
+            <a:schemeClr val="accent1"/>
+          </a:lnRef>
+          <a:fillRef idx="0">
+            <a:schemeClr val="accent1"/>
+          </a:fillRef>
+          <a:effectRef idx="0">
+            <a:schemeClr val="accent1"/>
+          </a:effectRef>
+          <a:fontRef idx="minor">
+            <a:schemeClr val="tx1"/>
+          </a:fontRef>
+        </p:style>
+      </p:cxnSp>
+      <p:cxnSp>
+        <p:nvCxnSpPr>
+          <p:cNvPr id="101" name="Straight Arrow Connector 100">
+            <a:extLst>
+              <a:ext uri="{FF2B5EF4-FFF2-40B4-BE49-F238E27FC236}">
+                <a16:creationId xmlns:a16="http://schemas.microsoft.com/office/drawing/2014/main" id="{134FA500-1BF8-4F1A-9A8B-E81463B454EB}"/>
+              </a:ext>
+            </a:extLst>
+          </p:cNvPr>
+          <p:cNvCxnSpPr/>
+          <p:nvPr/>
+        </p:nvCxnSpPr>
+        <p:spPr>
+          <a:xfrm>
+            <a:off x="2994854" y="4678618"/>
+            <a:ext cx="1948706" cy="368098"/>
+          </a:xfrm>
+          <a:prstGeom prst="straightConnector1">
+            <a:avLst/>
+          </a:prstGeom>
+          <a:ln>
+            <a:solidFill>
+              <a:schemeClr val="bg2">
+                <a:lumMod val="50000"/>
+              </a:schemeClr>
+            </a:solidFill>
+            <a:tailEnd type="triangle"/>
+          </a:ln>
+        </p:spPr>
+        <p:style>
+          <a:lnRef idx="1">
+            <a:schemeClr val="accent1"/>
+          </a:lnRef>
+          <a:fillRef idx="0">
+            <a:schemeClr val="accent1"/>
+          </a:fillRef>
+          <a:effectRef idx="0">
+            <a:schemeClr val="accent1"/>
+          </a:effectRef>
+          <a:fontRef idx="minor">
+            <a:schemeClr val="tx1"/>
+          </a:fontRef>
+        </p:style>
+      </p:cxnSp>
+    </p:spTree>
+    <p:extLst>
+      <p:ext uri="{BB962C8B-B14F-4D97-AF65-F5344CB8AC3E}">
+        <p14:creationId xmlns:p14="http://schemas.microsoft.com/office/powerpoint/2010/main" val="2289549604"/>
+      </p:ext>
+    </p:extLst>
+  </p:cSld>
+  <p:clrMapOvr>
+    <a:masterClrMapping/>
+  </p:clrMapOvr>
+</p:sld>
+</file>
+
 <file path=ppt/slides/slide2.xml><?xml version="1.0" encoding="utf-8"?>
 <p:sld xmlns:a="http://schemas.openxmlformats.org/drawingml/2006/main" xmlns:r="http://schemas.openxmlformats.org/officeDocument/2006/relationships" xmlns:p="http://schemas.openxmlformats.org/presentationml/2006/main">
   <p:cSld>
@@ -10509,150 +12808,6 @@
       </p:grpSpPr>
       <p:sp>
         <p:nvSpPr>
-          <p:cNvPr id="66" name="Flowchart: Connector 65"/>
-          <p:cNvSpPr/>
-          <p:nvPr/>
-        </p:nvSpPr>
-        <p:spPr>
-          <a:xfrm>
-            <a:off x="5255847" y="1845535"/>
-            <a:ext cx="45719" cy="45719"/>
-          </a:xfrm>
-          <a:prstGeom prst="flowChartConnector">
-            <a:avLst/>
-          </a:prstGeom>
-          <a:solidFill>
-            <a:schemeClr val="tx1"/>
-          </a:solidFill>
-          <a:ln>
-            <a:solidFill>
-              <a:schemeClr val="tx1"/>
-            </a:solidFill>
-          </a:ln>
-        </p:spPr>
-        <p:style>
-          <a:lnRef idx="2">
-            <a:schemeClr val="accent1">
-              <a:shade val="50000"/>
-            </a:schemeClr>
-          </a:lnRef>
-          <a:fillRef idx="1">
-            <a:schemeClr val="accent1"/>
-          </a:fillRef>
-          <a:effectRef idx="0">
-            <a:schemeClr val="accent1"/>
-          </a:effectRef>
-          <a:fontRef idx="minor">
-            <a:schemeClr val="lt1"/>
-          </a:fontRef>
-        </p:style>
-        <p:txBody>
-          <a:bodyPr rtlCol="0" anchor="ctr"/>
-          <a:lstStyle/>
-          <a:p>
-            <a:pPr algn="ctr"/>
-            <a:endParaRPr lang="en-US"/>
-          </a:p>
-        </p:txBody>
-      </p:sp>
-      <p:sp>
-        <p:nvSpPr>
-          <p:cNvPr id="67" name="Flowchart: Connector 66"/>
-          <p:cNvSpPr/>
-          <p:nvPr/>
-        </p:nvSpPr>
-        <p:spPr>
-          <a:xfrm>
-            <a:off x="3539554" y="1853878"/>
-            <a:ext cx="45719" cy="45719"/>
-          </a:xfrm>
-          <a:prstGeom prst="flowChartConnector">
-            <a:avLst/>
-          </a:prstGeom>
-          <a:solidFill>
-            <a:schemeClr val="tx1"/>
-          </a:solidFill>
-          <a:ln>
-            <a:solidFill>
-              <a:schemeClr val="tx1"/>
-            </a:solidFill>
-          </a:ln>
-        </p:spPr>
-        <p:style>
-          <a:lnRef idx="2">
-            <a:schemeClr val="accent1">
-              <a:shade val="50000"/>
-            </a:schemeClr>
-          </a:lnRef>
-          <a:fillRef idx="1">
-            <a:schemeClr val="accent1"/>
-          </a:fillRef>
-          <a:effectRef idx="0">
-            <a:schemeClr val="accent1"/>
-          </a:effectRef>
-          <a:fontRef idx="minor">
-            <a:schemeClr val="lt1"/>
-          </a:fontRef>
-        </p:style>
-        <p:txBody>
-          <a:bodyPr rtlCol="0" anchor="ctr"/>
-          <a:lstStyle/>
-          <a:p>
-            <a:pPr algn="ctr"/>
-            <a:endParaRPr lang="en-US"/>
-          </a:p>
-        </p:txBody>
-      </p:sp>
-      <p:sp>
-        <p:nvSpPr>
-          <p:cNvPr id="68" name="Flowchart: Connector 67"/>
-          <p:cNvSpPr/>
-          <p:nvPr/>
-        </p:nvSpPr>
-        <p:spPr>
-          <a:xfrm>
-            <a:off x="5178059" y="676302"/>
-            <a:ext cx="45719" cy="45719"/>
-          </a:xfrm>
-          <a:prstGeom prst="flowChartConnector">
-            <a:avLst/>
-          </a:prstGeom>
-          <a:solidFill>
-            <a:schemeClr val="tx1"/>
-          </a:solidFill>
-          <a:ln>
-            <a:solidFill>
-              <a:schemeClr val="tx1"/>
-            </a:solidFill>
-          </a:ln>
-        </p:spPr>
-        <p:style>
-          <a:lnRef idx="2">
-            <a:schemeClr val="accent1">
-              <a:shade val="50000"/>
-            </a:schemeClr>
-          </a:lnRef>
-          <a:fillRef idx="1">
-            <a:schemeClr val="accent1"/>
-          </a:fillRef>
-          <a:effectRef idx="0">
-            <a:schemeClr val="accent1"/>
-          </a:effectRef>
-          <a:fontRef idx="minor">
-            <a:schemeClr val="lt1"/>
-          </a:fontRef>
-        </p:style>
-        <p:txBody>
-          <a:bodyPr rtlCol="0" anchor="ctr"/>
-          <a:lstStyle/>
-          <a:p>
-            <a:pPr algn="ctr"/>
-            <a:endParaRPr lang="en-US"/>
-          </a:p>
-        </p:txBody>
-      </p:sp>
-      <p:sp>
-        <p:nvSpPr>
           <p:cNvPr id="76" name="TextBox 75"/>
           <p:cNvSpPr txBox="1"/>
           <p:nvPr/>
@@ -10719,13 +12874,13 @@
         <p:nvCxnSpPr>
           <p:cNvPr id="79" name="Straight Connector 78"/>
           <p:cNvCxnSpPr>
-            <a:stCxn id="67" idx="6"/>
+            <a:cxnSpLocks/>
           </p:cNvCxnSpPr>
           <p:nvPr/>
         </p:nvCxnSpPr>
         <p:spPr>
           <a:xfrm flipV="1">
-            <a:off x="3585273" y="1868104"/>
+            <a:off x="3548943" y="1322335"/>
             <a:ext cx="1728800" cy="8634"/>
           </a:xfrm>
           <a:prstGeom prst="line">
@@ -10735,7 +12890,7 @@
             <a:solidFill>
               <a:schemeClr val="tx1"/>
             </a:solidFill>
-            <a:prstDash val="dash"/>
+            <a:prstDash val="solid"/>
           </a:ln>
         </p:spPr>
         <p:style>
@@ -10757,15 +12912,15 @@
         <p:nvCxnSpPr>
           <p:cNvPr id="82" name="Straight Connector 81"/>
           <p:cNvCxnSpPr>
-            <a:stCxn id="67" idx="7"/>
-            <a:endCxn id="68" idx="2"/>
+            <a:cxnSpLocks/>
+            <a:stCxn id="187" idx="0"/>
           </p:cNvCxnSpPr>
           <p:nvPr/>
         </p:nvCxnSpPr>
         <p:spPr>
           <a:xfrm flipV="1">
-            <a:off x="3578578" y="699162"/>
-            <a:ext cx="1599481" cy="1161411"/>
+            <a:off x="3583280" y="698513"/>
+            <a:ext cx="1599805" cy="1126225"/>
           </a:xfrm>
           <a:prstGeom prst="line">
             <a:avLst/>
@@ -10774,7 +12929,7 @@
             <a:solidFill>
               <a:schemeClr val="tx1"/>
             </a:solidFill>
-            <a:prstDash val="dash"/>
+            <a:prstDash val="solid"/>
           </a:ln>
         </p:spPr>
         <p:style>
@@ -10869,8 +13024,8 @@
           <p:nvPr/>
         </p:nvSpPr>
         <p:spPr>
-          <a:xfrm rot="19458989">
-            <a:off x="4160115" y="1021767"/>
+          <a:xfrm rot="19333929">
+            <a:off x="4479703" y="768715"/>
             <a:ext cx="467918" cy="276999"/>
           </a:xfrm>
           <a:prstGeom prst="rect">
@@ -10902,7 +13057,7 @@
         </p:nvSpPr>
         <p:spPr>
           <a:xfrm>
-            <a:off x="4464814" y="1651372"/>
+            <a:off x="4731269" y="1111659"/>
             <a:ext cx="610447" cy="276999"/>
           </a:xfrm>
           <a:prstGeom prst="rect">
@@ -10934,7 +13089,7 @@
         </p:nvSpPr>
         <p:spPr>
           <a:xfrm>
-            <a:off x="3486174" y="2003904"/>
+            <a:off x="3470079" y="1904598"/>
             <a:ext cx="45719" cy="45719"/>
           </a:xfrm>
           <a:prstGeom prst="ellipse">
@@ -10980,58 +13135,6 @@
       </p:sp>
       <p:sp>
         <p:nvSpPr>
-          <p:cNvPr id="101" name="Isosceles Triangle 100"/>
-          <p:cNvSpPr/>
-          <p:nvPr/>
-        </p:nvSpPr>
-        <p:spPr>
-          <a:xfrm>
-            <a:off x="3441229" y="1780130"/>
-            <a:ext cx="45719" cy="45719"/>
-          </a:xfrm>
-          <a:prstGeom prst="triangle">
-            <a:avLst/>
-          </a:prstGeom>
-          <a:solidFill>
-            <a:schemeClr val="accent5">
-              <a:lumMod val="75000"/>
-            </a:schemeClr>
-          </a:solidFill>
-          <a:ln w="38100">
-            <a:solidFill>
-              <a:schemeClr val="accent6">
-                <a:lumMod val="75000"/>
-              </a:schemeClr>
-            </a:solidFill>
-          </a:ln>
-        </p:spPr>
-        <p:style>
-          <a:lnRef idx="2">
-            <a:schemeClr val="accent1">
-              <a:shade val="50000"/>
-            </a:schemeClr>
-          </a:lnRef>
-          <a:fillRef idx="1">
-            <a:schemeClr val="accent1"/>
-          </a:fillRef>
-          <a:effectRef idx="0">
-            <a:schemeClr val="accent1"/>
-          </a:effectRef>
-          <a:fontRef idx="minor">
-            <a:schemeClr val="lt1"/>
-          </a:fontRef>
-        </p:style>
-        <p:txBody>
-          <a:bodyPr rtlCol="0" anchor="ctr"/>
-          <a:lstStyle/>
-          <a:p>
-            <a:pPr algn="ctr"/>
-            <a:endParaRPr lang="en-US"/>
-          </a:p>
-        </p:txBody>
-      </p:sp>
-      <p:sp>
-        <p:nvSpPr>
           <p:cNvPr id="119" name="Diamond 118"/>
           <p:cNvSpPr/>
           <p:nvPr/>
@@ -11109,6 +13212,13 @@
                 <a:latin typeface="Arial" panose="020B0604020202020204" pitchFamily="34" charset="0"/>
                 <a:cs typeface="Arial" panose="020B0604020202020204" pitchFamily="34" charset="0"/>
               </a:rPr>
+              <a:t>B     </a:t>
+            </a:r>
+            <a:r>
+              <a:rPr lang="en-US" sz="1400" dirty="0">
+                <a:latin typeface="Arial" panose="020B0604020202020204" pitchFamily="34" charset="0"/>
+                <a:cs typeface="Arial" panose="020B0604020202020204" pitchFamily="34" charset="0"/>
+              </a:rPr>
               <a:t>Prediction 2</a:t>
             </a:r>
           </a:p>
@@ -11141,6 +13251,13 @@
                 <a:latin typeface="Arial" panose="020B0604020202020204" pitchFamily="34" charset="0"/>
                 <a:cs typeface="Arial" panose="020B0604020202020204" pitchFamily="34" charset="0"/>
               </a:rPr>
+              <a:t>A    </a:t>
+            </a:r>
+            <a:r>
+              <a:rPr lang="en-US" sz="1400" dirty="0">
+                <a:latin typeface="Arial" panose="020B0604020202020204" pitchFamily="34" charset="0"/>
+                <a:cs typeface="Arial" panose="020B0604020202020204" pitchFamily="34" charset="0"/>
+              </a:rPr>
               <a:t>Prediction 1</a:t>
             </a:r>
           </a:p>
@@ -11170,6 +13287,13 @@
           <a:p>
             <a:r>
               <a:rPr lang="en-US" sz="1400" b="1" dirty="0">
+                <a:latin typeface="Arial" panose="020B0604020202020204" pitchFamily="34" charset="0"/>
+                <a:cs typeface="Arial" panose="020B0604020202020204" pitchFamily="34" charset="0"/>
+              </a:rPr>
+              <a:t>C     </a:t>
+            </a:r>
+            <a:r>
+              <a:rPr lang="en-US" sz="1400" dirty="0">
                 <a:latin typeface="Arial" panose="020B0604020202020204" pitchFamily="34" charset="0"/>
                 <a:cs typeface="Arial" panose="020B0604020202020204" pitchFamily="34" charset="0"/>
               </a:rPr>
@@ -11456,7 +13580,7 @@
         </p:nvSpPr>
         <p:spPr>
           <a:xfrm>
-            <a:off x="3420993" y="1892255"/>
+            <a:off x="3416799" y="1768798"/>
             <a:ext cx="84103" cy="72423"/>
           </a:xfrm>
           <a:prstGeom prst="rect">
@@ -11504,7 +13628,7 @@
         </p:nvSpPr>
         <p:spPr>
           <a:xfrm>
-            <a:off x="3557323" y="1924044"/>
+            <a:off x="3541228" y="1824738"/>
             <a:ext cx="84103" cy="72423"/>
           </a:xfrm>
           <a:prstGeom prst="rect">
@@ -11804,7 +13928,7 @@
         </p:nvSpPr>
         <p:spPr>
           <a:xfrm>
-            <a:off x="5360190" y="1831019"/>
+            <a:off x="5323860" y="1285250"/>
             <a:ext cx="45719" cy="45719"/>
           </a:xfrm>
           <a:prstGeom prst="diamond">
@@ -11856,7 +13980,7 @@
         </p:nvSpPr>
         <p:spPr>
           <a:xfrm>
-            <a:off x="5301565" y="1719325"/>
+            <a:off x="5265235" y="1173556"/>
             <a:ext cx="45719" cy="45719"/>
           </a:xfrm>
           <a:prstGeom prst="triangle">
@@ -11908,7 +14032,7 @@
         </p:nvSpPr>
         <p:spPr>
           <a:xfrm>
-            <a:off x="5416717" y="1732738"/>
+            <a:off x="5380387" y="1186969"/>
             <a:ext cx="45719" cy="45719"/>
           </a:xfrm>
           <a:prstGeom prst="ellipse">
@@ -11960,7 +14084,7 @@
         </p:nvSpPr>
         <p:spPr>
           <a:xfrm>
-            <a:off x="5292923" y="1920474"/>
+            <a:off x="5256593" y="1374705"/>
             <a:ext cx="84103" cy="72423"/>
           </a:xfrm>
           <a:prstGeom prst="rect">
@@ -12575,6 +14699,13 @@
                 <a:latin typeface="Arial" panose="020B0604020202020204" pitchFamily="34" charset="0"/>
                 <a:cs typeface="Arial" panose="020B0604020202020204" pitchFamily="34" charset="0"/>
               </a:rPr>
+              <a:t>D     </a:t>
+            </a:r>
+            <a:r>
+              <a:rPr lang="en-US" sz="1400" dirty="0">
+                <a:latin typeface="Arial" panose="020B0604020202020204" pitchFamily="34" charset="0"/>
+                <a:cs typeface="Arial" panose="020B0604020202020204" pitchFamily="34" charset="0"/>
+              </a:rPr>
               <a:t>Prediction 4</a:t>
             </a:r>
           </a:p>
@@ -12813,6 +14944,172 @@
               </a:rPr>
               <a:t>NSH</a:t>
             </a:r>
+          </a:p>
+        </p:txBody>
+      </p:sp>
+      <p:sp>
+        <p:nvSpPr>
+          <p:cNvPr id="62" name="Oval 61">
+            <a:extLst>
+              <a:ext uri="{FF2B5EF4-FFF2-40B4-BE49-F238E27FC236}">
+                <a16:creationId xmlns:a16="http://schemas.microsoft.com/office/drawing/2014/main" id="{4BCC194B-DC12-BDE3-B843-50321F857801}"/>
+              </a:ext>
+            </a:extLst>
+          </p:cNvPr>
+          <p:cNvSpPr/>
+          <p:nvPr/>
+        </p:nvSpPr>
+        <p:spPr>
+          <a:xfrm>
+            <a:off x="3464795" y="1385618"/>
+            <a:ext cx="45719" cy="45719"/>
+          </a:xfrm>
+          <a:prstGeom prst="ellipse">
+            <a:avLst/>
+          </a:prstGeom>
+          <a:solidFill>
+            <a:schemeClr val="accent1">
+              <a:lumMod val="75000"/>
+            </a:schemeClr>
+          </a:solidFill>
+          <a:ln w="38100">
+            <a:solidFill>
+              <a:schemeClr val="accent1">
+                <a:lumMod val="75000"/>
+              </a:schemeClr>
+            </a:solidFill>
+          </a:ln>
+        </p:spPr>
+        <p:style>
+          <a:lnRef idx="2">
+            <a:schemeClr val="accent1">
+              <a:shade val="50000"/>
+            </a:schemeClr>
+          </a:lnRef>
+          <a:fillRef idx="1">
+            <a:schemeClr val="accent1"/>
+          </a:fillRef>
+          <a:effectRef idx="0">
+            <a:schemeClr val="accent1"/>
+          </a:effectRef>
+          <a:fontRef idx="minor">
+            <a:schemeClr val="lt1"/>
+          </a:fontRef>
+        </p:style>
+        <p:txBody>
+          <a:bodyPr rtlCol="0" anchor="ctr"/>
+          <a:lstStyle/>
+          <a:p>
+            <a:pPr algn="ctr"/>
+            <a:endParaRPr lang="en-US"/>
+          </a:p>
+        </p:txBody>
+      </p:sp>
+      <p:sp>
+        <p:nvSpPr>
+          <p:cNvPr id="63" name="Rectangle 62">
+            <a:extLst>
+              <a:ext uri="{FF2B5EF4-FFF2-40B4-BE49-F238E27FC236}">
+                <a16:creationId xmlns:a16="http://schemas.microsoft.com/office/drawing/2014/main" id="{87271CA8-55E2-4EF3-DCB0-2DDA7653FBE9}"/>
+              </a:ext>
+            </a:extLst>
+          </p:cNvPr>
+          <p:cNvSpPr/>
+          <p:nvPr/>
+        </p:nvSpPr>
+        <p:spPr>
+          <a:xfrm>
+            <a:off x="3411515" y="1249818"/>
+            <a:ext cx="84103" cy="72423"/>
+          </a:xfrm>
+          <a:prstGeom prst="rect">
+            <a:avLst/>
+          </a:prstGeom>
+          <a:solidFill>
+            <a:srgbClr val="C00000"/>
+          </a:solidFill>
+          <a:ln w="6350">
+            <a:solidFill>
+              <a:srgbClr val="C00000"/>
+            </a:solidFill>
+          </a:ln>
+        </p:spPr>
+        <p:style>
+          <a:lnRef idx="2">
+            <a:schemeClr val="accent1">
+              <a:shade val="50000"/>
+            </a:schemeClr>
+          </a:lnRef>
+          <a:fillRef idx="1">
+            <a:schemeClr val="accent1"/>
+          </a:fillRef>
+          <a:effectRef idx="0">
+            <a:schemeClr val="accent1"/>
+          </a:effectRef>
+          <a:fontRef idx="minor">
+            <a:schemeClr val="lt1"/>
+          </a:fontRef>
+        </p:style>
+        <p:txBody>
+          <a:bodyPr rtlCol="0" anchor="ctr"/>
+          <a:lstStyle/>
+          <a:p>
+            <a:pPr algn="ctr"/>
+            <a:endParaRPr lang="en-US"/>
+          </a:p>
+        </p:txBody>
+      </p:sp>
+      <p:sp>
+        <p:nvSpPr>
+          <p:cNvPr id="64" name="Rectangle 63">
+            <a:extLst>
+              <a:ext uri="{FF2B5EF4-FFF2-40B4-BE49-F238E27FC236}">
+                <a16:creationId xmlns:a16="http://schemas.microsoft.com/office/drawing/2014/main" id="{51940131-7EB7-4D22-06B0-713D9EFDF7FE}"/>
+              </a:ext>
+            </a:extLst>
+          </p:cNvPr>
+          <p:cNvSpPr/>
+          <p:nvPr/>
+        </p:nvSpPr>
+        <p:spPr>
+          <a:xfrm>
+            <a:off x="3535944" y="1305758"/>
+            <a:ext cx="84103" cy="72423"/>
+          </a:xfrm>
+          <a:prstGeom prst="rect">
+            <a:avLst/>
+          </a:prstGeom>
+          <a:solidFill>
+            <a:srgbClr val="C00000"/>
+          </a:solidFill>
+          <a:ln w="6350">
+            <a:solidFill>
+              <a:srgbClr val="C00000"/>
+            </a:solidFill>
+          </a:ln>
+        </p:spPr>
+        <p:style>
+          <a:lnRef idx="2">
+            <a:schemeClr val="accent1">
+              <a:shade val="50000"/>
+            </a:schemeClr>
+          </a:lnRef>
+          <a:fillRef idx="1">
+            <a:schemeClr val="accent1"/>
+          </a:fillRef>
+          <a:effectRef idx="0">
+            <a:schemeClr val="accent1"/>
+          </a:effectRef>
+          <a:fontRef idx="minor">
+            <a:schemeClr val="lt1"/>
+          </a:fontRef>
+        </p:style>
+        <p:txBody>
+          <a:bodyPr rtlCol="0" anchor="ctr"/>
+          <a:lstStyle/>
+          <a:p>
+            <a:pPr algn="ctr"/>
+            <a:endParaRPr lang="en-US"/>
           </a:p>
         </p:txBody>
       </p:sp>

</xml_diff>